<commit_message>
Add slide with Research IT services
</commit_message>
<xml_diff>
--- a/IntroductionConclusion.pptx
+++ b/IntroductionConclusion.pptx
@@ -3,26 +3,28 @@
 <p:presentation xmlns:a="http://schemas.openxmlformats.org/drawingml/2006/main" xmlns:r="http://schemas.openxmlformats.org/officeDocument/2006/relationships" xmlns:p="http://schemas.openxmlformats.org/presentationml/2006/main" saveSubsetFonts="1">
   <p:sldMasterIdLst>
     <p:sldMasterId id="2147483738" r:id="rId4"/>
+    <p:sldMasterId id="2147483744" r:id="rId5"/>
   </p:sldMasterIdLst>
   <p:notesMasterIdLst>
-    <p:notesMasterId r:id="rId20"/>
+    <p:notesMasterId r:id="rId22"/>
   </p:notesMasterIdLst>
   <p:sldIdLst>
-    <p:sldId id="616" r:id="rId5"/>
-    <p:sldId id="619" r:id="rId6"/>
-    <p:sldId id="632" r:id="rId7"/>
-    <p:sldId id="663" r:id="rId8"/>
-    <p:sldId id="662" r:id="rId9"/>
-    <p:sldId id="661" r:id="rId10"/>
-    <p:sldId id="653" r:id="rId11"/>
-    <p:sldId id="629" r:id="rId12"/>
-    <p:sldId id="630" r:id="rId13"/>
-    <p:sldId id="655" r:id="rId14"/>
-    <p:sldId id="658" r:id="rId15"/>
-    <p:sldId id="648" r:id="rId16"/>
-    <p:sldId id="649" r:id="rId17"/>
-    <p:sldId id="647" r:id="rId18"/>
-    <p:sldId id="643" r:id="rId19"/>
+    <p:sldId id="616" r:id="rId6"/>
+    <p:sldId id="619" r:id="rId7"/>
+    <p:sldId id="632" r:id="rId8"/>
+    <p:sldId id="663" r:id="rId9"/>
+    <p:sldId id="662" r:id="rId10"/>
+    <p:sldId id="661" r:id="rId11"/>
+    <p:sldId id="653" r:id="rId12"/>
+    <p:sldId id="629" r:id="rId13"/>
+    <p:sldId id="630" r:id="rId14"/>
+    <p:sldId id="655" r:id="rId15"/>
+    <p:sldId id="658" r:id="rId16"/>
+    <p:sldId id="648" r:id="rId17"/>
+    <p:sldId id="649" r:id="rId18"/>
+    <p:sldId id="647" r:id="rId19"/>
+    <p:sldId id="643" r:id="rId20"/>
+    <p:sldId id="664" r:id="rId21"/>
   </p:sldIdLst>
   <p:sldSz cx="9144000" cy="6858000" type="screen4x3"/>
   <p:notesSz cx="6858000" cy="9144000"/>
@@ -123,7 +125,7 @@
   </p:defaultTextStyle>
   <p:extLst>
     <p:ext uri="{EFAFB233-063F-42B5-8137-9DF3F51BA10A}">
-      <p15:sldGuideLst xmlns:p15="http://schemas.microsoft.com/office/powerpoint/2012/main">
+      <p15:sldGuideLst xmlns:p15="http://schemas.microsoft.com/office/powerpoint/2012/main" xmlns="">
         <p15:guide id="1" orient="horz" pos="2160">
           <p15:clr>
             <a:srgbClr val="A4A3A4"/>
@@ -227,7 +229,7 @@
             <a:fld id="{17BF77A4-95C4-49A7-B18D-D234C078783D}" type="datetimeFigureOut">
               <a:rPr lang="en-US" smtClean="0"/>
               <a:pPr/>
-              <a:t>1/23/2018</a:t>
+              <a:t>1/31/2018</a:t>
             </a:fld>
             <a:endParaRPr lang="en-US"/>
           </a:p>
@@ -1877,6 +1879,1141 @@
 </p:sldLayout>
 </file>
 
+<file path=ppt/slideLayouts/slideLayout10.xml><?xml version="1.0" encoding="utf-8"?>
+<p:sldLayout xmlns:a="http://schemas.openxmlformats.org/drawingml/2006/main" xmlns:r="http://schemas.openxmlformats.org/officeDocument/2006/relationships" xmlns:p="http://schemas.openxmlformats.org/presentationml/2006/main" type="blank" preserve="1">
+  <p:cSld name="Blank">
+    <p:spTree>
+      <p:nvGrpSpPr>
+        <p:cNvPr id="1" name=""/>
+        <p:cNvGrpSpPr/>
+        <p:nvPr/>
+      </p:nvGrpSpPr>
+      <p:grpSpPr>
+        <a:xfrm>
+          <a:off x="0" y="0"/>
+          <a:ext cx="0" cy="0"/>
+          <a:chOff x="0" y="0"/>
+          <a:chExt cx="0" cy="0"/>
+        </a:xfrm>
+      </p:grpSpPr>
+      <p:sp>
+        <p:nvSpPr>
+          <p:cNvPr id="2" name="Date Placeholder 1"/>
+          <p:cNvSpPr>
+            <a:spLocks noGrp="1"/>
+          </p:cNvSpPr>
+          <p:nvPr>
+            <p:ph type="dt" sz="half" idx="10"/>
+          </p:nvPr>
+        </p:nvSpPr>
+        <p:spPr/>
+        <p:txBody>
+          <a:bodyPr/>
+          <a:lstStyle/>
+          <a:p>
+            <a:fld id="{C8496DA1-00B0-4985-AB8C-C5A2D80474DD}" type="datetimeFigureOut">
+              <a:rPr lang="en-GB" smtClean="0">
+                <a:solidFill>
+                  <a:prstClr val="black">
+                    <a:tint val="75000"/>
+                  </a:prstClr>
+                </a:solidFill>
+              </a:rPr>
+              <a:pPr/>
+              <a:t>31/01/2018</a:t>
+            </a:fld>
+            <a:endParaRPr lang="en-GB">
+              <a:solidFill>
+                <a:prstClr val="black">
+                  <a:tint val="75000"/>
+                </a:prstClr>
+              </a:solidFill>
+            </a:endParaRPr>
+          </a:p>
+        </p:txBody>
+      </p:sp>
+      <p:sp>
+        <p:nvSpPr>
+          <p:cNvPr id="3" name="Footer Placeholder 2"/>
+          <p:cNvSpPr>
+            <a:spLocks noGrp="1"/>
+          </p:cNvSpPr>
+          <p:nvPr>
+            <p:ph type="ftr" sz="quarter" idx="11"/>
+          </p:nvPr>
+        </p:nvSpPr>
+        <p:spPr/>
+        <p:txBody>
+          <a:bodyPr/>
+          <a:lstStyle/>
+          <a:p>
+            <a:endParaRPr lang="en-GB">
+              <a:solidFill>
+                <a:prstClr val="black">
+                  <a:tint val="75000"/>
+                </a:prstClr>
+              </a:solidFill>
+            </a:endParaRPr>
+          </a:p>
+        </p:txBody>
+      </p:sp>
+      <p:sp>
+        <p:nvSpPr>
+          <p:cNvPr id="4" name="Slide Number Placeholder 3"/>
+          <p:cNvSpPr>
+            <a:spLocks noGrp="1"/>
+          </p:cNvSpPr>
+          <p:nvPr>
+            <p:ph type="sldNum" sz="quarter" idx="12"/>
+          </p:nvPr>
+        </p:nvSpPr>
+        <p:spPr/>
+        <p:txBody>
+          <a:bodyPr/>
+          <a:lstStyle/>
+          <a:p>
+            <a:fld id="{77F92139-D79D-436C-AFD0-4822DBC5A5CA}" type="slidenum">
+              <a:rPr lang="en-GB" smtClean="0">
+                <a:solidFill>
+                  <a:prstClr val="black">
+                    <a:tint val="75000"/>
+                  </a:prstClr>
+                </a:solidFill>
+              </a:rPr>
+              <a:pPr/>
+              <a:t>‹#›</a:t>
+            </a:fld>
+            <a:endParaRPr lang="en-GB">
+              <a:solidFill>
+                <a:prstClr val="black">
+                  <a:tint val="75000"/>
+                </a:prstClr>
+              </a:solidFill>
+            </a:endParaRPr>
+          </a:p>
+        </p:txBody>
+      </p:sp>
+    </p:spTree>
+    <p:extLst>
+      <p:ext uri="{BB962C8B-B14F-4D97-AF65-F5344CB8AC3E}">
+        <p14:creationId xmlns:p14="http://schemas.microsoft.com/office/powerpoint/2010/main" val="446862435"/>
+      </p:ext>
+    </p:extLst>
+  </p:cSld>
+  <p:clrMapOvr>
+    <a:masterClrMapping/>
+  </p:clrMapOvr>
+</p:sldLayout>
+</file>
+
+<file path=ppt/slideLayouts/slideLayout11.xml><?xml version="1.0" encoding="utf-8"?>
+<p:sldLayout xmlns:a="http://schemas.openxmlformats.org/drawingml/2006/main" xmlns:r="http://schemas.openxmlformats.org/officeDocument/2006/relationships" xmlns:p="http://schemas.openxmlformats.org/presentationml/2006/main" type="objTx" preserve="1">
+  <p:cSld name="Content with Caption">
+    <p:spTree>
+      <p:nvGrpSpPr>
+        <p:cNvPr id="1" name=""/>
+        <p:cNvGrpSpPr/>
+        <p:nvPr/>
+      </p:nvGrpSpPr>
+      <p:grpSpPr>
+        <a:xfrm>
+          <a:off x="0" y="0"/>
+          <a:ext cx="0" cy="0"/>
+          <a:chOff x="0" y="0"/>
+          <a:chExt cx="0" cy="0"/>
+        </a:xfrm>
+      </p:grpSpPr>
+      <p:sp>
+        <p:nvSpPr>
+          <p:cNvPr id="2" name="Title 1"/>
+          <p:cNvSpPr>
+            <a:spLocks noGrp="1"/>
+          </p:cNvSpPr>
+          <p:nvPr>
+            <p:ph type="title"/>
+          </p:nvPr>
+        </p:nvSpPr>
+        <p:spPr>
+          <a:xfrm>
+            <a:off x="457200" y="273050"/>
+            <a:ext cx="3008313" cy="1162050"/>
+          </a:xfrm>
+        </p:spPr>
+        <p:txBody>
+          <a:bodyPr anchor="b"/>
+          <a:lstStyle>
+            <a:lvl1pPr algn="l">
+              <a:defRPr sz="2000" b="1"/>
+            </a:lvl1pPr>
+          </a:lstStyle>
+          <a:p>
+            <a:r>
+              <a:rPr lang="en-US" smtClean="0"/>
+              <a:t>Click to edit Master title style</a:t>
+            </a:r>
+            <a:endParaRPr lang="en-GB"/>
+          </a:p>
+        </p:txBody>
+      </p:sp>
+      <p:sp>
+        <p:nvSpPr>
+          <p:cNvPr id="3" name="Content Placeholder 2"/>
+          <p:cNvSpPr>
+            <a:spLocks noGrp="1"/>
+          </p:cNvSpPr>
+          <p:nvPr>
+            <p:ph idx="1"/>
+          </p:nvPr>
+        </p:nvSpPr>
+        <p:spPr>
+          <a:xfrm>
+            <a:off x="3575050" y="273050"/>
+            <a:ext cx="5111750" cy="5853113"/>
+          </a:xfrm>
+        </p:spPr>
+        <p:txBody>
+          <a:bodyPr/>
+          <a:lstStyle>
+            <a:lvl1pPr>
+              <a:defRPr sz="3200"/>
+            </a:lvl1pPr>
+            <a:lvl2pPr>
+              <a:defRPr sz="2800"/>
+            </a:lvl2pPr>
+            <a:lvl3pPr>
+              <a:defRPr sz="2400"/>
+            </a:lvl3pPr>
+            <a:lvl4pPr>
+              <a:defRPr sz="2000"/>
+            </a:lvl4pPr>
+            <a:lvl5pPr>
+              <a:defRPr sz="2000"/>
+            </a:lvl5pPr>
+            <a:lvl6pPr>
+              <a:defRPr sz="2000"/>
+            </a:lvl6pPr>
+            <a:lvl7pPr>
+              <a:defRPr sz="2000"/>
+            </a:lvl7pPr>
+            <a:lvl8pPr>
+              <a:defRPr sz="2000"/>
+            </a:lvl8pPr>
+            <a:lvl9pPr>
+              <a:defRPr sz="2000"/>
+            </a:lvl9pPr>
+          </a:lstStyle>
+          <a:p>
+            <a:pPr lvl="0"/>
+            <a:r>
+              <a:rPr lang="en-US" smtClean="0"/>
+              <a:t>Click to edit Master text styles</a:t>
+            </a:r>
+          </a:p>
+          <a:p>
+            <a:pPr lvl="1"/>
+            <a:r>
+              <a:rPr lang="en-US" smtClean="0"/>
+              <a:t>Second level</a:t>
+            </a:r>
+          </a:p>
+          <a:p>
+            <a:pPr lvl="2"/>
+            <a:r>
+              <a:rPr lang="en-US" smtClean="0"/>
+              <a:t>Third level</a:t>
+            </a:r>
+          </a:p>
+          <a:p>
+            <a:pPr lvl="3"/>
+            <a:r>
+              <a:rPr lang="en-US" smtClean="0"/>
+              <a:t>Fourth level</a:t>
+            </a:r>
+          </a:p>
+          <a:p>
+            <a:pPr lvl="4"/>
+            <a:r>
+              <a:rPr lang="en-US" smtClean="0"/>
+              <a:t>Fifth level</a:t>
+            </a:r>
+            <a:endParaRPr lang="en-GB"/>
+          </a:p>
+        </p:txBody>
+      </p:sp>
+      <p:sp>
+        <p:nvSpPr>
+          <p:cNvPr id="4" name="Text Placeholder 3"/>
+          <p:cNvSpPr>
+            <a:spLocks noGrp="1"/>
+          </p:cNvSpPr>
+          <p:nvPr>
+            <p:ph type="body" sz="half" idx="2"/>
+          </p:nvPr>
+        </p:nvSpPr>
+        <p:spPr>
+          <a:xfrm>
+            <a:off x="457200" y="1435100"/>
+            <a:ext cx="3008313" cy="4691063"/>
+          </a:xfrm>
+        </p:spPr>
+        <p:txBody>
+          <a:bodyPr/>
+          <a:lstStyle>
+            <a:lvl1pPr marL="0" indent="0">
+              <a:buNone/>
+              <a:defRPr sz="1400"/>
+            </a:lvl1pPr>
+            <a:lvl2pPr marL="457200" indent="0">
+              <a:buNone/>
+              <a:defRPr sz="1200"/>
+            </a:lvl2pPr>
+            <a:lvl3pPr marL="914400" indent="0">
+              <a:buNone/>
+              <a:defRPr sz="1000"/>
+            </a:lvl3pPr>
+            <a:lvl4pPr marL="1371600" indent="0">
+              <a:buNone/>
+              <a:defRPr sz="900"/>
+            </a:lvl4pPr>
+            <a:lvl5pPr marL="1828800" indent="0">
+              <a:buNone/>
+              <a:defRPr sz="900"/>
+            </a:lvl5pPr>
+            <a:lvl6pPr marL="2286000" indent="0">
+              <a:buNone/>
+              <a:defRPr sz="900"/>
+            </a:lvl6pPr>
+            <a:lvl7pPr marL="2743200" indent="0">
+              <a:buNone/>
+              <a:defRPr sz="900"/>
+            </a:lvl7pPr>
+            <a:lvl8pPr marL="3200400" indent="0">
+              <a:buNone/>
+              <a:defRPr sz="900"/>
+            </a:lvl8pPr>
+            <a:lvl9pPr marL="3657600" indent="0">
+              <a:buNone/>
+              <a:defRPr sz="900"/>
+            </a:lvl9pPr>
+          </a:lstStyle>
+          <a:p>
+            <a:pPr lvl="0"/>
+            <a:r>
+              <a:rPr lang="en-US" smtClean="0"/>
+              <a:t>Click to edit Master text styles</a:t>
+            </a:r>
+          </a:p>
+        </p:txBody>
+      </p:sp>
+      <p:sp>
+        <p:nvSpPr>
+          <p:cNvPr id="5" name="Date Placeholder 4"/>
+          <p:cNvSpPr>
+            <a:spLocks noGrp="1"/>
+          </p:cNvSpPr>
+          <p:nvPr>
+            <p:ph type="dt" sz="half" idx="10"/>
+          </p:nvPr>
+        </p:nvSpPr>
+        <p:spPr/>
+        <p:txBody>
+          <a:bodyPr/>
+          <a:lstStyle/>
+          <a:p>
+            <a:fld id="{C8496DA1-00B0-4985-AB8C-C5A2D80474DD}" type="datetimeFigureOut">
+              <a:rPr lang="en-GB" smtClean="0">
+                <a:solidFill>
+                  <a:prstClr val="black">
+                    <a:tint val="75000"/>
+                  </a:prstClr>
+                </a:solidFill>
+              </a:rPr>
+              <a:pPr/>
+              <a:t>31/01/2018</a:t>
+            </a:fld>
+            <a:endParaRPr lang="en-GB">
+              <a:solidFill>
+                <a:prstClr val="black">
+                  <a:tint val="75000"/>
+                </a:prstClr>
+              </a:solidFill>
+            </a:endParaRPr>
+          </a:p>
+        </p:txBody>
+      </p:sp>
+      <p:sp>
+        <p:nvSpPr>
+          <p:cNvPr id="6" name="Footer Placeholder 5"/>
+          <p:cNvSpPr>
+            <a:spLocks noGrp="1"/>
+          </p:cNvSpPr>
+          <p:nvPr>
+            <p:ph type="ftr" sz="quarter" idx="11"/>
+          </p:nvPr>
+        </p:nvSpPr>
+        <p:spPr/>
+        <p:txBody>
+          <a:bodyPr/>
+          <a:lstStyle/>
+          <a:p>
+            <a:endParaRPr lang="en-GB">
+              <a:solidFill>
+                <a:prstClr val="black">
+                  <a:tint val="75000"/>
+                </a:prstClr>
+              </a:solidFill>
+            </a:endParaRPr>
+          </a:p>
+        </p:txBody>
+      </p:sp>
+      <p:sp>
+        <p:nvSpPr>
+          <p:cNvPr id="7" name="Slide Number Placeholder 6"/>
+          <p:cNvSpPr>
+            <a:spLocks noGrp="1"/>
+          </p:cNvSpPr>
+          <p:nvPr>
+            <p:ph type="sldNum" sz="quarter" idx="12"/>
+          </p:nvPr>
+        </p:nvSpPr>
+        <p:spPr/>
+        <p:txBody>
+          <a:bodyPr/>
+          <a:lstStyle/>
+          <a:p>
+            <a:fld id="{77F92139-D79D-436C-AFD0-4822DBC5A5CA}" type="slidenum">
+              <a:rPr lang="en-GB" smtClean="0">
+                <a:solidFill>
+                  <a:prstClr val="black">
+                    <a:tint val="75000"/>
+                  </a:prstClr>
+                </a:solidFill>
+              </a:rPr>
+              <a:pPr/>
+              <a:t>‹#›</a:t>
+            </a:fld>
+            <a:endParaRPr lang="en-GB">
+              <a:solidFill>
+                <a:prstClr val="black">
+                  <a:tint val="75000"/>
+                </a:prstClr>
+              </a:solidFill>
+            </a:endParaRPr>
+          </a:p>
+        </p:txBody>
+      </p:sp>
+    </p:spTree>
+    <p:extLst>
+      <p:ext uri="{BB962C8B-B14F-4D97-AF65-F5344CB8AC3E}">
+        <p14:creationId xmlns:p14="http://schemas.microsoft.com/office/powerpoint/2010/main" val="3734431481"/>
+      </p:ext>
+    </p:extLst>
+  </p:cSld>
+  <p:clrMapOvr>
+    <a:masterClrMapping/>
+  </p:clrMapOvr>
+</p:sldLayout>
+</file>
+
+<file path=ppt/slideLayouts/slideLayout12.xml><?xml version="1.0" encoding="utf-8"?>
+<p:sldLayout xmlns:a="http://schemas.openxmlformats.org/drawingml/2006/main" xmlns:r="http://schemas.openxmlformats.org/officeDocument/2006/relationships" xmlns:p="http://schemas.openxmlformats.org/presentationml/2006/main" type="picTx" preserve="1">
+  <p:cSld name="Picture with Caption">
+    <p:spTree>
+      <p:nvGrpSpPr>
+        <p:cNvPr id="1" name=""/>
+        <p:cNvGrpSpPr/>
+        <p:nvPr/>
+      </p:nvGrpSpPr>
+      <p:grpSpPr>
+        <a:xfrm>
+          <a:off x="0" y="0"/>
+          <a:ext cx="0" cy="0"/>
+          <a:chOff x="0" y="0"/>
+          <a:chExt cx="0" cy="0"/>
+        </a:xfrm>
+      </p:grpSpPr>
+      <p:sp>
+        <p:nvSpPr>
+          <p:cNvPr id="2" name="Title 1"/>
+          <p:cNvSpPr>
+            <a:spLocks noGrp="1"/>
+          </p:cNvSpPr>
+          <p:nvPr>
+            <p:ph type="title"/>
+          </p:nvPr>
+        </p:nvSpPr>
+        <p:spPr>
+          <a:xfrm>
+            <a:off x="1792288" y="4800600"/>
+            <a:ext cx="5486400" cy="566738"/>
+          </a:xfrm>
+        </p:spPr>
+        <p:txBody>
+          <a:bodyPr anchor="b"/>
+          <a:lstStyle>
+            <a:lvl1pPr algn="l">
+              <a:defRPr sz="2000" b="1"/>
+            </a:lvl1pPr>
+          </a:lstStyle>
+          <a:p>
+            <a:r>
+              <a:rPr lang="en-US" smtClean="0"/>
+              <a:t>Click to edit Master title style</a:t>
+            </a:r>
+            <a:endParaRPr lang="en-GB"/>
+          </a:p>
+        </p:txBody>
+      </p:sp>
+      <p:sp>
+        <p:nvSpPr>
+          <p:cNvPr id="3" name="Picture Placeholder 2"/>
+          <p:cNvSpPr>
+            <a:spLocks noGrp="1"/>
+          </p:cNvSpPr>
+          <p:nvPr>
+            <p:ph type="pic" idx="1"/>
+          </p:nvPr>
+        </p:nvSpPr>
+        <p:spPr>
+          <a:xfrm>
+            <a:off x="1792288" y="612775"/>
+            <a:ext cx="5486400" cy="4114800"/>
+          </a:xfrm>
+        </p:spPr>
+        <p:txBody>
+          <a:bodyPr/>
+          <a:lstStyle>
+            <a:lvl1pPr marL="0" indent="0">
+              <a:buNone/>
+              <a:defRPr sz="3200"/>
+            </a:lvl1pPr>
+            <a:lvl2pPr marL="457200" indent="0">
+              <a:buNone/>
+              <a:defRPr sz="2800"/>
+            </a:lvl2pPr>
+            <a:lvl3pPr marL="914400" indent="0">
+              <a:buNone/>
+              <a:defRPr sz="2400"/>
+            </a:lvl3pPr>
+            <a:lvl4pPr marL="1371600" indent="0">
+              <a:buNone/>
+              <a:defRPr sz="2000"/>
+            </a:lvl4pPr>
+            <a:lvl5pPr marL="1828800" indent="0">
+              <a:buNone/>
+              <a:defRPr sz="2000"/>
+            </a:lvl5pPr>
+            <a:lvl6pPr marL="2286000" indent="0">
+              <a:buNone/>
+              <a:defRPr sz="2000"/>
+            </a:lvl6pPr>
+            <a:lvl7pPr marL="2743200" indent="0">
+              <a:buNone/>
+              <a:defRPr sz="2000"/>
+            </a:lvl7pPr>
+            <a:lvl8pPr marL="3200400" indent="0">
+              <a:buNone/>
+              <a:defRPr sz="2000"/>
+            </a:lvl8pPr>
+            <a:lvl9pPr marL="3657600" indent="0">
+              <a:buNone/>
+              <a:defRPr sz="2000"/>
+            </a:lvl9pPr>
+          </a:lstStyle>
+          <a:p>
+            <a:endParaRPr lang="en-GB"/>
+          </a:p>
+        </p:txBody>
+      </p:sp>
+      <p:sp>
+        <p:nvSpPr>
+          <p:cNvPr id="4" name="Text Placeholder 3"/>
+          <p:cNvSpPr>
+            <a:spLocks noGrp="1"/>
+          </p:cNvSpPr>
+          <p:nvPr>
+            <p:ph type="body" sz="half" idx="2"/>
+          </p:nvPr>
+        </p:nvSpPr>
+        <p:spPr>
+          <a:xfrm>
+            <a:off x="1792288" y="5367338"/>
+            <a:ext cx="5486400" cy="804862"/>
+          </a:xfrm>
+        </p:spPr>
+        <p:txBody>
+          <a:bodyPr/>
+          <a:lstStyle>
+            <a:lvl1pPr marL="0" indent="0">
+              <a:buNone/>
+              <a:defRPr sz="1400"/>
+            </a:lvl1pPr>
+            <a:lvl2pPr marL="457200" indent="0">
+              <a:buNone/>
+              <a:defRPr sz="1200"/>
+            </a:lvl2pPr>
+            <a:lvl3pPr marL="914400" indent="0">
+              <a:buNone/>
+              <a:defRPr sz="1000"/>
+            </a:lvl3pPr>
+            <a:lvl4pPr marL="1371600" indent="0">
+              <a:buNone/>
+              <a:defRPr sz="900"/>
+            </a:lvl4pPr>
+            <a:lvl5pPr marL="1828800" indent="0">
+              <a:buNone/>
+              <a:defRPr sz="900"/>
+            </a:lvl5pPr>
+            <a:lvl6pPr marL="2286000" indent="0">
+              <a:buNone/>
+              <a:defRPr sz="900"/>
+            </a:lvl6pPr>
+            <a:lvl7pPr marL="2743200" indent="0">
+              <a:buNone/>
+              <a:defRPr sz="900"/>
+            </a:lvl7pPr>
+            <a:lvl8pPr marL="3200400" indent="0">
+              <a:buNone/>
+              <a:defRPr sz="900"/>
+            </a:lvl8pPr>
+            <a:lvl9pPr marL="3657600" indent="0">
+              <a:buNone/>
+              <a:defRPr sz="900"/>
+            </a:lvl9pPr>
+          </a:lstStyle>
+          <a:p>
+            <a:pPr lvl="0"/>
+            <a:r>
+              <a:rPr lang="en-US" smtClean="0"/>
+              <a:t>Click to edit Master text styles</a:t>
+            </a:r>
+          </a:p>
+        </p:txBody>
+      </p:sp>
+      <p:sp>
+        <p:nvSpPr>
+          <p:cNvPr id="5" name="Date Placeholder 4"/>
+          <p:cNvSpPr>
+            <a:spLocks noGrp="1"/>
+          </p:cNvSpPr>
+          <p:nvPr>
+            <p:ph type="dt" sz="half" idx="10"/>
+          </p:nvPr>
+        </p:nvSpPr>
+        <p:spPr/>
+        <p:txBody>
+          <a:bodyPr/>
+          <a:lstStyle/>
+          <a:p>
+            <a:fld id="{C8496DA1-00B0-4985-AB8C-C5A2D80474DD}" type="datetimeFigureOut">
+              <a:rPr lang="en-GB" smtClean="0">
+                <a:solidFill>
+                  <a:prstClr val="black">
+                    <a:tint val="75000"/>
+                  </a:prstClr>
+                </a:solidFill>
+              </a:rPr>
+              <a:pPr/>
+              <a:t>31/01/2018</a:t>
+            </a:fld>
+            <a:endParaRPr lang="en-GB">
+              <a:solidFill>
+                <a:prstClr val="black">
+                  <a:tint val="75000"/>
+                </a:prstClr>
+              </a:solidFill>
+            </a:endParaRPr>
+          </a:p>
+        </p:txBody>
+      </p:sp>
+      <p:sp>
+        <p:nvSpPr>
+          <p:cNvPr id="6" name="Footer Placeholder 5"/>
+          <p:cNvSpPr>
+            <a:spLocks noGrp="1"/>
+          </p:cNvSpPr>
+          <p:nvPr>
+            <p:ph type="ftr" sz="quarter" idx="11"/>
+          </p:nvPr>
+        </p:nvSpPr>
+        <p:spPr/>
+        <p:txBody>
+          <a:bodyPr/>
+          <a:lstStyle/>
+          <a:p>
+            <a:endParaRPr lang="en-GB">
+              <a:solidFill>
+                <a:prstClr val="black">
+                  <a:tint val="75000"/>
+                </a:prstClr>
+              </a:solidFill>
+            </a:endParaRPr>
+          </a:p>
+        </p:txBody>
+      </p:sp>
+      <p:sp>
+        <p:nvSpPr>
+          <p:cNvPr id="7" name="Slide Number Placeholder 6"/>
+          <p:cNvSpPr>
+            <a:spLocks noGrp="1"/>
+          </p:cNvSpPr>
+          <p:nvPr>
+            <p:ph type="sldNum" sz="quarter" idx="12"/>
+          </p:nvPr>
+        </p:nvSpPr>
+        <p:spPr/>
+        <p:txBody>
+          <a:bodyPr/>
+          <a:lstStyle/>
+          <a:p>
+            <a:fld id="{77F92139-D79D-436C-AFD0-4822DBC5A5CA}" type="slidenum">
+              <a:rPr lang="en-GB" smtClean="0">
+                <a:solidFill>
+                  <a:prstClr val="black">
+                    <a:tint val="75000"/>
+                  </a:prstClr>
+                </a:solidFill>
+              </a:rPr>
+              <a:pPr/>
+              <a:t>‹#›</a:t>
+            </a:fld>
+            <a:endParaRPr lang="en-GB">
+              <a:solidFill>
+                <a:prstClr val="black">
+                  <a:tint val="75000"/>
+                </a:prstClr>
+              </a:solidFill>
+            </a:endParaRPr>
+          </a:p>
+        </p:txBody>
+      </p:sp>
+    </p:spTree>
+    <p:extLst>
+      <p:ext uri="{BB962C8B-B14F-4D97-AF65-F5344CB8AC3E}">
+        <p14:creationId xmlns:p14="http://schemas.microsoft.com/office/powerpoint/2010/main" val="1522357490"/>
+      </p:ext>
+    </p:extLst>
+  </p:cSld>
+  <p:clrMapOvr>
+    <a:masterClrMapping/>
+  </p:clrMapOvr>
+</p:sldLayout>
+</file>
+
+<file path=ppt/slideLayouts/slideLayout13.xml><?xml version="1.0" encoding="utf-8"?>
+<p:sldLayout xmlns:a="http://schemas.openxmlformats.org/drawingml/2006/main" xmlns:r="http://schemas.openxmlformats.org/officeDocument/2006/relationships" xmlns:p="http://schemas.openxmlformats.org/presentationml/2006/main" type="vertTx" preserve="1">
+  <p:cSld name="Title and Vertical Text">
+    <p:spTree>
+      <p:nvGrpSpPr>
+        <p:cNvPr id="1" name=""/>
+        <p:cNvGrpSpPr/>
+        <p:nvPr/>
+      </p:nvGrpSpPr>
+      <p:grpSpPr>
+        <a:xfrm>
+          <a:off x="0" y="0"/>
+          <a:ext cx="0" cy="0"/>
+          <a:chOff x="0" y="0"/>
+          <a:chExt cx="0" cy="0"/>
+        </a:xfrm>
+      </p:grpSpPr>
+      <p:sp>
+        <p:nvSpPr>
+          <p:cNvPr id="2" name="Title 1"/>
+          <p:cNvSpPr>
+            <a:spLocks noGrp="1"/>
+          </p:cNvSpPr>
+          <p:nvPr>
+            <p:ph type="title"/>
+          </p:nvPr>
+        </p:nvSpPr>
+        <p:spPr/>
+        <p:txBody>
+          <a:bodyPr/>
+          <a:lstStyle/>
+          <a:p>
+            <a:r>
+              <a:rPr lang="en-US" smtClean="0"/>
+              <a:t>Click to edit Master title style</a:t>
+            </a:r>
+            <a:endParaRPr lang="en-GB"/>
+          </a:p>
+        </p:txBody>
+      </p:sp>
+      <p:sp>
+        <p:nvSpPr>
+          <p:cNvPr id="3" name="Vertical Text Placeholder 2"/>
+          <p:cNvSpPr>
+            <a:spLocks noGrp="1"/>
+          </p:cNvSpPr>
+          <p:nvPr>
+            <p:ph type="body" orient="vert" idx="1"/>
+          </p:nvPr>
+        </p:nvSpPr>
+        <p:spPr/>
+        <p:txBody>
+          <a:bodyPr vert="eaVert"/>
+          <a:lstStyle/>
+          <a:p>
+            <a:pPr lvl="0"/>
+            <a:r>
+              <a:rPr lang="en-US" smtClean="0"/>
+              <a:t>Click to edit Master text styles</a:t>
+            </a:r>
+          </a:p>
+          <a:p>
+            <a:pPr lvl="1"/>
+            <a:r>
+              <a:rPr lang="en-US" smtClean="0"/>
+              <a:t>Second level</a:t>
+            </a:r>
+          </a:p>
+          <a:p>
+            <a:pPr lvl="2"/>
+            <a:r>
+              <a:rPr lang="en-US" smtClean="0"/>
+              <a:t>Third level</a:t>
+            </a:r>
+          </a:p>
+          <a:p>
+            <a:pPr lvl="3"/>
+            <a:r>
+              <a:rPr lang="en-US" smtClean="0"/>
+              <a:t>Fourth level</a:t>
+            </a:r>
+          </a:p>
+          <a:p>
+            <a:pPr lvl="4"/>
+            <a:r>
+              <a:rPr lang="en-US" smtClean="0"/>
+              <a:t>Fifth level</a:t>
+            </a:r>
+            <a:endParaRPr lang="en-GB"/>
+          </a:p>
+        </p:txBody>
+      </p:sp>
+      <p:sp>
+        <p:nvSpPr>
+          <p:cNvPr id="4" name="Date Placeholder 3"/>
+          <p:cNvSpPr>
+            <a:spLocks noGrp="1"/>
+          </p:cNvSpPr>
+          <p:nvPr>
+            <p:ph type="dt" sz="half" idx="10"/>
+          </p:nvPr>
+        </p:nvSpPr>
+        <p:spPr/>
+        <p:txBody>
+          <a:bodyPr/>
+          <a:lstStyle/>
+          <a:p>
+            <a:fld id="{C8496DA1-00B0-4985-AB8C-C5A2D80474DD}" type="datetimeFigureOut">
+              <a:rPr lang="en-GB" smtClean="0">
+                <a:solidFill>
+                  <a:prstClr val="black">
+                    <a:tint val="75000"/>
+                  </a:prstClr>
+                </a:solidFill>
+              </a:rPr>
+              <a:pPr/>
+              <a:t>31/01/2018</a:t>
+            </a:fld>
+            <a:endParaRPr lang="en-GB">
+              <a:solidFill>
+                <a:prstClr val="black">
+                  <a:tint val="75000"/>
+                </a:prstClr>
+              </a:solidFill>
+            </a:endParaRPr>
+          </a:p>
+        </p:txBody>
+      </p:sp>
+      <p:sp>
+        <p:nvSpPr>
+          <p:cNvPr id="5" name="Footer Placeholder 4"/>
+          <p:cNvSpPr>
+            <a:spLocks noGrp="1"/>
+          </p:cNvSpPr>
+          <p:nvPr>
+            <p:ph type="ftr" sz="quarter" idx="11"/>
+          </p:nvPr>
+        </p:nvSpPr>
+        <p:spPr/>
+        <p:txBody>
+          <a:bodyPr/>
+          <a:lstStyle/>
+          <a:p>
+            <a:endParaRPr lang="en-GB">
+              <a:solidFill>
+                <a:prstClr val="black">
+                  <a:tint val="75000"/>
+                </a:prstClr>
+              </a:solidFill>
+            </a:endParaRPr>
+          </a:p>
+        </p:txBody>
+      </p:sp>
+      <p:sp>
+        <p:nvSpPr>
+          <p:cNvPr id="6" name="Slide Number Placeholder 5"/>
+          <p:cNvSpPr>
+            <a:spLocks noGrp="1"/>
+          </p:cNvSpPr>
+          <p:nvPr>
+            <p:ph type="sldNum" sz="quarter" idx="12"/>
+          </p:nvPr>
+        </p:nvSpPr>
+        <p:spPr/>
+        <p:txBody>
+          <a:bodyPr/>
+          <a:lstStyle/>
+          <a:p>
+            <a:fld id="{77F92139-D79D-436C-AFD0-4822DBC5A5CA}" type="slidenum">
+              <a:rPr lang="en-GB" smtClean="0">
+                <a:solidFill>
+                  <a:prstClr val="black">
+                    <a:tint val="75000"/>
+                  </a:prstClr>
+                </a:solidFill>
+              </a:rPr>
+              <a:pPr/>
+              <a:t>‹#›</a:t>
+            </a:fld>
+            <a:endParaRPr lang="en-GB">
+              <a:solidFill>
+                <a:prstClr val="black">
+                  <a:tint val="75000"/>
+                </a:prstClr>
+              </a:solidFill>
+            </a:endParaRPr>
+          </a:p>
+        </p:txBody>
+      </p:sp>
+    </p:spTree>
+    <p:extLst>
+      <p:ext uri="{BB962C8B-B14F-4D97-AF65-F5344CB8AC3E}">
+        <p14:creationId xmlns:p14="http://schemas.microsoft.com/office/powerpoint/2010/main" val="412619288"/>
+      </p:ext>
+    </p:extLst>
+  </p:cSld>
+  <p:clrMapOvr>
+    <a:masterClrMapping/>
+  </p:clrMapOvr>
+</p:sldLayout>
+</file>
+
+<file path=ppt/slideLayouts/slideLayout14.xml><?xml version="1.0" encoding="utf-8"?>
+<p:sldLayout xmlns:a="http://schemas.openxmlformats.org/drawingml/2006/main" xmlns:r="http://schemas.openxmlformats.org/officeDocument/2006/relationships" xmlns:p="http://schemas.openxmlformats.org/presentationml/2006/main" type="vertTitleAndTx" preserve="1">
+  <p:cSld name="Vertical Title and Text">
+    <p:spTree>
+      <p:nvGrpSpPr>
+        <p:cNvPr id="1" name=""/>
+        <p:cNvGrpSpPr/>
+        <p:nvPr/>
+      </p:nvGrpSpPr>
+      <p:grpSpPr>
+        <a:xfrm>
+          <a:off x="0" y="0"/>
+          <a:ext cx="0" cy="0"/>
+          <a:chOff x="0" y="0"/>
+          <a:chExt cx="0" cy="0"/>
+        </a:xfrm>
+      </p:grpSpPr>
+      <p:sp>
+        <p:nvSpPr>
+          <p:cNvPr id="2" name="Vertical Title 1"/>
+          <p:cNvSpPr>
+            <a:spLocks noGrp="1"/>
+          </p:cNvSpPr>
+          <p:nvPr>
+            <p:ph type="title" orient="vert"/>
+          </p:nvPr>
+        </p:nvSpPr>
+        <p:spPr>
+          <a:xfrm>
+            <a:off x="6629400" y="274638"/>
+            <a:ext cx="2057400" cy="5851525"/>
+          </a:xfrm>
+        </p:spPr>
+        <p:txBody>
+          <a:bodyPr vert="eaVert"/>
+          <a:lstStyle/>
+          <a:p>
+            <a:r>
+              <a:rPr lang="en-US" smtClean="0"/>
+              <a:t>Click to edit Master title style</a:t>
+            </a:r>
+            <a:endParaRPr lang="en-GB"/>
+          </a:p>
+        </p:txBody>
+      </p:sp>
+      <p:sp>
+        <p:nvSpPr>
+          <p:cNvPr id="3" name="Vertical Text Placeholder 2"/>
+          <p:cNvSpPr>
+            <a:spLocks noGrp="1"/>
+          </p:cNvSpPr>
+          <p:nvPr>
+            <p:ph type="body" orient="vert" idx="1"/>
+          </p:nvPr>
+        </p:nvSpPr>
+        <p:spPr>
+          <a:xfrm>
+            <a:off x="457200" y="274638"/>
+            <a:ext cx="6019800" cy="5851525"/>
+          </a:xfrm>
+        </p:spPr>
+        <p:txBody>
+          <a:bodyPr vert="eaVert"/>
+          <a:lstStyle/>
+          <a:p>
+            <a:pPr lvl="0"/>
+            <a:r>
+              <a:rPr lang="en-US" smtClean="0"/>
+              <a:t>Click to edit Master text styles</a:t>
+            </a:r>
+          </a:p>
+          <a:p>
+            <a:pPr lvl="1"/>
+            <a:r>
+              <a:rPr lang="en-US" smtClean="0"/>
+              <a:t>Second level</a:t>
+            </a:r>
+          </a:p>
+          <a:p>
+            <a:pPr lvl="2"/>
+            <a:r>
+              <a:rPr lang="en-US" smtClean="0"/>
+              <a:t>Third level</a:t>
+            </a:r>
+          </a:p>
+          <a:p>
+            <a:pPr lvl="3"/>
+            <a:r>
+              <a:rPr lang="en-US" smtClean="0"/>
+              <a:t>Fourth level</a:t>
+            </a:r>
+          </a:p>
+          <a:p>
+            <a:pPr lvl="4"/>
+            <a:r>
+              <a:rPr lang="en-US" smtClean="0"/>
+              <a:t>Fifth level</a:t>
+            </a:r>
+            <a:endParaRPr lang="en-GB"/>
+          </a:p>
+        </p:txBody>
+      </p:sp>
+      <p:sp>
+        <p:nvSpPr>
+          <p:cNvPr id="4" name="Date Placeholder 3"/>
+          <p:cNvSpPr>
+            <a:spLocks noGrp="1"/>
+          </p:cNvSpPr>
+          <p:nvPr>
+            <p:ph type="dt" sz="half" idx="10"/>
+          </p:nvPr>
+        </p:nvSpPr>
+        <p:spPr/>
+        <p:txBody>
+          <a:bodyPr/>
+          <a:lstStyle/>
+          <a:p>
+            <a:fld id="{C8496DA1-00B0-4985-AB8C-C5A2D80474DD}" type="datetimeFigureOut">
+              <a:rPr lang="en-GB" smtClean="0">
+                <a:solidFill>
+                  <a:prstClr val="black">
+                    <a:tint val="75000"/>
+                  </a:prstClr>
+                </a:solidFill>
+              </a:rPr>
+              <a:pPr/>
+              <a:t>31/01/2018</a:t>
+            </a:fld>
+            <a:endParaRPr lang="en-GB">
+              <a:solidFill>
+                <a:prstClr val="black">
+                  <a:tint val="75000"/>
+                </a:prstClr>
+              </a:solidFill>
+            </a:endParaRPr>
+          </a:p>
+        </p:txBody>
+      </p:sp>
+      <p:sp>
+        <p:nvSpPr>
+          <p:cNvPr id="5" name="Footer Placeholder 4"/>
+          <p:cNvSpPr>
+            <a:spLocks noGrp="1"/>
+          </p:cNvSpPr>
+          <p:nvPr>
+            <p:ph type="ftr" sz="quarter" idx="11"/>
+          </p:nvPr>
+        </p:nvSpPr>
+        <p:spPr/>
+        <p:txBody>
+          <a:bodyPr/>
+          <a:lstStyle/>
+          <a:p>
+            <a:endParaRPr lang="en-GB">
+              <a:solidFill>
+                <a:prstClr val="black">
+                  <a:tint val="75000"/>
+                </a:prstClr>
+              </a:solidFill>
+            </a:endParaRPr>
+          </a:p>
+        </p:txBody>
+      </p:sp>
+      <p:sp>
+        <p:nvSpPr>
+          <p:cNvPr id="6" name="Slide Number Placeholder 5"/>
+          <p:cNvSpPr>
+            <a:spLocks noGrp="1"/>
+          </p:cNvSpPr>
+          <p:nvPr>
+            <p:ph type="sldNum" sz="quarter" idx="12"/>
+          </p:nvPr>
+        </p:nvSpPr>
+        <p:spPr/>
+        <p:txBody>
+          <a:bodyPr/>
+          <a:lstStyle/>
+          <a:p>
+            <a:fld id="{77F92139-D79D-436C-AFD0-4822DBC5A5CA}" type="slidenum">
+              <a:rPr lang="en-GB" smtClean="0">
+                <a:solidFill>
+                  <a:prstClr val="black">
+                    <a:tint val="75000"/>
+                  </a:prstClr>
+                </a:solidFill>
+              </a:rPr>
+              <a:pPr/>
+              <a:t>‹#›</a:t>
+            </a:fld>
+            <a:endParaRPr lang="en-GB">
+              <a:solidFill>
+                <a:prstClr val="black">
+                  <a:tint val="75000"/>
+                </a:prstClr>
+              </a:solidFill>
+            </a:endParaRPr>
+          </a:p>
+        </p:txBody>
+      </p:sp>
+    </p:spTree>
+    <p:extLst>
+      <p:ext uri="{BB962C8B-B14F-4D97-AF65-F5344CB8AC3E}">
+        <p14:creationId xmlns:p14="http://schemas.microsoft.com/office/powerpoint/2010/main" val="1501227261"/>
+      </p:ext>
+    </p:extLst>
+  </p:cSld>
+  <p:clrMapOvr>
+    <a:masterClrMapping/>
+  </p:clrMapOvr>
+</p:sldLayout>
+</file>
+
 <file path=ppt/slideLayouts/slideLayout2.xml><?xml version="1.0" encoding="utf-8"?>
 <p:sldLayout xmlns:a="http://schemas.openxmlformats.org/drawingml/2006/main" xmlns:r="http://schemas.openxmlformats.org/officeDocument/2006/relationships" xmlns:p="http://schemas.openxmlformats.org/presentationml/2006/main" preserve="1" userDrawn="1">
   <p:cSld name="Custom Layout">
@@ -2112,7 +3249,7 @@
           <a:p>
             <a:fld id="{90372C55-F32C-714E-85D4-4C85D67E2D89}" type="datetimeFigureOut">
               <a:rPr lang="en-US" smtClean="0"/>
-              <a:t>1/23/2018</a:t>
+              <a:t>1/31/2018</a:t>
             </a:fld>
             <a:endParaRPr lang="en-US"/>
           </a:p>
@@ -2180,6 +3317,1684 @@
     <p:extLst>
       <p:ext uri="{BB962C8B-B14F-4D97-AF65-F5344CB8AC3E}">
         <p14:creationId xmlns:p14="http://schemas.microsoft.com/office/powerpoint/2010/main" val="848143433"/>
+      </p:ext>
+    </p:extLst>
+  </p:cSld>
+  <p:clrMapOvr>
+    <a:masterClrMapping/>
+  </p:clrMapOvr>
+</p:sldLayout>
+</file>
+
+<file path=ppt/slideLayouts/slideLayout4.xml><?xml version="1.0" encoding="utf-8"?>
+<p:sldLayout xmlns:a="http://schemas.openxmlformats.org/drawingml/2006/main" xmlns:r="http://schemas.openxmlformats.org/officeDocument/2006/relationships" xmlns:p="http://schemas.openxmlformats.org/presentationml/2006/main" type="title" preserve="1">
+  <p:cSld name="Title Slide">
+    <p:spTree>
+      <p:nvGrpSpPr>
+        <p:cNvPr id="1" name=""/>
+        <p:cNvGrpSpPr/>
+        <p:nvPr/>
+      </p:nvGrpSpPr>
+      <p:grpSpPr>
+        <a:xfrm>
+          <a:off x="0" y="0"/>
+          <a:ext cx="0" cy="0"/>
+          <a:chOff x="0" y="0"/>
+          <a:chExt cx="0" cy="0"/>
+        </a:xfrm>
+      </p:grpSpPr>
+      <p:sp>
+        <p:nvSpPr>
+          <p:cNvPr id="2" name="Title 1"/>
+          <p:cNvSpPr>
+            <a:spLocks noGrp="1"/>
+          </p:cNvSpPr>
+          <p:nvPr>
+            <p:ph type="ctrTitle"/>
+          </p:nvPr>
+        </p:nvSpPr>
+        <p:spPr>
+          <a:xfrm>
+            <a:off x="685800" y="2130425"/>
+            <a:ext cx="7772400" cy="1470025"/>
+          </a:xfrm>
+        </p:spPr>
+        <p:txBody>
+          <a:bodyPr/>
+          <a:lstStyle/>
+          <a:p>
+            <a:r>
+              <a:rPr lang="en-US" smtClean="0"/>
+              <a:t>Click to edit Master title style</a:t>
+            </a:r>
+            <a:endParaRPr lang="en-GB"/>
+          </a:p>
+        </p:txBody>
+      </p:sp>
+      <p:sp>
+        <p:nvSpPr>
+          <p:cNvPr id="3" name="Subtitle 2"/>
+          <p:cNvSpPr>
+            <a:spLocks noGrp="1"/>
+          </p:cNvSpPr>
+          <p:nvPr>
+            <p:ph type="subTitle" idx="1"/>
+          </p:nvPr>
+        </p:nvSpPr>
+        <p:spPr>
+          <a:xfrm>
+            <a:off x="1371600" y="3886200"/>
+            <a:ext cx="6400800" cy="1752600"/>
+          </a:xfrm>
+        </p:spPr>
+        <p:txBody>
+          <a:bodyPr/>
+          <a:lstStyle>
+            <a:lvl1pPr marL="0" indent="0" algn="ctr">
+              <a:buNone/>
+              <a:defRPr>
+                <a:solidFill>
+                  <a:schemeClr val="tx1">
+                    <a:tint val="75000"/>
+                  </a:schemeClr>
+                </a:solidFill>
+              </a:defRPr>
+            </a:lvl1pPr>
+            <a:lvl2pPr marL="457200" indent="0" algn="ctr">
+              <a:buNone/>
+              <a:defRPr>
+                <a:solidFill>
+                  <a:schemeClr val="tx1">
+                    <a:tint val="75000"/>
+                  </a:schemeClr>
+                </a:solidFill>
+              </a:defRPr>
+            </a:lvl2pPr>
+            <a:lvl3pPr marL="914400" indent="0" algn="ctr">
+              <a:buNone/>
+              <a:defRPr>
+                <a:solidFill>
+                  <a:schemeClr val="tx1">
+                    <a:tint val="75000"/>
+                  </a:schemeClr>
+                </a:solidFill>
+              </a:defRPr>
+            </a:lvl3pPr>
+            <a:lvl4pPr marL="1371600" indent="0" algn="ctr">
+              <a:buNone/>
+              <a:defRPr>
+                <a:solidFill>
+                  <a:schemeClr val="tx1">
+                    <a:tint val="75000"/>
+                  </a:schemeClr>
+                </a:solidFill>
+              </a:defRPr>
+            </a:lvl4pPr>
+            <a:lvl5pPr marL="1828800" indent="0" algn="ctr">
+              <a:buNone/>
+              <a:defRPr>
+                <a:solidFill>
+                  <a:schemeClr val="tx1">
+                    <a:tint val="75000"/>
+                  </a:schemeClr>
+                </a:solidFill>
+              </a:defRPr>
+            </a:lvl5pPr>
+            <a:lvl6pPr marL="2286000" indent="0" algn="ctr">
+              <a:buNone/>
+              <a:defRPr>
+                <a:solidFill>
+                  <a:schemeClr val="tx1">
+                    <a:tint val="75000"/>
+                  </a:schemeClr>
+                </a:solidFill>
+              </a:defRPr>
+            </a:lvl6pPr>
+            <a:lvl7pPr marL="2743200" indent="0" algn="ctr">
+              <a:buNone/>
+              <a:defRPr>
+                <a:solidFill>
+                  <a:schemeClr val="tx1">
+                    <a:tint val="75000"/>
+                  </a:schemeClr>
+                </a:solidFill>
+              </a:defRPr>
+            </a:lvl7pPr>
+            <a:lvl8pPr marL="3200400" indent="0" algn="ctr">
+              <a:buNone/>
+              <a:defRPr>
+                <a:solidFill>
+                  <a:schemeClr val="tx1">
+                    <a:tint val="75000"/>
+                  </a:schemeClr>
+                </a:solidFill>
+              </a:defRPr>
+            </a:lvl8pPr>
+            <a:lvl9pPr marL="3657600" indent="0" algn="ctr">
+              <a:buNone/>
+              <a:defRPr>
+                <a:solidFill>
+                  <a:schemeClr val="tx1">
+                    <a:tint val="75000"/>
+                  </a:schemeClr>
+                </a:solidFill>
+              </a:defRPr>
+            </a:lvl9pPr>
+          </a:lstStyle>
+          <a:p>
+            <a:r>
+              <a:rPr lang="en-US" smtClean="0"/>
+              <a:t>Click to edit Master subtitle style</a:t>
+            </a:r>
+            <a:endParaRPr lang="en-GB"/>
+          </a:p>
+        </p:txBody>
+      </p:sp>
+      <p:sp>
+        <p:nvSpPr>
+          <p:cNvPr id="4" name="Date Placeholder 3"/>
+          <p:cNvSpPr>
+            <a:spLocks noGrp="1"/>
+          </p:cNvSpPr>
+          <p:nvPr>
+            <p:ph type="dt" sz="half" idx="10"/>
+          </p:nvPr>
+        </p:nvSpPr>
+        <p:spPr/>
+        <p:txBody>
+          <a:bodyPr/>
+          <a:lstStyle/>
+          <a:p>
+            <a:fld id="{C8496DA1-00B0-4985-AB8C-C5A2D80474DD}" type="datetimeFigureOut">
+              <a:rPr lang="en-GB" smtClean="0">
+                <a:solidFill>
+                  <a:prstClr val="black">
+                    <a:tint val="75000"/>
+                  </a:prstClr>
+                </a:solidFill>
+              </a:rPr>
+              <a:pPr/>
+              <a:t>31/01/2018</a:t>
+            </a:fld>
+            <a:endParaRPr lang="en-GB">
+              <a:solidFill>
+                <a:prstClr val="black">
+                  <a:tint val="75000"/>
+                </a:prstClr>
+              </a:solidFill>
+            </a:endParaRPr>
+          </a:p>
+        </p:txBody>
+      </p:sp>
+      <p:sp>
+        <p:nvSpPr>
+          <p:cNvPr id="5" name="Footer Placeholder 4"/>
+          <p:cNvSpPr>
+            <a:spLocks noGrp="1"/>
+          </p:cNvSpPr>
+          <p:nvPr>
+            <p:ph type="ftr" sz="quarter" idx="11"/>
+          </p:nvPr>
+        </p:nvSpPr>
+        <p:spPr/>
+        <p:txBody>
+          <a:bodyPr/>
+          <a:lstStyle/>
+          <a:p>
+            <a:endParaRPr lang="en-GB">
+              <a:solidFill>
+                <a:prstClr val="black">
+                  <a:tint val="75000"/>
+                </a:prstClr>
+              </a:solidFill>
+            </a:endParaRPr>
+          </a:p>
+        </p:txBody>
+      </p:sp>
+      <p:sp>
+        <p:nvSpPr>
+          <p:cNvPr id="6" name="Slide Number Placeholder 5"/>
+          <p:cNvSpPr>
+            <a:spLocks noGrp="1"/>
+          </p:cNvSpPr>
+          <p:nvPr>
+            <p:ph type="sldNum" sz="quarter" idx="12"/>
+          </p:nvPr>
+        </p:nvSpPr>
+        <p:spPr/>
+        <p:txBody>
+          <a:bodyPr/>
+          <a:lstStyle/>
+          <a:p>
+            <a:fld id="{77F92139-D79D-436C-AFD0-4822DBC5A5CA}" type="slidenum">
+              <a:rPr lang="en-GB" smtClean="0">
+                <a:solidFill>
+                  <a:prstClr val="black">
+                    <a:tint val="75000"/>
+                  </a:prstClr>
+                </a:solidFill>
+              </a:rPr>
+              <a:pPr/>
+              <a:t>‹#›</a:t>
+            </a:fld>
+            <a:endParaRPr lang="en-GB">
+              <a:solidFill>
+                <a:prstClr val="black">
+                  <a:tint val="75000"/>
+                </a:prstClr>
+              </a:solidFill>
+            </a:endParaRPr>
+          </a:p>
+        </p:txBody>
+      </p:sp>
+    </p:spTree>
+    <p:extLst>
+      <p:ext uri="{BB962C8B-B14F-4D97-AF65-F5344CB8AC3E}">
+        <p14:creationId xmlns:p14="http://schemas.microsoft.com/office/powerpoint/2010/main" val="2382163666"/>
+      </p:ext>
+    </p:extLst>
+  </p:cSld>
+  <p:clrMapOvr>
+    <a:masterClrMapping/>
+  </p:clrMapOvr>
+</p:sldLayout>
+</file>
+
+<file path=ppt/slideLayouts/slideLayout5.xml><?xml version="1.0" encoding="utf-8"?>
+<p:sldLayout xmlns:a="http://schemas.openxmlformats.org/drawingml/2006/main" xmlns:r="http://schemas.openxmlformats.org/officeDocument/2006/relationships" xmlns:p="http://schemas.openxmlformats.org/presentationml/2006/main" type="obj" preserve="1">
+  <p:cSld name="Title and Content">
+    <p:spTree>
+      <p:nvGrpSpPr>
+        <p:cNvPr id="1" name=""/>
+        <p:cNvGrpSpPr/>
+        <p:nvPr/>
+      </p:nvGrpSpPr>
+      <p:grpSpPr>
+        <a:xfrm>
+          <a:off x="0" y="0"/>
+          <a:ext cx="0" cy="0"/>
+          <a:chOff x="0" y="0"/>
+          <a:chExt cx="0" cy="0"/>
+        </a:xfrm>
+      </p:grpSpPr>
+      <p:sp>
+        <p:nvSpPr>
+          <p:cNvPr id="2" name="Title 1"/>
+          <p:cNvSpPr>
+            <a:spLocks noGrp="1"/>
+          </p:cNvSpPr>
+          <p:nvPr>
+            <p:ph type="title"/>
+          </p:nvPr>
+        </p:nvSpPr>
+        <p:spPr/>
+        <p:txBody>
+          <a:bodyPr/>
+          <a:lstStyle/>
+          <a:p>
+            <a:r>
+              <a:rPr lang="en-US" smtClean="0"/>
+              <a:t>Click to edit Master title style</a:t>
+            </a:r>
+            <a:endParaRPr lang="en-GB"/>
+          </a:p>
+        </p:txBody>
+      </p:sp>
+      <p:sp>
+        <p:nvSpPr>
+          <p:cNvPr id="3" name="Content Placeholder 2"/>
+          <p:cNvSpPr>
+            <a:spLocks noGrp="1"/>
+          </p:cNvSpPr>
+          <p:nvPr>
+            <p:ph idx="1"/>
+          </p:nvPr>
+        </p:nvSpPr>
+        <p:spPr/>
+        <p:txBody>
+          <a:bodyPr/>
+          <a:lstStyle/>
+          <a:p>
+            <a:pPr lvl="0"/>
+            <a:r>
+              <a:rPr lang="en-US" smtClean="0"/>
+              <a:t>Click to edit Master text styles</a:t>
+            </a:r>
+          </a:p>
+          <a:p>
+            <a:pPr lvl="1"/>
+            <a:r>
+              <a:rPr lang="en-US" smtClean="0"/>
+              <a:t>Second level</a:t>
+            </a:r>
+          </a:p>
+          <a:p>
+            <a:pPr lvl="2"/>
+            <a:r>
+              <a:rPr lang="en-US" smtClean="0"/>
+              <a:t>Third level</a:t>
+            </a:r>
+          </a:p>
+          <a:p>
+            <a:pPr lvl="3"/>
+            <a:r>
+              <a:rPr lang="en-US" smtClean="0"/>
+              <a:t>Fourth level</a:t>
+            </a:r>
+          </a:p>
+          <a:p>
+            <a:pPr lvl="4"/>
+            <a:r>
+              <a:rPr lang="en-US" smtClean="0"/>
+              <a:t>Fifth level</a:t>
+            </a:r>
+            <a:endParaRPr lang="en-GB"/>
+          </a:p>
+        </p:txBody>
+      </p:sp>
+      <p:sp>
+        <p:nvSpPr>
+          <p:cNvPr id="4" name="Date Placeholder 3"/>
+          <p:cNvSpPr>
+            <a:spLocks noGrp="1"/>
+          </p:cNvSpPr>
+          <p:nvPr>
+            <p:ph type="dt" sz="half" idx="10"/>
+          </p:nvPr>
+        </p:nvSpPr>
+        <p:spPr/>
+        <p:txBody>
+          <a:bodyPr/>
+          <a:lstStyle/>
+          <a:p>
+            <a:fld id="{C8496DA1-00B0-4985-AB8C-C5A2D80474DD}" type="datetimeFigureOut">
+              <a:rPr lang="en-GB" smtClean="0">
+                <a:solidFill>
+                  <a:prstClr val="black">
+                    <a:tint val="75000"/>
+                  </a:prstClr>
+                </a:solidFill>
+              </a:rPr>
+              <a:pPr/>
+              <a:t>31/01/2018</a:t>
+            </a:fld>
+            <a:endParaRPr lang="en-GB">
+              <a:solidFill>
+                <a:prstClr val="black">
+                  <a:tint val="75000"/>
+                </a:prstClr>
+              </a:solidFill>
+            </a:endParaRPr>
+          </a:p>
+        </p:txBody>
+      </p:sp>
+      <p:sp>
+        <p:nvSpPr>
+          <p:cNvPr id="5" name="Footer Placeholder 4"/>
+          <p:cNvSpPr>
+            <a:spLocks noGrp="1"/>
+          </p:cNvSpPr>
+          <p:nvPr>
+            <p:ph type="ftr" sz="quarter" idx="11"/>
+          </p:nvPr>
+        </p:nvSpPr>
+        <p:spPr/>
+        <p:txBody>
+          <a:bodyPr/>
+          <a:lstStyle/>
+          <a:p>
+            <a:endParaRPr lang="en-GB">
+              <a:solidFill>
+                <a:prstClr val="black">
+                  <a:tint val="75000"/>
+                </a:prstClr>
+              </a:solidFill>
+            </a:endParaRPr>
+          </a:p>
+        </p:txBody>
+      </p:sp>
+      <p:sp>
+        <p:nvSpPr>
+          <p:cNvPr id="6" name="Slide Number Placeholder 5"/>
+          <p:cNvSpPr>
+            <a:spLocks noGrp="1"/>
+          </p:cNvSpPr>
+          <p:nvPr>
+            <p:ph type="sldNum" sz="quarter" idx="12"/>
+          </p:nvPr>
+        </p:nvSpPr>
+        <p:spPr/>
+        <p:txBody>
+          <a:bodyPr/>
+          <a:lstStyle/>
+          <a:p>
+            <a:fld id="{77F92139-D79D-436C-AFD0-4822DBC5A5CA}" type="slidenum">
+              <a:rPr lang="en-GB" smtClean="0">
+                <a:solidFill>
+                  <a:prstClr val="black">
+                    <a:tint val="75000"/>
+                  </a:prstClr>
+                </a:solidFill>
+              </a:rPr>
+              <a:pPr/>
+              <a:t>‹#›</a:t>
+            </a:fld>
+            <a:endParaRPr lang="en-GB">
+              <a:solidFill>
+                <a:prstClr val="black">
+                  <a:tint val="75000"/>
+                </a:prstClr>
+              </a:solidFill>
+            </a:endParaRPr>
+          </a:p>
+        </p:txBody>
+      </p:sp>
+    </p:spTree>
+    <p:extLst>
+      <p:ext uri="{BB962C8B-B14F-4D97-AF65-F5344CB8AC3E}">
+        <p14:creationId xmlns:p14="http://schemas.microsoft.com/office/powerpoint/2010/main" val="399984365"/>
+      </p:ext>
+    </p:extLst>
+  </p:cSld>
+  <p:clrMapOvr>
+    <a:masterClrMapping/>
+  </p:clrMapOvr>
+</p:sldLayout>
+</file>
+
+<file path=ppt/slideLayouts/slideLayout6.xml><?xml version="1.0" encoding="utf-8"?>
+<p:sldLayout xmlns:a="http://schemas.openxmlformats.org/drawingml/2006/main" xmlns:r="http://schemas.openxmlformats.org/officeDocument/2006/relationships" xmlns:p="http://schemas.openxmlformats.org/presentationml/2006/main" type="secHead" preserve="1">
+  <p:cSld name="Section Header">
+    <p:spTree>
+      <p:nvGrpSpPr>
+        <p:cNvPr id="1" name=""/>
+        <p:cNvGrpSpPr/>
+        <p:nvPr/>
+      </p:nvGrpSpPr>
+      <p:grpSpPr>
+        <a:xfrm>
+          <a:off x="0" y="0"/>
+          <a:ext cx="0" cy="0"/>
+          <a:chOff x="0" y="0"/>
+          <a:chExt cx="0" cy="0"/>
+        </a:xfrm>
+      </p:grpSpPr>
+      <p:sp>
+        <p:nvSpPr>
+          <p:cNvPr id="2" name="Title 1"/>
+          <p:cNvSpPr>
+            <a:spLocks noGrp="1"/>
+          </p:cNvSpPr>
+          <p:nvPr>
+            <p:ph type="title"/>
+          </p:nvPr>
+        </p:nvSpPr>
+        <p:spPr>
+          <a:xfrm>
+            <a:off x="722313" y="4406900"/>
+            <a:ext cx="7772400" cy="1362075"/>
+          </a:xfrm>
+        </p:spPr>
+        <p:txBody>
+          <a:bodyPr anchor="t"/>
+          <a:lstStyle>
+            <a:lvl1pPr algn="l">
+              <a:defRPr sz="4000" b="1" cap="all"/>
+            </a:lvl1pPr>
+          </a:lstStyle>
+          <a:p>
+            <a:r>
+              <a:rPr lang="en-US" smtClean="0"/>
+              <a:t>Click to edit Master title style</a:t>
+            </a:r>
+            <a:endParaRPr lang="en-GB"/>
+          </a:p>
+        </p:txBody>
+      </p:sp>
+      <p:sp>
+        <p:nvSpPr>
+          <p:cNvPr id="3" name="Text Placeholder 2"/>
+          <p:cNvSpPr>
+            <a:spLocks noGrp="1"/>
+          </p:cNvSpPr>
+          <p:nvPr>
+            <p:ph type="body" idx="1"/>
+          </p:nvPr>
+        </p:nvSpPr>
+        <p:spPr>
+          <a:xfrm>
+            <a:off x="722313" y="2906713"/>
+            <a:ext cx="7772400" cy="1500187"/>
+          </a:xfrm>
+        </p:spPr>
+        <p:txBody>
+          <a:bodyPr anchor="b"/>
+          <a:lstStyle>
+            <a:lvl1pPr marL="0" indent="0">
+              <a:buNone/>
+              <a:defRPr sz="2000">
+                <a:solidFill>
+                  <a:schemeClr val="tx1">
+                    <a:tint val="75000"/>
+                  </a:schemeClr>
+                </a:solidFill>
+              </a:defRPr>
+            </a:lvl1pPr>
+            <a:lvl2pPr marL="457200" indent="0">
+              <a:buNone/>
+              <a:defRPr sz="1800">
+                <a:solidFill>
+                  <a:schemeClr val="tx1">
+                    <a:tint val="75000"/>
+                  </a:schemeClr>
+                </a:solidFill>
+              </a:defRPr>
+            </a:lvl2pPr>
+            <a:lvl3pPr marL="914400" indent="0">
+              <a:buNone/>
+              <a:defRPr sz="1600">
+                <a:solidFill>
+                  <a:schemeClr val="tx1">
+                    <a:tint val="75000"/>
+                  </a:schemeClr>
+                </a:solidFill>
+              </a:defRPr>
+            </a:lvl3pPr>
+            <a:lvl4pPr marL="1371600" indent="0">
+              <a:buNone/>
+              <a:defRPr sz="1400">
+                <a:solidFill>
+                  <a:schemeClr val="tx1">
+                    <a:tint val="75000"/>
+                  </a:schemeClr>
+                </a:solidFill>
+              </a:defRPr>
+            </a:lvl4pPr>
+            <a:lvl5pPr marL="1828800" indent="0">
+              <a:buNone/>
+              <a:defRPr sz="1400">
+                <a:solidFill>
+                  <a:schemeClr val="tx1">
+                    <a:tint val="75000"/>
+                  </a:schemeClr>
+                </a:solidFill>
+              </a:defRPr>
+            </a:lvl5pPr>
+            <a:lvl6pPr marL="2286000" indent="0">
+              <a:buNone/>
+              <a:defRPr sz="1400">
+                <a:solidFill>
+                  <a:schemeClr val="tx1">
+                    <a:tint val="75000"/>
+                  </a:schemeClr>
+                </a:solidFill>
+              </a:defRPr>
+            </a:lvl6pPr>
+            <a:lvl7pPr marL="2743200" indent="0">
+              <a:buNone/>
+              <a:defRPr sz="1400">
+                <a:solidFill>
+                  <a:schemeClr val="tx1">
+                    <a:tint val="75000"/>
+                  </a:schemeClr>
+                </a:solidFill>
+              </a:defRPr>
+            </a:lvl7pPr>
+            <a:lvl8pPr marL="3200400" indent="0">
+              <a:buNone/>
+              <a:defRPr sz="1400">
+                <a:solidFill>
+                  <a:schemeClr val="tx1">
+                    <a:tint val="75000"/>
+                  </a:schemeClr>
+                </a:solidFill>
+              </a:defRPr>
+            </a:lvl8pPr>
+            <a:lvl9pPr marL="3657600" indent="0">
+              <a:buNone/>
+              <a:defRPr sz="1400">
+                <a:solidFill>
+                  <a:schemeClr val="tx1">
+                    <a:tint val="75000"/>
+                  </a:schemeClr>
+                </a:solidFill>
+              </a:defRPr>
+            </a:lvl9pPr>
+          </a:lstStyle>
+          <a:p>
+            <a:pPr lvl="0"/>
+            <a:r>
+              <a:rPr lang="en-US" smtClean="0"/>
+              <a:t>Click to edit Master text styles</a:t>
+            </a:r>
+          </a:p>
+        </p:txBody>
+      </p:sp>
+      <p:sp>
+        <p:nvSpPr>
+          <p:cNvPr id="4" name="Date Placeholder 3"/>
+          <p:cNvSpPr>
+            <a:spLocks noGrp="1"/>
+          </p:cNvSpPr>
+          <p:nvPr>
+            <p:ph type="dt" sz="half" idx="10"/>
+          </p:nvPr>
+        </p:nvSpPr>
+        <p:spPr/>
+        <p:txBody>
+          <a:bodyPr/>
+          <a:lstStyle/>
+          <a:p>
+            <a:fld id="{C8496DA1-00B0-4985-AB8C-C5A2D80474DD}" type="datetimeFigureOut">
+              <a:rPr lang="en-GB" smtClean="0">
+                <a:solidFill>
+                  <a:prstClr val="black">
+                    <a:tint val="75000"/>
+                  </a:prstClr>
+                </a:solidFill>
+              </a:rPr>
+              <a:pPr/>
+              <a:t>31/01/2018</a:t>
+            </a:fld>
+            <a:endParaRPr lang="en-GB">
+              <a:solidFill>
+                <a:prstClr val="black">
+                  <a:tint val="75000"/>
+                </a:prstClr>
+              </a:solidFill>
+            </a:endParaRPr>
+          </a:p>
+        </p:txBody>
+      </p:sp>
+      <p:sp>
+        <p:nvSpPr>
+          <p:cNvPr id="5" name="Footer Placeholder 4"/>
+          <p:cNvSpPr>
+            <a:spLocks noGrp="1"/>
+          </p:cNvSpPr>
+          <p:nvPr>
+            <p:ph type="ftr" sz="quarter" idx="11"/>
+          </p:nvPr>
+        </p:nvSpPr>
+        <p:spPr/>
+        <p:txBody>
+          <a:bodyPr/>
+          <a:lstStyle/>
+          <a:p>
+            <a:endParaRPr lang="en-GB">
+              <a:solidFill>
+                <a:prstClr val="black">
+                  <a:tint val="75000"/>
+                </a:prstClr>
+              </a:solidFill>
+            </a:endParaRPr>
+          </a:p>
+        </p:txBody>
+      </p:sp>
+      <p:sp>
+        <p:nvSpPr>
+          <p:cNvPr id="6" name="Slide Number Placeholder 5"/>
+          <p:cNvSpPr>
+            <a:spLocks noGrp="1"/>
+          </p:cNvSpPr>
+          <p:nvPr>
+            <p:ph type="sldNum" sz="quarter" idx="12"/>
+          </p:nvPr>
+        </p:nvSpPr>
+        <p:spPr/>
+        <p:txBody>
+          <a:bodyPr/>
+          <a:lstStyle/>
+          <a:p>
+            <a:fld id="{77F92139-D79D-436C-AFD0-4822DBC5A5CA}" type="slidenum">
+              <a:rPr lang="en-GB" smtClean="0">
+                <a:solidFill>
+                  <a:prstClr val="black">
+                    <a:tint val="75000"/>
+                  </a:prstClr>
+                </a:solidFill>
+              </a:rPr>
+              <a:pPr/>
+              <a:t>‹#›</a:t>
+            </a:fld>
+            <a:endParaRPr lang="en-GB">
+              <a:solidFill>
+                <a:prstClr val="black">
+                  <a:tint val="75000"/>
+                </a:prstClr>
+              </a:solidFill>
+            </a:endParaRPr>
+          </a:p>
+        </p:txBody>
+      </p:sp>
+    </p:spTree>
+    <p:extLst>
+      <p:ext uri="{BB962C8B-B14F-4D97-AF65-F5344CB8AC3E}">
+        <p14:creationId xmlns:p14="http://schemas.microsoft.com/office/powerpoint/2010/main" val="748571119"/>
+      </p:ext>
+    </p:extLst>
+  </p:cSld>
+  <p:clrMapOvr>
+    <a:masterClrMapping/>
+  </p:clrMapOvr>
+</p:sldLayout>
+</file>
+
+<file path=ppt/slideLayouts/slideLayout7.xml><?xml version="1.0" encoding="utf-8"?>
+<p:sldLayout xmlns:a="http://schemas.openxmlformats.org/drawingml/2006/main" xmlns:r="http://schemas.openxmlformats.org/officeDocument/2006/relationships" xmlns:p="http://schemas.openxmlformats.org/presentationml/2006/main" type="twoObj" preserve="1">
+  <p:cSld name="Two Content">
+    <p:spTree>
+      <p:nvGrpSpPr>
+        <p:cNvPr id="1" name=""/>
+        <p:cNvGrpSpPr/>
+        <p:nvPr/>
+      </p:nvGrpSpPr>
+      <p:grpSpPr>
+        <a:xfrm>
+          <a:off x="0" y="0"/>
+          <a:ext cx="0" cy="0"/>
+          <a:chOff x="0" y="0"/>
+          <a:chExt cx="0" cy="0"/>
+        </a:xfrm>
+      </p:grpSpPr>
+      <p:sp>
+        <p:nvSpPr>
+          <p:cNvPr id="2" name="Title 1"/>
+          <p:cNvSpPr>
+            <a:spLocks noGrp="1"/>
+          </p:cNvSpPr>
+          <p:nvPr>
+            <p:ph type="title"/>
+          </p:nvPr>
+        </p:nvSpPr>
+        <p:spPr/>
+        <p:txBody>
+          <a:bodyPr/>
+          <a:lstStyle/>
+          <a:p>
+            <a:r>
+              <a:rPr lang="en-US" smtClean="0"/>
+              <a:t>Click to edit Master title style</a:t>
+            </a:r>
+            <a:endParaRPr lang="en-GB"/>
+          </a:p>
+        </p:txBody>
+      </p:sp>
+      <p:sp>
+        <p:nvSpPr>
+          <p:cNvPr id="3" name="Content Placeholder 2"/>
+          <p:cNvSpPr>
+            <a:spLocks noGrp="1"/>
+          </p:cNvSpPr>
+          <p:nvPr>
+            <p:ph sz="half" idx="1"/>
+          </p:nvPr>
+        </p:nvSpPr>
+        <p:spPr>
+          <a:xfrm>
+            <a:off x="457200" y="1600200"/>
+            <a:ext cx="4038600" cy="4525963"/>
+          </a:xfrm>
+        </p:spPr>
+        <p:txBody>
+          <a:bodyPr/>
+          <a:lstStyle>
+            <a:lvl1pPr>
+              <a:defRPr sz="2800"/>
+            </a:lvl1pPr>
+            <a:lvl2pPr>
+              <a:defRPr sz="2400"/>
+            </a:lvl2pPr>
+            <a:lvl3pPr>
+              <a:defRPr sz="2000"/>
+            </a:lvl3pPr>
+            <a:lvl4pPr>
+              <a:defRPr sz="1800"/>
+            </a:lvl4pPr>
+            <a:lvl5pPr>
+              <a:defRPr sz="1800"/>
+            </a:lvl5pPr>
+            <a:lvl6pPr>
+              <a:defRPr sz="1800"/>
+            </a:lvl6pPr>
+            <a:lvl7pPr>
+              <a:defRPr sz="1800"/>
+            </a:lvl7pPr>
+            <a:lvl8pPr>
+              <a:defRPr sz="1800"/>
+            </a:lvl8pPr>
+            <a:lvl9pPr>
+              <a:defRPr sz="1800"/>
+            </a:lvl9pPr>
+          </a:lstStyle>
+          <a:p>
+            <a:pPr lvl="0"/>
+            <a:r>
+              <a:rPr lang="en-US" smtClean="0"/>
+              <a:t>Click to edit Master text styles</a:t>
+            </a:r>
+          </a:p>
+          <a:p>
+            <a:pPr lvl="1"/>
+            <a:r>
+              <a:rPr lang="en-US" smtClean="0"/>
+              <a:t>Second level</a:t>
+            </a:r>
+          </a:p>
+          <a:p>
+            <a:pPr lvl="2"/>
+            <a:r>
+              <a:rPr lang="en-US" smtClean="0"/>
+              <a:t>Third level</a:t>
+            </a:r>
+          </a:p>
+          <a:p>
+            <a:pPr lvl="3"/>
+            <a:r>
+              <a:rPr lang="en-US" smtClean="0"/>
+              <a:t>Fourth level</a:t>
+            </a:r>
+          </a:p>
+          <a:p>
+            <a:pPr lvl="4"/>
+            <a:r>
+              <a:rPr lang="en-US" smtClean="0"/>
+              <a:t>Fifth level</a:t>
+            </a:r>
+            <a:endParaRPr lang="en-GB"/>
+          </a:p>
+        </p:txBody>
+      </p:sp>
+      <p:sp>
+        <p:nvSpPr>
+          <p:cNvPr id="4" name="Content Placeholder 3"/>
+          <p:cNvSpPr>
+            <a:spLocks noGrp="1"/>
+          </p:cNvSpPr>
+          <p:nvPr>
+            <p:ph sz="half" idx="2"/>
+          </p:nvPr>
+        </p:nvSpPr>
+        <p:spPr>
+          <a:xfrm>
+            <a:off x="4648200" y="1600200"/>
+            <a:ext cx="4038600" cy="4525963"/>
+          </a:xfrm>
+        </p:spPr>
+        <p:txBody>
+          <a:bodyPr/>
+          <a:lstStyle>
+            <a:lvl1pPr>
+              <a:defRPr sz="2800"/>
+            </a:lvl1pPr>
+            <a:lvl2pPr>
+              <a:defRPr sz="2400"/>
+            </a:lvl2pPr>
+            <a:lvl3pPr>
+              <a:defRPr sz="2000"/>
+            </a:lvl3pPr>
+            <a:lvl4pPr>
+              <a:defRPr sz="1800"/>
+            </a:lvl4pPr>
+            <a:lvl5pPr>
+              <a:defRPr sz="1800"/>
+            </a:lvl5pPr>
+            <a:lvl6pPr>
+              <a:defRPr sz="1800"/>
+            </a:lvl6pPr>
+            <a:lvl7pPr>
+              <a:defRPr sz="1800"/>
+            </a:lvl7pPr>
+            <a:lvl8pPr>
+              <a:defRPr sz="1800"/>
+            </a:lvl8pPr>
+            <a:lvl9pPr>
+              <a:defRPr sz="1800"/>
+            </a:lvl9pPr>
+          </a:lstStyle>
+          <a:p>
+            <a:pPr lvl="0"/>
+            <a:r>
+              <a:rPr lang="en-US" smtClean="0"/>
+              <a:t>Click to edit Master text styles</a:t>
+            </a:r>
+          </a:p>
+          <a:p>
+            <a:pPr lvl="1"/>
+            <a:r>
+              <a:rPr lang="en-US" smtClean="0"/>
+              <a:t>Second level</a:t>
+            </a:r>
+          </a:p>
+          <a:p>
+            <a:pPr lvl="2"/>
+            <a:r>
+              <a:rPr lang="en-US" smtClean="0"/>
+              <a:t>Third level</a:t>
+            </a:r>
+          </a:p>
+          <a:p>
+            <a:pPr lvl="3"/>
+            <a:r>
+              <a:rPr lang="en-US" smtClean="0"/>
+              <a:t>Fourth level</a:t>
+            </a:r>
+          </a:p>
+          <a:p>
+            <a:pPr lvl="4"/>
+            <a:r>
+              <a:rPr lang="en-US" smtClean="0"/>
+              <a:t>Fifth level</a:t>
+            </a:r>
+            <a:endParaRPr lang="en-GB"/>
+          </a:p>
+        </p:txBody>
+      </p:sp>
+      <p:sp>
+        <p:nvSpPr>
+          <p:cNvPr id="5" name="Date Placeholder 4"/>
+          <p:cNvSpPr>
+            <a:spLocks noGrp="1"/>
+          </p:cNvSpPr>
+          <p:nvPr>
+            <p:ph type="dt" sz="half" idx="10"/>
+          </p:nvPr>
+        </p:nvSpPr>
+        <p:spPr/>
+        <p:txBody>
+          <a:bodyPr/>
+          <a:lstStyle/>
+          <a:p>
+            <a:fld id="{C8496DA1-00B0-4985-AB8C-C5A2D80474DD}" type="datetimeFigureOut">
+              <a:rPr lang="en-GB" smtClean="0">
+                <a:solidFill>
+                  <a:prstClr val="black">
+                    <a:tint val="75000"/>
+                  </a:prstClr>
+                </a:solidFill>
+              </a:rPr>
+              <a:pPr/>
+              <a:t>31/01/2018</a:t>
+            </a:fld>
+            <a:endParaRPr lang="en-GB">
+              <a:solidFill>
+                <a:prstClr val="black">
+                  <a:tint val="75000"/>
+                </a:prstClr>
+              </a:solidFill>
+            </a:endParaRPr>
+          </a:p>
+        </p:txBody>
+      </p:sp>
+      <p:sp>
+        <p:nvSpPr>
+          <p:cNvPr id="6" name="Footer Placeholder 5"/>
+          <p:cNvSpPr>
+            <a:spLocks noGrp="1"/>
+          </p:cNvSpPr>
+          <p:nvPr>
+            <p:ph type="ftr" sz="quarter" idx="11"/>
+          </p:nvPr>
+        </p:nvSpPr>
+        <p:spPr/>
+        <p:txBody>
+          <a:bodyPr/>
+          <a:lstStyle/>
+          <a:p>
+            <a:endParaRPr lang="en-GB">
+              <a:solidFill>
+                <a:prstClr val="black">
+                  <a:tint val="75000"/>
+                </a:prstClr>
+              </a:solidFill>
+            </a:endParaRPr>
+          </a:p>
+        </p:txBody>
+      </p:sp>
+      <p:sp>
+        <p:nvSpPr>
+          <p:cNvPr id="7" name="Slide Number Placeholder 6"/>
+          <p:cNvSpPr>
+            <a:spLocks noGrp="1"/>
+          </p:cNvSpPr>
+          <p:nvPr>
+            <p:ph type="sldNum" sz="quarter" idx="12"/>
+          </p:nvPr>
+        </p:nvSpPr>
+        <p:spPr/>
+        <p:txBody>
+          <a:bodyPr/>
+          <a:lstStyle/>
+          <a:p>
+            <a:fld id="{77F92139-D79D-436C-AFD0-4822DBC5A5CA}" type="slidenum">
+              <a:rPr lang="en-GB" smtClean="0">
+                <a:solidFill>
+                  <a:prstClr val="black">
+                    <a:tint val="75000"/>
+                  </a:prstClr>
+                </a:solidFill>
+              </a:rPr>
+              <a:pPr/>
+              <a:t>‹#›</a:t>
+            </a:fld>
+            <a:endParaRPr lang="en-GB">
+              <a:solidFill>
+                <a:prstClr val="black">
+                  <a:tint val="75000"/>
+                </a:prstClr>
+              </a:solidFill>
+            </a:endParaRPr>
+          </a:p>
+        </p:txBody>
+      </p:sp>
+    </p:spTree>
+    <p:extLst>
+      <p:ext uri="{BB962C8B-B14F-4D97-AF65-F5344CB8AC3E}">
+        <p14:creationId xmlns:p14="http://schemas.microsoft.com/office/powerpoint/2010/main" val="3798983843"/>
+      </p:ext>
+    </p:extLst>
+  </p:cSld>
+  <p:clrMapOvr>
+    <a:masterClrMapping/>
+  </p:clrMapOvr>
+</p:sldLayout>
+</file>
+
+<file path=ppt/slideLayouts/slideLayout8.xml><?xml version="1.0" encoding="utf-8"?>
+<p:sldLayout xmlns:a="http://schemas.openxmlformats.org/drawingml/2006/main" xmlns:r="http://schemas.openxmlformats.org/officeDocument/2006/relationships" xmlns:p="http://schemas.openxmlformats.org/presentationml/2006/main" type="twoTxTwoObj" preserve="1">
+  <p:cSld name="Comparison">
+    <p:spTree>
+      <p:nvGrpSpPr>
+        <p:cNvPr id="1" name=""/>
+        <p:cNvGrpSpPr/>
+        <p:nvPr/>
+      </p:nvGrpSpPr>
+      <p:grpSpPr>
+        <a:xfrm>
+          <a:off x="0" y="0"/>
+          <a:ext cx="0" cy="0"/>
+          <a:chOff x="0" y="0"/>
+          <a:chExt cx="0" cy="0"/>
+        </a:xfrm>
+      </p:grpSpPr>
+      <p:sp>
+        <p:nvSpPr>
+          <p:cNvPr id="2" name="Title 1"/>
+          <p:cNvSpPr>
+            <a:spLocks noGrp="1"/>
+          </p:cNvSpPr>
+          <p:nvPr>
+            <p:ph type="title"/>
+          </p:nvPr>
+        </p:nvSpPr>
+        <p:spPr/>
+        <p:txBody>
+          <a:bodyPr/>
+          <a:lstStyle>
+            <a:lvl1pPr>
+              <a:defRPr/>
+            </a:lvl1pPr>
+          </a:lstStyle>
+          <a:p>
+            <a:r>
+              <a:rPr lang="en-US" smtClean="0"/>
+              <a:t>Click to edit Master title style</a:t>
+            </a:r>
+            <a:endParaRPr lang="en-GB"/>
+          </a:p>
+        </p:txBody>
+      </p:sp>
+      <p:sp>
+        <p:nvSpPr>
+          <p:cNvPr id="3" name="Text Placeholder 2"/>
+          <p:cNvSpPr>
+            <a:spLocks noGrp="1"/>
+          </p:cNvSpPr>
+          <p:nvPr>
+            <p:ph type="body" idx="1"/>
+          </p:nvPr>
+        </p:nvSpPr>
+        <p:spPr>
+          <a:xfrm>
+            <a:off x="457200" y="1535113"/>
+            <a:ext cx="4040188" cy="639762"/>
+          </a:xfrm>
+        </p:spPr>
+        <p:txBody>
+          <a:bodyPr anchor="b"/>
+          <a:lstStyle>
+            <a:lvl1pPr marL="0" indent="0">
+              <a:buNone/>
+              <a:defRPr sz="2400" b="1"/>
+            </a:lvl1pPr>
+            <a:lvl2pPr marL="457200" indent="0">
+              <a:buNone/>
+              <a:defRPr sz="2000" b="1"/>
+            </a:lvl2pPr>
+            <a:lvl3pPr marL="914400" indent="0">
+              <a:buNone/>
+              <a:defRPr sz="1800" b="1"/>
+            </a:lvl3pPr>
+            <a:lvl4pPr marL="1371600" indent="0">
+              <a:buNone/>
+              <a:defRPr sz="1600" b="1"/>
+            </a:lvl4pPr>
+            <a:lvl5pPr marL="1828800" indent="0">
+              <a:buNone/>
+              <a:defRPr sz="1600" b="1"/>
+            </a:lvl5pPr>
+            <a:lvl6pPr marL="2286000" indent="0">
+              <a:buNone/>
+              <a:defRPr sz="1600" b="1"/>
+            </a:lvl6pPr>
+            <a:lvl7pPr marL="2743200" indent="0">
+              <a:buNone/>
+              <a:defRPr sz="1600" b="1"/>
+            </a:lvl7pPr>
+            <a:lvl8pPr marL="3200400" indent="0">
+              <a:buNone/>
+              <a:defRPr sz="1600" b="1"/>
+            </a:lvl8pPr>
+            <a:lvl9pPr marL="3657600" indent="0">
+              <a:buNone/>
+              <a:defRPr sz="1600" b="1"/>
+            </a:lvl9pPr>
+          </a:lstStyle>
+          <a:p>
+            <a:pPr lvl="0"/>
+            <a:r>
+              <a:rPr lang="en-US" smtClean="0"/>
+              <a:t>Click to edit Master text styles</a:t>
+            </a:r>
+          </a:p>
+        </p:txBody>
+      </p:sp>
+      <p:sp>
+        <p:nvSpPr>
+          <p:cNvPr id="4" name="Content Placeholder 3"/>
+          <p:cNvSpPr>
+            <a:spLocks noGrp="1"/>
+          </p:cNvSpPr>
+          <p:nvPr>
+            <p:ph sz="half" idx="2"/>
+          </p:nvPr>
+        </p:nvSpPr>
+        <p:spPr>
+          <a:xfrm>
+            <a:off x="457200" y="2174875"/>
+            <a:ext cx="4040188" cy="3951288"/>
+          </a:xfrm>
+        </p:spPr>
+        <p:txBody>
+          <a:bodyPr/>
+          <a:lstStyle>
+            <a:lvl1pPr>
+              <a:defRPr sz="2400"/>
+            </a:lvl1pPr>
+            <a:lvl2pPr>
+              <a:defRPr sz="2000"/>
+            </a:lvl2pPr>
+            <a:lvl3pPr>
+              <a:defRPr sz="1800"/>
+            </a:lvl3pPr>
+            <a:lvl4pPr>
+              <a:defRPr sz="1600"/>
+            </a:lvl4pPr>
+            <a:lvl5pPr>
+              <a:defRPr sz="1600"/>
+            </a:lvl5pPr>
+            <a:lvl6pPr>
+              <a:defRPr sz="1600"/>
+            </a:lvl6pPr>
+            <a:lvl7pPr>
+              <a:defRPr sz="1600"/>
+            </a:lvl7pPr>
+            <a:lvl8pPr>
+              <a:defRPr sz="1600"/>
+            </a:lvl8pPr>
+            <a:lvl9pPr>
+              <a:defRPr sz="1600"/>
+            </a:lvl9pPr>
+          </a:lstStyle>
+          <a:p>
+            <a:pPr lvl="0"/>
+            <a:r>
+              <a:rPr lang="en-US" smtClean="0"/>
+              <a:t>Click to edit Master text styles</a:t>
+            </a:r>
+          </a:p>
+          <a:p>
+            <a:pPr lvl="1"/>
+            <a:r>
+              <a:rPr lang="en-US" smtClean="0"/>
+              <a:t>Second level</a:t>
+            </a:r>
+          </a:p>
+          <a:p>
+            <a:pPr lvl="2"/>
+            <a:r>
+              <a:rPr lang="en-US" smtClean="0"/>
+              <a:t>Third level</a:t>
+            </a:r>
+          </a:p>
+          <a:p>
+            <a:pPr lvl="3"/>
+            <a:r>
+              <a:rPr lang="en-US" smtClean="0"/>
+              <a:t>Fourth level</a:t>
+            </a:r>
+          </a:p>
+          <a:p>
+            <a:pPr lvl="4"/>
+            <a:r>
+              <a:rPr lang="en-US" smtClean="0"/>
+              <a:t>Fifth level</a:t>
+            </a:r>
+            <a:endParaRPr lang="en-GB"/>
+          </a:p>
+        </p:txBody>
+      </p:sp>
+      <p:sp>
+        <p:nvSpPr>
+          <p:cNvPr id="5" name="Text Placeholder 4"/>
+          <p:cNvSpPr>
+            <a:spLocks noGrp="1"/>
+          </p:cNvSpPr>
+          <p:nvPr>
+            <p:ph type="body" sz="quarter" idx="3"/>
+          </p:nvPr>
+        </p:nvSpPr>
+        <p:spPr>
+          <a:xfrm>
+            <a:off x="4645025" y="1535113"/>
+            <a:ext cx="4041775" cy="639762"/>
+          </a:xfrm>
+        </p:spPr>
+        <p:txBody>
+          <a:bodyPr anchor="b"/>
+          <a:lstStyle>
+            <a:lvl1pPr marL="0" indent="0">
+              <a:buNone/>
+              <a:defRPr sz="2400" b="1"/>
+            </a:lvl1pPr>
+            <a:lvl2pPr marL="457200" indent="0">
+              <a:buNone/>
+              <a:defRPr sz="2000" b="1"/>
+            </a:lvl2pPr>
+            <a:lvl3pPr marL="914400" indent="0">
+              <a:buNone/>
+              <a:defRPr sz="1800" b="1"/>
+            </a:lvl3pPr>
+            <a:lvl4pPr marL="1371600" indent="0">
+              <a:buNone/>
+              <a:defRPr sz="1600" b="1"/>
+            </a:lvl4pPr>
+            <a:lvl5pPr marL="1828800" indent="0">
+              <a:buNone/>
+              <a:defRPr sz="1600" b="1"/>
+            </a:lvl5pPr>
+            <a:lvl6pPr marL="2286000" indent="0">
+              <a:buNone/>
+              <a:defRPr sz="1600" b="1"/>
+            </a:lvl6pPr>
+            <a:lvl7pPr marL="2743200" indent="0">
+              <a:buNone/>
+              <a:defRPr sz="1600" b="1"/>
+            </a:lvl7pPr>
+            <a:lvl8pPr marL="3200400" indent="0">
+              <a:buNone/>
+              <a:defRPr sz="1600" b="1"/>
+            </a:lvl8pPr>
+            <a:lvl9pPr marL="3657600" indent="0">
+              <a:buNone/>
+              <a:defRPr sz="1600" b="1"/>
+            </a:lvl9pPr>
+          </a:lstStyle>
+          <a:p>
+            <a:pPr lvl="0"/>
+            <a:r>
+              <a:rPr lang="en-US" smtClean="0"/>
+              <a:t>Click to edit Master text styles</a:t>
+            </a:r>
+          </a:p>
+        </p:txBody>
+      </p:sp>
+      <p:sp>
+        <p:nvSpPr>
+          <p:cNvPr id="6" name="Content Placeholder 5"/>
+          <p:cNvSpPr>
+            <a:spLocks noGrp="1"/>
+          </p:cNvSpPr>
+          <p:nvPr>
+            <p:ph sz="quarter" idx="4"/>
+          </p:nvPr>
+        </p:nvSpPr>
+        <p:spPr>
+          <a:xfrm>
+            <a:off x="4645025" y="2174875"/>
+            <a:ext cx="4041775" cy="3951288"/>
+          </a:xfrm>
+        </p:spPr>
+        <p:txBody>
+          <a:bodyPr/>
+          <a:lstStyle>
+            <a:lvl1pPr>
+              <a:defRPr sz="2400"/>
+            </a:lvl1pPr>
+            <a:lvl2pPr>
+              <a:defRPr sz="2000"/>
+            </a:lvl2pPr>
+            <a:lvl3pPr>
+              <a:defRPr sz="1800"/>
+            </a:lvl3pPr>
+            <a:lvl4pPr>
+              <a:defRPr sz="1600"/>
+            </a:lvl4pPr>
+            <a:lvl5pPr>
+              <a:defRPr sz="1600"/>
+            </a:lvl5pPr>
+            <a:lvl6pPr>
+              <a:defRPr sz="1600"/>
+            </a:lvl6pPr>
+            <a:lvl7pPr>
+              <a:defRPr sz="1600"/>
+            </a:lvl7pPr>
+            <a:lvl8pPr>
+              <a:defRPr sz="1600"/>
+            </a:lvl8pPr>
+            <a:lvl9pPr>
+              <a:defRPr sz="1600"/>
+            </a:lvl9pPr>
+          </a:lstStyle>
+          <a:p>
+            <a:pPr lvl="0"/>
+            <a:r>
+              <a:rPr lang="en-US" smtClean="0"/>
+              <a:t>Click to edit Master text styles</a:t>
+            </a:r>
+          </a:p>
+          <a:p>
+            <a:pPr lvl="1"/>
+            <a:r>
+              <a:rPr lang="en-US" smtClean="0"/>
+              <a:t>Second level</a:t>
+            </a:r>
+          </a:p>
+          <a:p>
+            <a:pPr lvl="2"/>
+            <a:r>
+              <a:rPr lang="en-US" smtClean="0"/>
+              <a:t>Third level</a:t>
+            </a:r>
+          </a:p>
+          <a:p>
+            <a:pPr lvl="3"/>
+            <a:r>
+              <a:rPr lang="en-US" smtClean="0"/>
+              <a:t>Fourth level</a:t>
+            </a:r>
+          </a:p>
+          <a:p>
+            <a:pPr lvl="4"/>
+            <a:r>
+              <a:rPr lang="en-US" smtClean="0"/>
+              <a:t>Fifth level</a:t>
+            </a:r>
+            <a:endParaRPr lang="en-GB"/>
+          </a:p>
+        </p:txBody>
+      </p:sp>
+      <p:sp>
+        <p:nvSpPr>
+          <p:cNvPr id="7" name="Date Placeholder 6"/>
+          <p:cNvSpPr>
+            <a:spLocks noGrp="1"/>
+          </p:cNvSpPr>
+          <p:nvPr>
+            <p:ph type="dt" sz="half" idx="10"/>
+          </p:nvPr>
+        </p:nvSpPr>
+        <p:spPr/>
+        <p:txBody>
+          <a:bodyPr/>
+          <a:lstStyle/>
+          <a:p>
+            <a:fld id="{C8496DA1-00B0-4985-AB8C-C5A2D80474DD}" type="datetimeFigureOut">
+              <a:rPr lang="en-GB" smtClean="0">
+                <a:solidFill>
+                  <a:prstClr val="black">
+                    <a:tint val="75000"/>
+                  </a:prstClr>
+                </a:solidFill>
+              </a:rPr>
+              <a:pPr/>
+              <a:t>31/01/2018</a:t>
+            </a:fld>
+            <a:endParaRPr lang="en-GB">
+              <a:solidFill>
+                <a:prstClr val="black">
+                  <a:tint val="75000"/>
+                </a:prstClr>
+              </a:solidFill>
+            </a:endParaRPr>
+          </a:p>
+        </p:txBody>
+      </p:sp>
+      <p:sp>
+        <p:nvSpPr>
+          <p:cNvPr id="8" name="Footer Placeholder 7"/>
+          <p:cNvSpPr>
+            <a:spLocks noGrp="1"/>
+          </p:cNvSpPr>
+          <p:nvPr>
+            <p:ph type="ftr" sz="quarter" idx="11"/>
+          </p:nvPr>
+        </p:nvSpPr>
+        <p:spPr/>
+        <p:txBody>
+          <a:bodyPr/>
+          <a:lstStyle/>
+          <a:p>
+            <a:endParaRPr lang="en-GB">
+              <a:solidFill>
+                <a:prstClr val="black">
+                  <a:tint val="75000"/>
+                </a:prstClr>
+              </a:solidFill>
+            </a:endParaRPr>
+          </a:p>
+        </p:txBody>
+      </p:sp>
+      <p:sp>
+        <p:nvSpPr>
+          <p:cNvPr id="9" name="Slide Number Placeholder 8"/>
+          <p:cNvSpPr>
+            <a:spLocks noGrp="1"/>
+          </p:cNvSpPr>
+          <p:nvPr>
+            <p:ph type="sldNum" sz="quarter" idx="12"/>
+          </p:nvPr>
+        </p:nvSpPr>
+        <p:spPr/>
+        <p:txBody>
+          <a:bodyPr/>
+          <a:lstStyle/>
+          <a:p>
+            <a:fld id="{77F92139-D79D-436C-AFD0-4822DBC5A5CA}" type="slidenum">
+              <a:rPr lang="en-GB" smtClean="0">
+                <a:solidFill>
+                  <a:prstClr val="black">
+                    <a:tint val="75000"/>
+                  </a:prstClr>
+                </a:solidFill>
+              </a:rPr>
+              <a:pPr/>
+              <a:t>‹#›</a:t>
+            </a:fld>
+            <a:endParaRPr lang="en-GB">
+              <a:solidFill>
+                <a:prstClr val="black">
+                  <a:tint val="75000"/>
+                </a:prstClr>
+              </a:solidFill>
+            </a:endParaRPr>
+          </a:p>
+        </p:txBody>
+      </p:sp>
+    </p:spTree>
+    <p:extLst>
+      <p:ext uri="{BB962C8B-B14F-4D97-AF65-F5344CB8AC3E}">
+        <p14:creationId xmlns:p14="http://schemas.microsoft.com/office/powerpoint/2010/main" val="3918922660"/>
+      </p:ext>
+    </p:extLst>
+  </p:cSld>
+  <p:clrMapOvr>
+    <a:masterClrMapping/>
+  </p:clrMapOvr>
+</p:sldLayout>
+</file>
+
+<file path=ppt/slideLayouts/slideLayout9.xml><?xml version="1.0" encoding="utf-8"?>
+<p:sldLayout xmlns:a="http://schemas.openxmlformats.org/drawingml/2006/main" xmlns:r="http://schemas.openxmlformats.org/officeDocument/2006/relationships" xmlns:p="http://schemas.openxmlformats.org/presentationml/2006/main" type="titleOnly" preserve="1">
+  <p:cSld name="Title Only">
+    <p:spTree>
+      <p:nvGrpSpPr>
+        <p:cNvPr id="1" name=""/>
+        <p:cNvGrpSpPr/>
+        <p:nvPr/>
+      </p:nvGrpSpPr>
+      <p:grpSpPr>
+        <a:xfrm>
+          <a:off x="0" y="0"/>
+          <a:ext cx="0" cy="0"/>
+          <a:chOff x="0" y="0"/>
+          <a:chExt cx="0" cy="0"/>
+        </a:xfrm>
+      </p:grpSpPr>
+      <p:sp>
+        <p:nvSpPr>
+          <p:cNvPr id="2" name="Title 1"/>
+          <p:cNvSpPr>
+            <a:spLocks noGrp="1"/>
+          </p:cNvSpPr>
+          <p:nvPr>
+            <p:ph type="title"/>
+          </p:nvPr>
+        </p:nvSpPr>
+        <p:spPr/>
+        <p:txBody>
+          <a:bodyPr/>
+          <a:lstStyle/>
+          <a:p>
+            <a:r>
+              <a:rPr lang="en-US" smtClean="0"/>
+              <a:t>Click to edit Master title style</a:t>
+            </a:r>
+            <a:endParaRPr lang="en-GB"/>
+          </a:p>
+        </p:txBody>
+      </p:sp>
+      <p:sp>
+        <p:nvSpPr>
+          <p:cNvPr id="3" name="Date Placeholder 2"/>
+          <p:cNvSpPr>
+            <a:spLocks noGrp="1"/>
+          </p:cNvSpPr>
+          <p:nvPr>
+            <p:ph type="dt" sz="half" idx="10"/>
+          </p:nvPr>
+        </p:nvSpPr>
+        <p:spPr/>
+        <p:txBody>
+          <a:bodyPr/>
+          <a:lstStyle/>
+          <a:p>
+            <a:fld id="{C8496DA1-00B0-4985-AB8C-C5A2D80474DD}" type="datetimeFigureOut">
+              <a:rPr lang="en-GB" smtClean="0">
+                <a:solidFill>
+                  <a:prstClr val="black">
+                    <a:tint val="75000"/>
+                  </a:prstClr>
+                </a:solidFill>
+              </a:rPr>
+              <a:pPr/>
+              <a:t>31/01/2018</a:t>
+            </a:fld>
+            <a:endParaRPr lang="en-GB">
+              <a:solidFill>
+                <a:prstClr val="black">
+                  <a:tint val="75000"/>
+                </a:prstClr>
+              </a:solidFill>
+            </a:endParaRPr>
+          </a:p>
+        </p:txBody>
+      </p:sp>
+      <p:sp>
+        <p:nvSpPr>
+          <p:cNvPr id="4" name="Footer Placeholder 3"/>
+          <p:cNvSpPr>
+            <a:spLocks noGrp="1"/>
+          </p:cNvSpPr>
+          <p:nvPr>
+            <p:ph type="ftr" sz="quarter" idx="11"/>
+          </p:nvPr>
+        </p:nvSpPr>
+        <p:spPr/>
+        <p:txBody>
+          <a:bodyPr/>
+          <a:lstStyle/>
+          <a:p>
+            <a:endParaRPr lang="en-GB">
+              <a:solidFill>
+                <a:prstClr val="black">
+                  <a:tint val="75000"/>
+                </a:prstClr>
+              </a:solidFill>
+            </a:endParaRPr>
+          </a:p>
+        </p:txBody>
+      </p:sp>
+      <p:sp>
+        <p:nvSpPr>
+          <p:cNvPr id="5" name="Slide Number Placeholder 4"/>
+          <p:cNvSpPr>
+            <a:spLocks noGrp="1"/>
+          </p:cNvSpPr>
+          <p:nvPr>
+            <p:ph type="sldNum" sz="quarter" idx="12"/>
+          </p:nvPr>
+        </p:nvSpPr>
+        <p:spPr/>
+        <p:txBody>
+          <a:bodyPr/>
+          <a:lstStyle/>
+          <a:p>
+            <a:fld id="{77F92139-D79D-436C-AFD0-4822DBC5A5CA}" type="slidenum">
+              <a:rPr lang="en-GB" smtClean="0">
+                <a:solidFill>
+                  <a:prstClr val="black">
+                    <a:tint val="75000"/>
+                  </a:prstClr>
+                </a:solidFill>
+              </a:rPr>
+              <a:pPr/>
+              <a:t>‹#›</a:t>
+            </a:fld>
+            <a:endParaRPr lang="en-GB">
+              <a:solidFill>
+                <a:prstClr val="black">
+                  <a:tint val="75000"/>
+                </a:prstClr>
+              </a:solidFill>
+            </a:endParaRPr>
+          </a:p>
+        </p:txBody>
+      </p:sp>
+    </p:spTree>
+    <p:extLst>
+      <p:ext uri="{BB962C8B-B14F-4D97-AF65-F5344CB8AC3E}">
+        <p14:creationId xmlns:p14="http://schemas.microsoft.com/office/powerpoint/2010/main" val="3992288025"/>
       </p:ext>
     </p:extLst>
   </p:cSld>
@@ -2730,6 +5545,548 @@
 </p:sldMaster>
 </file>
 
+<file path=ppt/slideMasters/slideMaster2.xml><?xml version="1.0" encoding="utf-8"?>
+<p:sldMaster xmlns:a="http://schemas.openxmlformats.org/drawingml/2006/main" xmlns:r="http://schemas.openxmlformats.org/officeDocument/2006/relationships" xmlns:p="http://schemas.openxmlformats.org/presentationml/2006/main">
+  <p:cSld>
+    <p:bg>
+      <p:bgRef idx="1001">
+        <a:schemeClr val="bg1"/>
+      </p:bgRef>
+    </p:bg>
+    <p:spTree>
+      <p:nvGrpSpPr>
+        <p:cNvPr id="1" name=""/>
+        <p:cNvGrpSpPr/>
+        <p:nvPr/>
+      </p:nvGrpSpPr>
+      <p:grpSpPr>
+        <a:xfrm>
+          <a:off x="0" y="0"/>
+          <a:ext cx="0" cy="0"/>
+          <a:chOff x="0" y="0"/>
+          <a:chExt cx="0" cy="0"/>
+        </a:xfrm>
+      </p:grpSpPr>
+      <p:sp>
+        <p:nvSpPr>
+          <p:cNvPr id="2" name="Title Placeholder 1"/>
+          <p:cNvSpPr>
+            <a:spLocks noGrp="1"/>
+          </p:cNvSpPr>
+          <p:nvPr>
+            <p:ph type="title"/>
+          </p:nvPr>
+        </p:nvSpPr>
+        <p:spPr>
+          <a:xfrm>
+            <a:off x="457200" y="274638"/>
+            <a:ext cx="8229600" cy="1143000"/>
+          </a:xfrm>
+          <a:prstGeom prst="rect">
+            <a:avLst/>
+          </a:prstGeom>
+        </p:spPr>
+        <p:txBody>
+          <a:bodyPr vert="horz" lIns="91440" tIns="45720" rIns="91440" bIns="45720" rtlCol="0" anchor="ctr">
+            <a:normAutofit/>
+          </a:bodyPr>
+          <a:lstStyle/>
+          <a:p>
+            <a:r>
+              <a:rPr lang="en-US" smtClean="0"/>
+              <a:t>Click to edit Master title style</a:t>
+            </a:r>
+            <a:endParaRPr lang="en-GB"/>
+          </a:p>
+        </p:txBody>
+      </p:sp>
+      <p:sp>
+        <p:nvSpPr>
+          <p:cNvPr id="3" name="Text Placeholder 2"/>
+          <p:cNvSpPr>
+            <a:spLocks noGrp="1"/>
+          </p:cNvSpPr>
+          <p:nvPr>
+            <p:ph type="body" idx="1"/>
+          </p:nvPr>
+        </p:nvSpPr>
+        <p:spPr>
+          <a:xfrm>
+            <a:off x="457200" y="1600200"/>
+            <a:ext cx="8229600" cy="4525963"/>
+          </a:xfrm>
+          <a:prstGeom prst="rect">
+            <a:avLst/>
+          </a:prstGeom>
+        </p:spPr>
+        <p:txBody>
+          <a:bodyPr vert="horz" lIns="91440" tIns="45720" rIns="91440" bIns="45720" rtlCol="0">
+            <a:normAutofit/>
+          </a:bodyPr>
+          <a:lstStyle/>
+          <a:p>
+            <a:pPr lvl="0"/>
+            <a:r>
+              <a:rPr lang="en-US" smtClean="0"/>
+              <a:t>Click to edit Master text styles</a:t>
+            </a:r>
+          </a:p>
+          <a:p>
+            <a:pPr lvl="1"/>
+            <a:r>
+              <a:rPr lang="en-US" smtClean="0"/>
+              <a:t>Second level</a:t>
+            </a:r>
+          </a:p>
+          <a:p>
+            <a:pPr lvl="2"/>
+            <a:r>
+              <a:rPr lang="en-US" smtClean="0"/>
+              <a:t>Third level</a:t>
+            </a:r>
+          </a:p>
+          <a:p>
+            <a:pPr lvl="3"/>
+            <a:r>
+              <a:rPr lang="en-US" smtClean="0"/>
+              <a:t>Fourth level</a:t>
+            </a:r>
+          </a:p>
+          <a:p>
+            <a:pPr lvl="4"/>
+            <a:r>
+              <a:rPr lang="en-US" smtClean="0"/>
+              <a:t>Fifth level</a:t>
+            </a:r>
+            <a:endParaRPr lang="en-GB"/>
+          </a:p>
+        </p:txBody>
+      </p:sp>
+      <p:sp>
+        <p:nvSpPr>
+          <p:cNvPr id="4" name="Date Placeholder 3"/>
+          <p:cNvSpPr>
+            <a:spLocks noGrp="1"/>
+          </p:cNvSpPr>
+          <p:nvPr>
+            <p:ph type="dt" sz="half" idx="2"/>
+          </p:nvPr>
+        </p:nvSpPr>
+        <p:spPr>
+          <a:xfrm>
+            <a:off x="457200" y="6356350"/>
+            <a:ext cx="2133600" cy="365125"/>
+          </a:xfrm>
+          <a:prstGeom prst="rect">
+            <a:avLst/>
+          </a:prstGeom>
+        </p:spPr>
+        <p:txBody>
+          <a:bodyPr vert="horz" lIns="91440" tIns="45720" rIns="91440" bIns="45720" rtlCol="0" anchor="ctr"/>
+          <a:lstStyle>
+            <a:lvl1pPr algn="l">
+              <a:defRPr sz="1200">
+                <a:solidFill>
+                  <a:schemeClr val="tx1">
+                    <a:tint val="75000"/>
+                  </a:schemeClr>
+                </a:solidFill>
+              </a:defRPr>
+            </a:lvl1pPr>
+          </a:lstStyle>
+          <a:p>
+            <a:fld id="{C8496DA1-00B0-4985-AB8C-C5A2D80474DD}" type="datetimeFigureOut">
+              <a:rPr lang="en-GB" smtClean="0">
+                <a:solidFill>
+                  <a:prstClr val="black">
+                    <a:tint val="75000"/>
+                  </a:prstClr>
+                </a:solidFill>
+              </a:rPr>
+              <a:pPr/>
+              <a:t>31/01/2018</a:t>
+            </a:fld>
+            <a:endParaRPr lang="en-GB">
+              <a:solidFill>
+                <a:prstClr val="black">
+                  <a:tint val="75000"/>
+                </a:prstClr>
+              </a:solidFill>
+            </a:endParaRPr>
+          </a:p>
+        </p:txBody>
+      </p:sp>
+      <p:sp>
+        <p:nvSpPr>
+          <p:cNvPr id="5" name="Footer Placeholder 4"/>
+          <p:cNvSpPr>
+            <a:spLocks noGrp="1"/>
+          </p:cNvSpPr>
+          <p:nvPr>
+            <p:ph type="ftr" sz="quarter" idx="3"/>
+          </p:nvPr>
+        </p:nvSpPr>
+        <p:spPr>
+          <a:xfrm>
+            <a:off x="3124200" y="6356350"/>
+            <a:ext cx="2895600" cy="365125"/>
+          </a:xfrm>
+          <a:prstGeom prst="rect">
+            <a:avLst/>
+          </a:prstGeom>
+        </p:spPr>
+        <p:txBody>
+          <a:bodyPr vert="horz" lIns="91440" tIns="45720" rIns="91440" bIns="45720" rtlCol="0" anchor="ctr"/>
+          <a:lstStyle>
+            <a:lvl1pPr algn="ctr">
+              <a:defRPr sz="1200">
+                <a:solidFill>
+                  <a:schemeClr val="tx1">
+                    <a:tint val="75000"/>
+                  </a:schemeClr>
+                </a:solidFill>
+              </a:defRPr>
+            </a:lvl1pPr>
+          </a:lstStyle>
+          <a:p>
+            <a:endParaRPr lang="en-GB">
+              <a:solidFill>
+                <a:prstClr val="black">
+                  <a:tint val="75000"/>
+                </a:prstClr>
+              </a:solidFill>
+            </a:endParaRPr>
+          </a:p>
+        </p:txBody>
+      </p:sp>
+      <p:sp>
+        <p:nvSpPr>
+          <p:cNvPr id="6" name="Slide Number Placeholder 5"/>
+          <p:cNvSpPr>
+            <a:spLocks noGrp="1"/>
+          </p:cNvSpPr>
+          <p:nvPr>
+            <p:ph type="sldNum" sz="quarter" idx="4"/>
+          </p:nvPr>
+        </p:nvSpPr>
+        <p:spPr>
+          <a:xfrm>
+            <a:off x="6553200" y="6356350"/>
+            <a:ext cx="2133600" cy="365125"/>
+          </a:xfrm>
+          <a:prstGeom prst="rect">
+            <a:avLst/>
+          </a:prstGeom>
+        </p:spPr>
+        <p:txBody>
+          <a:bodyPr vert="horz" lIns="91440" tIns="45720" rIns="91440" bIns="45720" rtlCol="0" anchor="ctr"/>
+          <a:lstStyle>
+            <a:lvl1pPr algn="r">
+              <a:defRPr sz="1200">
+                <a:solidFill>
+                  <a:schemeClr val="tx1">
+                    <a:tint val="75000"/>
+                  </a:schemeClr>
+                </a:solidFill>
+              </a:defRPr>
+            </a:lvl1pPr>
+          </a:lstStyle>
+          <a:p>
+            <a:fld id="{77F92139-D79D-436C-AFD0-4822DBC5A5CA}" type="slidenum">
+              <a:rPr lang="en-GB" smtClean="0">
+                <a:solidFill>
+                  <a:prstClr val="black">
+                    <a:tint val="75000"/>
+                  </a:prstClr>
+                </a:solidFill>
+              </a:rPr>
+              <a:pPr/>
+              <a:t>‹#›</a:t>
+            </a:fld>
+            <a:endParaRPr lang="en-GB">
+              <a:solidFill>
+                <a:prstClr val="black">
+                  <a:tint val="75000"/>
+                </a:prstClr>
+              </a:solidFill>
+            </a:endParaRPr>
+          </a:p>
+        </p:txBody>
+      </p:sp>
+    </p:spTree>
+    <p:extLst>
+      <p:ext uri="{BB962C8B-B14F-4D97-AF65-F5344CB8AC3E}">
+        <p14:creationId xmlns:p14="http://schemas.microsoft.com/office/powerpoint/2010/main" val="1941409720"/>
+      </p:ext>
+    </p:extLst>
+  </p:cSld>
+  <p:clrMap bg1="lt1" tx1="dk1" bg2="lt2" tx2="dk2" accent1="accent1" accent2="accent2" accent3="accent3" accent4="accent4" accent5="accent5" accent6="accent6" hlink="hlink" folHlink="folHlink"/>
+  <p:sldLayoutIdLst>
+    <p:sldLayoutId id="2147483745" r:id="rId1"/>
+    <p:sldLayoutId id="2147483746" r:id="rId2"/>
+    <p:sldLayoutId id="2147483747" r:id="rId3"/>
+    <p:sldLayoutId id="2147483748" r:id="rId4"/>
+    <p:sldLayoutId id="2147483749" r:id="rId5"/>
+    <p:sldLayoutId id="2147483750" r:id="rId6"/>
+    <p:sldLayoutId id="2147483751" r:id="rId7"/>
+    <p:sldLayoutId id="2147483752" r:id="rId8"/>
+    <p:sldLayoutId id="2147483753" r:id="rId9"/>
+    <p:sldLayoutId id="2147483754" r:id="rId10"/>
+    <p:sldLayoutId id="2147483755" r:id="rId11"/>
+  </p:sldLayoutIdLst>
+  <p:txStyles>
+    <p:titleStyle>
+      <a:lvl1pPr algn="ctr" defTabSz="914400" rtl="0" eaLnBrk="1" latinLnBrk="0" hangingPunct="1">
+        <a:spcBef>
+          <a:spcPct val="0"/>
+        </a:spcBef>
+        <a:buNone/>
+        <a:defRPr sz="4400" kern="1200">
+          <a:solidFill>
+            <a:schemeClr val="tx1"/>
+          </a:solidFill>
+          <a:latin typeface="+mj-lt"/>
+          <a:ea typeface="+mj-ea"/>
+          <a:cs typeface="+mj-cs"/>
+        </a:defRPr>
+      </a:lvl1pPr>
+    </p:titleStyle>
+    <p:bodyStyle>
+      <a:lvl1pPr marL="342900" indent="-342900" algn="l" defTabSz="914400" rtl="0" eaLnBrk="1" latinLnBrk="0" hangingPunct="1">
+        <a:spcBef>
+          <a:spcPct val="20000"/>
+        </a:spcBef>
+        <a:buFont typeface="Arial" panose="020B0604020202020204" pitchFamily="34" charset="0"/>
+        <a:buChar char="•"/>
+        <a:defRPr sz="3200" kern="1200">
+          <a:solidFill>
+            <a:schemeClr val="tx1"/>
+          </a:solidFill>
+          <a:latin typeface="+mn-lt"/>
+          <a:ea typeface="+mn-ea"/>
+          <a:cs typeface="+mn-cs"/>
+        </a:defRPr>
+      </a:lvl1pPr>
+      <a:lvl2pPr marL="742950" indent="-285750" algn="l" defTabSz="914400" rtl="0" eaLnBrk="1" latinLnBrk="0" hangingPunct="1">
+        <a:spcBef>
+          <a:spcPct val="20000"/>
+        </a:spcBef>
+        <a:buFont typeface="Arial" panose="020B0604020202020204" pitchFamily="34" charset="0"/>
+        <a:buChar char="–"/>
+        <a:defRPr sz="2800" kern="1200">
+          <a:solidFill>
+            <a:schemeClr val="tx1"/>
+          </a:solidFill>
+          <a:latin typeface="+mn-lt"/>
+          <a:ea typeface="+mn-ea"/>
+          <a:cs typeface="+mn-cs"/>
+        </a:defRPr>
+      </a:lvl2pPr>
+      <a:lvl3pPr marL="1143000" indent="-228600" algn="l" defTabSz="914400" rtl="0" eaLnBrk="1" latinLnBrk="0" hangingPunct="1">
+        <a:spcBef>
+          <a:spcPct val="20000"/>
+        </a:spcBef>
+        <a:buFont typeface="Arial" panose="020B0604020202020204" pitchFamily="34" charset="0"/>
+        <a:buChar char="•"/>
+        <a:defRPr sz="2400" kern="1200">
+          <a:solidFill>
+            <a:schemeClr val="tx1"/>
+          </a:solidFill>
+          <a:latin typeface="+mn-lt"/>
+          <a:ea typeface="+mn-ea"/>
+          <a:cs typeface="+mn-cs"/>
+        </a:defRPr>
+      </a:lvl3pPr>
+      <a:lvl4pPr marL="1600200" indent="-228600" algn="l" defTabSz="914400" rtl="0" eaLnBrk="1" latinLnBrk="0" hangingPunct="1">
+        <a:spcBef>
+          <a:spcPct val="20000"/>
+        </a:spcBef>
+        <a:buFont typeface="Arial" panose="020B0604020202020204" pitchFamily="34" charset="0"/>
+        <a:buChar char="–"/>
+        <a:defRPr sz="2000" kern="1200">
+          <a:solidFill>
+            <a:schemeClr val="tx1"/>
+          </a:solidFill>
+          <a:latin typeface="+mn-lt"/>
+          <a:ea typeface="+mn-ea"/>
+          <a:cs typeface="+mn-cs"/>
+        </a:defRPr>
+      </a:lvl4pPr>
+      <a:lvl5pPr marL="2057400" indent="-228600" algn="l" defTabSz="914400" rtl="0" eaLnBrk="1" latinLnBrk="0" hangingPunct="1">
+        <a:spcBef>
+          <a:spcPct val="20000"/>
+        </a:spcBef>
+        <a:buFont typeface="Arial" panose="020B0604020202020204" pitchFamily="34" charset="0"/>
+        <a:buChar char="»"/>
+        <a:defRPr sz="2000" kern="1200">
+          <a:solidFill>
+            <a:schemeClr val="tx1"/>
+          </a:solidFill>
+          <a:latin typeface="+mn-lt"/>
+          <a:ea typeface="+mn-ea"/>
+          <a:cs typeface="+mn-cs"/>
+        </a:defRPr>
+      </a:lvl5pPr>
+      <a:lvl6pPr marL="2514600" indent="-228600" algn="l" defTabSz="914400" rtl="0" eaLnBrk="1" latinLnBrk="0" hangingPunct="1">
+        <a:spcBef>
+          <a:spcPct val="20000"/>
+        </a:spcBef>
+        <a:buFont typeface="Arial" panose="020B0604020202020204" pitchFamily="34" charset="0"/>
+        <a:buChar char="•"/>
+        <a:defRPr sz="2000" kern="1200">
+          <a:solidFill>
+            <a:schemeClr val="tx1"/>
+          </a:solidFill>
+          <a:latin typeface="+mn-lt"/>
+          <a:ea typeface="+mn-ea"/>
+          <a:cs typeface="+mn-cs"/>
+        </a:defRPr>
+      </a:lvl6pPr>
+      <a:lvl7pPr marL="2971800" indent="-228600" algn="l" defTabSz="914400" rtl="0" eaLnBrk="1" latinLnBrk="0" hangingPunct="1">
+        <a:spcBef>
+          <a:spcPct val="20000"/>
+        </a:spcBef>
+        <a:buFont typeface="Arial" panose="020B0604020202020204" pitchFamily="34" charset="0"/>
+        <a:buChar char="•"/>
+        <a:defRPr sz="2000" kern="1200">
+          <a:solidFill>
+            <a:schemeClr val="tx1"/>
+          </a:solidFill>
+          <a:latin typeface="+mn-lt"/>
+          <a:ea typeface="+mn-ea"/>
+          <a:cs typeface="+mn-cs"/>
+        </a:defRPr>
+      </a:lvl7pPr>
+      <a:lvl8pPr marL="3429000" indent="-228600" algn="l" defTabSz="914400" rtl="0" eaLnBrk="1" latinLnBrk="0" hangingPunct="1">
+        <a:spcBef>
+          <a:spcPct val="20000"/>
+        </a:spcBef>
+        <a:buFont typeface="Arial" panose="020B0604020202020204" pitchFamily="34" charset="0"/>
+        <a:buChar char="•"/>
+        <a:defRPr sz="2000" kern="1200">
+          <a:solidFill>
+            <a:schemeClr val="tx1"/>
+          </a:solidFill>
+          <a:latin typeface="+mn-lt"/>
+          <a:ea typeface="+mn-ea"/>
+          <a:cs typeface="+mn-cs"/>
+        </a:defRPr>
+      </a:lvl8pPr>
+      <a:lvl9pPr marL="3886200" indent="-228600" algn="l" defTabSz="914400" rtl="0" eaLnBrk="1" latinLnBrk="0" hangingPunct="1">
+        <a:spcBef>
+          <a:spcPct val="20000"/>
+        </a:spcBef>
+        <a:buFont typeface="Arial" panose="020B0604020202020204" pitchFamily="34" charset="0"/>
+        <a:buChar char="•"/>
+        <a:defRPr sz="2000" kern="1200">
+          <a:solidFill>
+            <a:schemeClr val="tx1"/>
+          </a:solidFill>
+          <a:latin typeface="+mn-lt"/>
+          <a:ea typeface="+mn-ea"/>
+          <a:cs typeface="+mn-cs"/>
+        </a:defRPr>
+      </a:lvl9pPr>
+    </p:bodyStyle>
+    <p:otherStyle>
+      <a:defPPr>
+        <a:defRPr lang="en-US"/>
+      </a:defPPr>
+      <a:lvl1pPr marL="0" algn="l" defTabSz="914400" rtl="0" eaLnBrk="1" latinLnBrk="0" hangingPunct="1">
+        <a:defRPr sz="1800" kern="1200">
+          <a:solidFill>
+            <a:schemeClr val="tx1"/>
+          </a:solidFill>
+          <a:latin typeface="+mn-lt"/>
+          <a:ea typeface="+mn-ea"/>
+          <a:cs typeface="+mn-cs"/>
+        </a:defRPr>
+      </a:lvl1pPr>
+      <a:lvl2pPr marL="457200" algn="l" defTabSz="914400" rtl="0" eaLnBrk="1" latinLnBrk="0" hangingPunct="1">
+        <a:defRPr sz="1800" kern="1200">
+          <a:solidFill>
+            <a:schemeClr val="tx1"/>
+          </a:solidFill>
+          <a:latin typeface="+mn-lt"/>
+          <a:ea typeface="+mn-ea"/>
+          <a:cs typeface="+mn-cs"/>
+        </a:defRPr>
+      </a:lvl2pPr>
+      <a:lvl3pPr marL="914400" algn="l" defTabSz="914400" rtl="0" eaLnBrk="1" latinLnBrk="0" hangingPunct="1">
+        <a:defRPr sz="1800" kern="1200">
+          <a:solidFill>
+            <a:schemeClr val="tx1"/>
+          </a:solidFill>
+          <a:latin typeface="+mn-lt"/>
+          <a:ea typeface="+mn-ea"/>
+          <a:cs typeface="+mn-cs"/>
+        </a:defRPr>
+      </a:lvl3pPr>
+      <a:lvl4pPr marL="1371600" algn="l" defTabSz="914400" rtl="0" eaLnBrk="1" latinLnBrk="0" hangingPunct="1">
+        <a:defRPr sz="1800" kern="1200">
+          <a:solidFill>
+            <a:schemeClr val="tx1"/>
+          </a:solidFill>
+          <a:latin typeface="+mn-lt"/>
+          <a:ea typeface="+mn-ea"/>
+          <a:cs typeface="+mn-cs"/>
+        </a:defRPr>
+      </a:lvl4pPr>
+      <a:lvl5pPr marL="1828800" algn="l" defTabSz="914400" rtl="0" eaLnBrk="1" latinLnBrk="0" hangingPunct="1">
+        <a:defRPr sz="1800" kern="1200">
+          <a:solidFill>
+            <a:schemeClr val="tx1"/>
+          </a:solidFill>
+          <a:latin typeface="+mn-lt"/>
+          <a:ea typeface="+mn-ea"/>
+          <a:cs typeface="+mn-cs"/>
+        </a:defRPr>
+      </a:lvl5pPr>
+      <a:lvl6pPr marL="2286000" algn="l" defTabSz="914400" rtl="0" eaLnBrk="1" latinLnBrk="0" hangingPunct="1">
+        <a:defRPr sz="1800" kern="1200">
+          <a:solidFill>
+            <a:schemeClr val="tx1"/>
+          </a:solidFill>
+          <a:latin typeface="+mn-lt"/>
+          <a:ea typeface="+mn-ea"/>
+          <a:cs typeface="+mn-cs"/>
+        </a:defRPr>
+      </a:lvl6pPr>
+      <a:lvl7pPr marL="2743200" algn="l" defTabSz="914400" rtl="0" eaLnBrk="1" latinLnBrk="0" hangingPunct="1">
+        <a:defRPr sz="1800" kern="1200">
+          <a:solidFill>
+            <a:schemeClr val="tx1"/>
+          </a:solidFill>
+          <a:latin typeface="+mn-lt"/>
+          <a:ea typeface="+mn-ea"/>
+          <a:cs typeface="+mn-cs"/>
+        </a:defRPr>
+      </a:lvl7pPr>
+      <a:lvl8pPr marL="3200400" algn="l" defTabSz="914400" rtl="0" eaLnBrk="1" latinLnBrk="0" hangingPunct="1">
+        <a:defRPr sz="1800" kern="1200">
+          <a:solidFill>
+            <a:schemeClr val="tx1"/>
+          </a:solidFill>
+          <a:latin typeface="+mn-lt"/>
+          <a:ea typeface="+mn-ea"/>
+          <a:cs typeface="+mn-cs"/>
+        </a:defRPr>
+      </a:lvl8pPr>
+      <a:lvl9pPr marL="3657600" algn="l" defTabSz="914400" rtl="0" eaLnBrk="1" latinLnBrk="0" hangingPunct="1">
+        <a:defRPr sz="1800" kern="1200">
+          <a:solidFill>
+            <a:schemeClr val="tx1"/>
+          </a:solidFill>
+          <a:latin typeface="+mn-lt"/>
+          <a:ea typeface="+mn-ea"/>
+          <a:cs typeface="+mn-cs"/>
+        </a:defRPr>
+      </a:lvl9pPr>
+    </p:otherStyle>
+  </p:txStyles>
+</p:sldMaster>
+</file>
+
 <file path=ppt/slides/slide1.xml><?xml version="1.0" encoding="utf-8"?>
 <p:sld xmlns:a="http://schemas.openxmlformats.org/drawingml/2006/main" xmlns:r="http://schemas.openxmlformats.org/officeDocument/2006/relationships" xmlns:p="http://schemas.openxmlformats.org/presentationml/2006/main">
   <p:cSld>
@@ -2767,6 +6124,13 @@
           <a:bodyPr anchor="t" anchorCtr="0"/>
           <a:lstStyle/>
           <a:p>
+            <a:r>
+              <a:rPr lang="en-US" sz="6000" dirty="0">
+                <a:latin typeface="Helvetica"/>
+                <a:cs typeface="Helvetica"/>
+              </a:rPr>
+              <a:t/>
+            </a:r>
             <a:br>
               <a:rPr lang="en-US" sz="6000" dirty="0">
                 <a:latin typeface="Helvetica"/>
@@ -2780,15 +6144,31 @@
               </a:rPr>
               <a:t>Software Carpentry</a:t>
             </a:r>
+            <a:r>
+              <a:rPr lang="en-US" sz="1800" dirty="0"/>
+              <a:t/>
+            </a:r>
             <a:br>
               <a:rPr lang="en-US" sz="1800" dirty="0"/>
             </a:br>
+            <a:r>
+              <a:rPr lang="en-US" sz="1800" dirty="0"/>
+              <a:t/>
+            </a:r>
             <a:br>
               <a:rPr lang="en-US" sz="1800" dirty="0"/>
             </a:br>
+            <a:r>
+              <a:rPr lang="en-US" sz="1800" dirty="0"/>
+              <a:t/>
+            </a:r>
             <a:br>
               <a:rPr lang="en-US" sz="1800" dirty="0"/>
             </a:br>
+            <a:r>
+              <a:rPr lang="en-US" sz="1800" dirty="0"/>
+              <a:t/>
+            </a:r>
             <a:br>
               <a:rPr lang="en-US" sz="1800" dirty="0"/>
             </a:br>
@@ -2809,6 +6189,10 @@
             <a:r>
               <a:rPr lang="en-GB" sz="3200" dirty="0"/>
               <a:t>8-9 March 2018</a:t>
+            </a:r>
+            <a:r>
+              <a:rPr lang="en-GB" sz="2400" dirty="0"/>
+              <a:t/>
             </a:r>
             <a:br>
               <a:rPr lang="en-GB" sz="2400" dirty="0"/>
@@ -2822,7 +6206,7 @@
           <p:cNvPr id="2056" name="Picture 8" descr="https://hpcarcher.github.io/2017-12-11-Imperial/img/software-carpentry-large.png">
             <a:extLst>
               <a:ext uri="{FF2B5EF4-FFF2-40B4-BE49-F238E27FC236}">
-                <a16:creationId xmlns:a16="http://schemas.microsoft.com/office/drawing/2014/main" id="{BC901FCD-191D-4E48-9224-7B99E983908A}"/>
+                <a16:creationId xmlns:a16="http://schemas.microsoft.com/office/drawing/2014/main" xmlns="" id="{BC901FCD-191D-4E48-9224-7B99E983908A}"/>
               </a:ext>
             </a:extLst>
           </p:cNvPr>
@@ -2862,7 +6246,7 @@
           <p:cNvPr id="8" name="Picture 7" descr="BetterSoftwareStickerImage.jpg">
             <a:extLst>
               <a:ext uri="{FF2B5EF4-FFF2-40B4-BE49-F238E27FC236}">
-                <a16:creationId xmlns:a16="http://schemas.microsoft.com/office/drawing/2014/main" id="{538D1416-BCEC-4E45-A727-C22B9F0924F0}"/>
+                <a16:creationId xmlns:a16="http://schemas.microsoft.com/office/drawing/2014/main" xmlns="" id="{538D1416-BCEC-4E45-A727-C22B9F0924F0}"/>
               </a:ext>
             </a:extLst>
           </p:cNvPr>
@@ -3003,7 +6387,7 @@
           <p:cNvPr id="2" name="Title 1">
             <a:extLst>
               <a:ext uri="{FF2B5EF4-FFF2-40B4-BE49-F238E27FC236}">
-                <a16:creationId xmlns:a16="http://schemas.microsoft.com/office/drawing/2014/main" id="{35C1724E-F97B-40BE-82E4-B29342DF35D7}"/>
+                <a16:creationId xmlns:a16="http://schemas.microsoft.com/office/drawing/2014/main" xmlns="" id="{35C1724E-F97B-40BE-82E4-B29342DF35D7}"/>
               </a:ext>
             </a:extLst>
           </p:cNvPr>
@@ -3028,7 +6412,7 @@
           <p:cNvPr id="3" name="Content Placeholder 2">
             <a:extLst>
               <a:ext uri="{FF2B5EF4-FFF2-40B4-BE49-F238E27FC236}">
-                <a16:creationId xmlns:a16="http://schemas.microsoft.com/office/drawing/2014/main" id="{A660F5C2-8A54-4B60-98B0-5AADAAE94534}"/>
+                <a16:creationId xmlns:a16="http://schemas.microsoft.com/office/drawing/2014/main" xmlns="" id="{A660F5C2-8A54-4B60-98B0-5AADAAE94534}"/>
               </a:ext>
             </a:extLst>
           </p:cNvPr>
@@ -3083,7 +6467,7 @@
           <p:cNvPr id="2" name="Title 1">
             <a:extLst>
               <a:ext uri="{FF2B5EF4-FFF2-40B4-BE49-F238E27FC236}">
-                <a16:creationId xmlns:a16="http://schemas.microsoft.com/office/drawing/2014/main" id="{A54344FB-A27D-4B84-A6C7-D361547140C6}"/>
+                <a16:creationId xmlns:a16="http://schemas.microsoft.com/office/drawing/2014/main" xmlns="" id="{A54344FB-A27D-4B84-A6C7-D361547140C6}"/>
               </a:ext>
             </a:extLst>
           </p:cNvPr>
@@ -3108,7 +6492,7 @@
           <p:cNvPr id="7" name="TextBox 8">
             <a:extLst>
               <a:ext uri="{FF2B5EF4-FFF2-40B4-BE49-F238E27FC236}">
-                <a16:creationId xmlns:a16="http://schemas.microsoft.com/office/drawing/2014/main" id="{D815040F-54E3-4DC1-AEA7-6A960A1118F1}"/>
+                <a16:creationId xmlns:a16="http://schemas.microsoft.com/office/drawing/2014/main" xmlns="" id="{D815040F-54E3-4DC1-AEA7-6A960A1118F1}"/>
               </a:ext>
             </a:extLst>
           </p:cNvPr>
@@ -3330,7 +6714,7 @@
           <p:cNvPr id="6" name="Picture 5">
             <a:extLst>
               <a:ext uri="{FF2B5EF4-FFF2-40B4-BE49-F238E27FC236}">
-                <a16:creationId xmlns:a16="http://schemas.microsoft.com/office/drawing/2014/main" id="{48BB4C2B-97C1-49F6-8018-F858C3F26A42}"/>
+                <a16:creationId xmlns:a16="http://schemas.microsoft.com/office/drawing/2014/main" xmlns="" id="{48BB4C2B-97C1-49F6-8018-F858C3F26A42}"/>
               </a:ext>
             </a:extLst>
           </p:cNvPr>
@@ -4387,7 +7771,7 @@
           <p:cNvPr id="2" name="Title 1">
             <a:extLst>
               <a:ext uri="{FF2B5EF4-FFF2-40B4-BE49-F238E27FC236}">
-                <a16:creationId xmlns:a16="http://schemas.microsoft.com/office/drawing/2014/main" id="{0A3A8724-7894-4017-9060-DCB06C0A44DB}"/>
+                <a16:creationId xmlns:a16="http://schemas.microsoft.com/office/drawing/2014/main" xmlns="" id="{0A3A8724-7894-4017-9060-DCB06C0A44DB}"/>
               </a:ext>
             </a:extLst>
           </p:cNvPr>
@@ -4415,7 +7799,7 @@
           <p:cNvPr id="3" name="Content Placeholder 2">
             <a:extLst>
               <a:ext uri="{FF2B5EF4-FFF2-40B4-BE49-F238E27FC236}">
-                <a16:creationId xmlns:a16="http://schemas.microsoft.com/office/drawing/2014/main" id="{E7D15EFD-F7F1-4563-B5D9-AA50D655CFFE}"/>
+                <a16:creationId xmlns:a16="http://schemas.microsoft.com/office/drawing/2014/main" xmlns="" id="{E7D15EFD-F7F1-4563-B5D9-AA50D655CFFE}"/>
               </a:ext>
             </a:extLst>
           </p:cNvPr>
@@ -4463,7 +7847,7 @@
           <p:cNvPr id="4" name="Content Placeholder 2">
             <a:extLst>
               <a:ext uri="{FF2B5EF4-FFF2-40B4-BE49-F238E27FC236}">
-                <a16:creationId xmlns:a16="http://schemas.microsoft.com/office/drawing/2014/main" id="{7D5814C1-A55A-4CC5-B9BC-B84132CCF29C}"/>
+                <a16:creationId xmlns:a16="http://schemas.microsoft.com/office/drawing/2014/main" xmlns="" id="{7D5814C1-A55A-4CC5-B9BC-B84132CCF29C}"/>
               </a:ext>
             </a:extLst>
           </p:cNvPr>
@@ -4647,7 +8031,7 @@
           <p:cNvPr id="5" name="Shape 155">
             <a:extLst>
               <a:ext uri="{FF2B5EF4-FFF2-40B4-BE49-F238E27FC236}">
-                <a16:creationId xmlns:a16="http://schemas.microsoft.com/office/drawing/2014/main" id="{9F39AAA1-1EF2-4A20-AC0F-1E05CFC014C5}"/>
+                <a16:creationId xmlns:a16="http://schemas.microsoft.com/office/drawing/2014/main" xmlns="" id="{9F39AAA1-1EF2-4A20-AC0F-1E05CFC014C5}"/>
               </a:ext>
             </a:extLst>
           </p:cNvPr>
@@ -4684,7 +8068,7 @@
           <p:cNvPr id="6" name="Shape 156" descr="DC1_logo.png">
             <a:extLst>
               <a:ext uri="{FF2B5EF4-FFF2-40B4-BE49-F238E27FC236}">
-                <a16:creationId xmlns:a16="http://schemas.microsoft.com/office/drawing/2014/main" id="{6E5C0632-EE86-457B-A304-5969C85E86A6}"/>
+                <a16:creationId xmlns:a16="http://schemas.microsoft.com/office/drawing/2014/main" xmlns="" id="{6E5C0632-EE86-457B-A304-5969C85E86A6}"/>
               </a:ext>
             </a:extLst>
           </p:cNvPr>
@@ -5172,7 +8556,7 @@
           <p:cNvPr id="3" name="Picture 2">
             <a:extLst>
               <a:ext uri="{FF2B5EF4-FFF2-40B4-BE49-F238E27FC236}">
-                <a16:creationId xmlns:a16="http://schemas.microsoft.com/office/drawing/2014/main" id="{06C8179E-DD15-4B52-B2AB-781D3FD1E7C7}"/>
+                <a16:creationId xmlns:a16="http://schemas.microsoft.com/office/drawing/2014/main" xmlns="" id="{06C8179E-DD15-4B52-B2AB-781D3FD1E7C7}"/>
               </a:ext>
             </a:extLst>
           </p:cNvPr>
@@ -5207,7 +8591,7 @@
           <p:cNvPr id="9" name="Picture 8">
             <a:extLst>
               <a:ext uri="{FF2B5EF4-FFF2-40B4-BE49-F238E27FC236}">
-                <a16:creationId xmlns:a16="http://schemas.microsoft.com/office/drawing/2014/main" id="{CD78DA23-B88C-4F81-8104-4B51CC58B810}"/>
+                <a16:creationId xmlns:a16="http://schemas.microsoft.com/office/drawing/2014/main" xmlns="" id="{CD78DA23-B88C-4F81-8104-4B51CC58B810}"/>
               </a:ext>
             </a:extLst>
           </p:cNvPr>
@@ -5385,6 +8769,286 @@
   <p:clrMapOvr>
     <a:masterClrMapping/>
   </p:clrMapOvr>
+</p:sld>
+</file>
+
+<file path=ppt/slides/slide16.xml><?xml version="1.0" encoding="utf-8"?>
+<p:sld xmlns:a="http://schemas.openxmlformats.org/drawingml/2006/main" xmlns:r="http://schemas.openxmlformats.org/officeDocument/2006/relationships" xmlns:p="http://schemas.openxmlformats.org/presentationml/2006/main">
+  <p:cSld>
+    <p:spTree>
+      <p:nvGrpSpPr>
+        <p:cNvPr id="1" name=""/>
+        <p:cNvGrpSpPr/>
+        <p:nvPr/>
+      </p:nvGrpSpPr>
+      <p:grpSpPr>
+        <a:xfrm>
+          <a:off x="0" y="0"/>
+          <a:ext cx="0" cy="0"/>
+          <a:chOff x="0" y="0"/>
+          <a:chExt cx="0" cy="0"/>
+        </a:xfrm>
+      </p:grpSpPr>
+      <p:sp>
+        <p:nvSpPr>
+          <p:cNvPr id="4" name="Title 3"/>
+          <p:cNvSpPr>
+            <a:spLocks noGrp="1"/>
+          </p:cNvSpPr>
+          <p:nvPr>
+            <p:ph type="title"/>
+          </p:nvPr>
+        </p:nvSpPr>
+        <p:spPr>
+          <a:xfrm>
+            <a:off x="0" y="102848"/>
+            <a:ext cx="8229600" cy="1143000"/>
+          </a:xfrm>
+        </p:spPr>
+        <p:txBody>
+          <a:bodyPr>
+            <a:normAutofit/>
+          </a:bodyPr>
+          <a:lstStyle/>
+          <a:p>
+            <a:pPr algn="l"/>
+            <a:r>
+              <a:rPr lang="en-GB" sz="4000" b="1" dirty="0" smtClean="0">
+                <a:cs typeface="Arial" panose="020B0604020202020204" pitchFamily="34" charset="0"/>
+              </a:rPr>
+              <a:t>Research IT at Manchester</a:t>
+            </a:r>
+            <a:endParaRPr lang="en-GB" sz="4000" b="1" dirty="0">
+              <a:cs typeface="Arial" panose="020B0604020202020204" pitchFamily="34" charset="0"/>
+            </a:endParaRPr>
+          </a:p>
+        </p:txBody>
+      </p:sp>
+      <p:sp>
+        <p:nvSpPr>
+          <p:cNvPr id="5" name="Content Placeholder 4"/>
+          <p:cNvSpPr>
+            <a:spLocks noGrp="1"/>
+          </p:cNvSpPr>
+          <p:nvPr>
+            <p:ph idx="1"/>
+          </p:nvPr>
+        </p:nvSpPr>
+        <p:spPr>
+          <a:xfrm>
+            <a:off x="417750" y="1124744"/>
+            <a:ext cx="8229600" cy="4569370"/>
+          </a:xfrm>
+        </p:spPr>
+        <p:txBody>
+          <a:bodyPr>
+            <a:normAutofit/>
+          </a:bodyPr>
+          <a:lstStyle/>
+          <a:p>
+            <a:r>
+              <a:rPr lang="en-GB" dirty="0" smtClean="0"/>
+              <a:t>Training courses </a:t>
+            </a:r>
+            <a:endParaRPr lang="en-GB" dirty="0"/>
+          </a:p>
+          <a:p>
+            <a:r>
+              <a:rPr lang="en-GB" dirty="0" smtClean="0"/>
+              <a:t>Advice </a:t>
+            </a:r>
+            <a:r>
+              <a:rPr lang="en-GB" dirty="0" smtClean="0"/>
+              <a:t>and guidance on research software</a:t>
+            </a:r>
+            <a:endParaRPr lang="en-GB" dirty="0"/>
+          </a:p>
+          <a:p>
+            <a:r>
+              <a:rPr lang="en-GB" dirty="0"/>
+              <a:t>Access to specialist support and consultancy e.g. code </a:t>
+            </a:r>
+            <a:r>
+              <a:rPr lang="en-GB" dirty="0" smtClean="0"/>
+              <a:t>reviews, embedded RSEs</a:t>
+            </a:r>
+          </a:p>
+          <a:p>
+            <a:r>
+              <a:rPr lang="en-GB" dirty="0" smtClean="0"/>
+              <a:t>Access to HPC systems</a:t>
+            </a:r>
+          </a:p>
+          <a:p>
+            <a:r>
+              <a:rPr lang="en-GB" dirty="0" smtClean="0"/>
+              <a:t>Visualization and data analytics support</a:t>
+            </a:r>
+          </a:p>
+          <a:p>
+            <a:r>
+              <a:rPr lang="en-GB" dirty="0" smtClean="0"/>
+              <a:t>Get in touch via </a:t>
+            </a:r>
+            <a:r>
+              <a:rPr lang="en-GB" dirty="0" smtClean="0">
+                <a:hlinkClick r:id="rId2"/>
+              </a:rPr>
+              <a:t>https://supportcentre.manchester.ac.uk</a:t>
+            </a:r>
+            <a:endParaRPr lang="en-GB" dirty="0" smtClean="0"/>
+          </a:p>
+          <a:p>
+            <a:endParaRPr lang="en-GB" dirty="0"/>
+          </a:p>
+          <a:p>
+            <a:endParaRPr lang="en-GB" dirty="0" smtClean="0"/>
+          </a:p>
+          <a:p>
+            <a:endParaRPr lang="en-GB" dirty="0" smtClean="0"/>
+          </a:p>
+          <a:p>
+            <a:endParaRPr lang="en-GB" dirty="0" smtClean="0"/>
+          </a:p>
+          <a:p>
+            <a:endParaRPr lang="en-GB" dirty="0"/>
+          </a:p>
+        </p:txBody>
+      </p:sp>
+      <p:pic>
+        <p:nvPicPr>
+          <p:cNvPr id="6" name="Picture 5"/>
+          <p:cNvPicPr>
+            <a:picLocks noChangeAspect="1"/>
+          </p:cNvPicPr>
+          <p:nvPr/>
+        </p:nvPicPr>
+        <p:blipFill>
+          <a:blip r:embed="rId3" cstate="print">
+            <a:extLst>
+              <a:ext uri="{28A0092B-C50C-407E-A947-70E740481C1C}">
+                <a14:useLocalDpi xmlns:a14="http://schemas.microsoft.com/office/drawing/2010/main" val="0"/>
+              </a:ext>
+            </a:extLst>
+          </a:blip>
+          <a:stretch>
+            <a:fillRect/>
+          </a:stretch>
+        </p:blipFill>
+        <p:spPr>
+          <a:xfrm>
+            <a:off x="5951692" y="1"/>
+            <a:ext cx="3192308" cy="836712"/>
+          </a:xfrm>
+          <a:prstGeom prst="rect">
+            <a:avLst/>
+          </a:prstGeom>
+        </p:spPr>
+      </p:pic>
+      <p:sp>
+        <p:nvSpPr>
+          <p:cNvPr id="8" name="TextBox 7"/>
+          <p:cNvSpPr txBox="1"/>
+          <p:nvPr/>
+        </p:nvSpPr>
+        <p:spPr>
+          <a:xfrm>
+            <a:off x="3563888" y="6309320"/>
+            <a:ext cx="1937325" cy="369332"/>
+          </a:xfrm>
+          <a:prstGeom prst="rect">
+            <a:avLst/>
+          </a:prstGeom>
+          <a:noFill/>
+        </p:spPr>
+        <p:txBody>
+          <a:bodyPr wrap="none" rtlCol="0">
+            <a:spAutoFit/>
+          </a:bodyPr>
+          <a:lstStyle/>
+          <a:p>
+            <a:r>
+              <a:rPr lang="en-GB" dirty="0">
+                <a:solidFill>
+                  <a:prstClr val="black"/>
+                </a:solidFill>
+              </a:rPr>
+              <a:t>@</a:t>
+            </a:r>
+            <a:r>
+              <a:rPr lang="en-GB" dirty="0" err="1">
+                <a:solidFill>
+                  <a:prstClr val="black"/>
+                </a:solidFill>
+              </a:rPr>
+              <a:t>UoM_eResearch</a:t>
+            </a:r>
+            <a:endParaRPr lang="en-GB" dirty="0">
+              <a:solidFill>
+                <a:prstClr val="black"/>
+              </a:solidFill>
+            </a:endParaRPr>
+          </a:p>
+        </p:txBody>
+      </p:sp>
+      <p:pic>
+        <p:nvPicPr>
+          <p:cNvPr id="1026" name="Picture 2" descr="The University of Manchester"/>
+          <p:cNvPicPr>
+            <a:picLocks noChangeAspect="1" noChangeArrowheads="1"/>
+          </p:cNvPicPr>
+          <p:nvPr/>
+        </p:nvPicPr>
+        <p:blipFill>
+          <a:blip r:embed="rId4">
+            <a:extLst>
+              <a:ext uri="{28A0092B-C50C-407E-A947-70E740481C1C}">
+                <a14:useLocalDpi xmlns:a14="http://schemas.microsoft.com/office/drawing/2010/main" val="0"/>
+              </a:ext>
+            </a:extLst>
+          </a:blip>
+          <a:srcRect/>
+          <a:stretch>
+            <a:fillRect/>
+          </a:stretch>
+        </p:blipFill>
+        <p:spPr bwMode="auto">
+          <a:xfrm>
+            <a:off x="6876256" y="5859501"/>
+            <a:ext cx="1962150" cy="819151"/>
+          </a:xfrm>
+          <a:prstGeom prst="rect">
+            <a:avLst/>
+          </a:prstGeom>
+          <a:noFill/>
+          <a:extLst>
+            <a:ext uri="{909E8E84-426E-40DD-AFC4-6F175D3DCCD1}">
+              <a14:hiddenFill xmlns:a14="http://schemas.microsoft.com/office/drawing/2010/main">
+                <a:solidFill>
+                  <a:srgbClr val="FFFFFF"/>
+                </a:solidFill>
+              </a14:hiddenFill>
+            </a:ext>
+          </a:extLst>
+        </p:spPr>
+      </p:pic>
+    </p:spTree>
+    <p:extLst>
+      <p:ext uri="{BB962C8B-B14F-4D97-AF65-F5344CB8AC3E}">
+        <p14:creationId xmlns:p14="http://schemas.microsoft.com/office/powerpoint/2010/main" val="4015164850"/>
+      </p:ext>
+    </p:extLst>
+  </p:cSld>
+  <p:clrMapOvr>
+    <a:masterClrMapping/>
+  </p:clrMapOvr>
+  <p:timing>
+    <p:tnLst>
+      <p:par>
+        <p:cTn id="1" dur="indefinite" restart="never" nodeType="tmRoot"/>
+      </p:par>
+    </p:tnLst>
+  </p:timing>
 </p:sld>
 </file>
 
@@ -5915,7 +9579,7 @@
           <p:cNvPr id="2" name="Title 1">
             <a:extLst>
               <a:ext uri="{FF2B5EF4-FFF2-40B4-BE49-F238E27FC236}">
-                <a16:creationId xmlns:a16="http://schemas.microsoft.com/office/drawing/2014/main" id="{0A3A8724-7894-4017-9060-DCB06C0A44DB}"/>
+                <a16:creationId xmlns:a16="http://schemas.microsoft.com/office/drawing/2014/main" xmlns="" id="{0A3A8724-7894-4017-9060-DCB06C0A44DB}"/>
               </a:ext>
             </a:extLst>
           </p:cNvPr>
@@ -5943,7 +9607,7 @@
           <p:cNvPr id="3" name="Content Placeholder 2">
             <a:extLst>
               <a:ext uri="{FF2B5EF4-FFF2-40B4-BE49-F238E27FC236}">
-                <a16:creationId xmlns:a16="http://schemas.microsoft.com/office/drawing/2014/main" id="{E7D15EFD-F7F1-4563-B5D9-AA50D655CFFE}"/>
+                <a16:creationId xmlns:a16="http://schemas.microsoft.com/office/drawing/2014/main" xmlns="" id="{E7D15EFD-F7F1-4563-B5D9-AA50D655CFFE}"/>
               </a:ext>
             </a:extLst>
           </p:cNvPr>
@@ -6009,7 +9673,7 @@
           <p:cNvPr id="4" name="Content Placeholder 2">
             <a:extLst>
               <a:ext uri="{FF2B5EF4-FFF2-40B4-BE49-F238E27FC236}">
-                <a16:creationId xmlns:a16="http://schemas.microsoft.com/office/drawing/2014/main" id="{7D5814C1-A55A-4CC5-B9BC-B84132CCF29C}"/>
+                <a16:creationId xmlns:a16="http://schemas.microsoft.com/office/drawing/2014/main" xmlns="" id="{7D5814C1-A55A-4CC5-B9BC-B84132CCF29C}"/>
               </a:ext>
             </a:extLst>
           </p:cNvPr>
@@ -6241,7 +9905,7 @@
           <p:cNvPr id="2" name="Title 1">
             <a:extLst>
               <a:ext uri="{FF2B5EF4-FFF2-40B4-BE49-F238E27FC236}">
-                <a16:creationId xmlns:a16="http://schemas.microsoft.com/office/drawing/2014/main" id="{7D25C9B4-E028-41B5-94BB-79B216304A17}"/>
+                <a16:creationId xmlns:a16="http://schemas.microsoft.com/office/drawing/2014/main" xmlns="" id="{7D25C9B4-E028-41B5-94BB-79B216304A17}"/>
               </a:ext>
             </a:extLst>
           </p:cNvPr>
@@ -6271,7 +9935,7 @@
           <p:cNvPr id="3" name="Content Placeholder 2">
             <a:extLst>
               <a:ext uri="{FF2B5EF4-FFF2-40B4-BE49-F238E27FC236}">
-                <a16:creationId xmlns:a16="http://schemas.microsoft.com/office/drawing/2014/main" id="{E0ECBFBA-3CD3-4A65-AFC6-38F0C4B3D9D5}"/>
+                <a16:creationId xmlns:a16="http://schemas.microsoft.com/office/drawing/2014/main" xmlns="" id="{E0ECBFBA-3CD3-4A65-AFC6-38F0C4B3D9D5}"/>
               </a:ext>
             </a:extLst>
           </p:cNvPr>
@@ -6404,7 +10068,7 @@
           <p:cNvPr id="2" name="Title 1">
             <a:extLst>
               <a:ext uri="{FF2B5EF4-FFF2-40B4-BE49-F238E27FC236}">
-                <a16:creationId xmlns:a16="http://schemas.microsoft.com/office/drawing/2014/main" id="{0D902B0C-009A-4ABF-80F7-E531D3320577}"/>
+                <a16:creationId xmlns:a16="http://schemas.microsoft.com/office/drawing/2014/main" xmlns="" id="{0D902B0C-009A-4ABF-80F7-E531D3320577}"/>
               </a:ext>
             </a:extLst>
           </p:cNvPr>
@@ -6434,7 +10098,7 @@
           <p:cNvPr id="2050" name="Picture 2" descr="http://jonudell.net/images/alternate-view-of-automation.png">
             <a:extLst>
               <a:ext uri="{FF2B5EF4-FFF2-40B4-BE49-F238E27FC236}">
-                <a16:creationId xmlns:a16="http://schemas.microsoft.com/office/drawing/2014/main" id="{BDDC17F6-4561-40A1-A801-B2D36CA6A3AD}"/>
+                <a16:creationId xmlns:a16="http://schemas.microsoft.com/office/drawing/2014/main" xmlns="" id="{BDDC17F6-4561-40A1-A801-B2D36CA6A3AD}"/>
               </a:ext>
             </a:extLst>
           </p:cNvPr>
@@ -6481,7 +10145,7 @@
           <p:cNvPr id="5" name="TextBox 4">
             <a:extLst>
               <a:ext uri="{FF2B5EF4-FFF2-40B4-BE49-F238E27FC236}">
-                <a16:creationId xmlns:a16="http://schemas.microsoft.com/office/drawing/2014/main" id="{22CB5617-9290-470A-BC4B-C3E68878A512}"/>
+                <a16:creationId xmlns:a16="http://schemas.microsoft.com/office/drawing/2014/main" xmlns="" id="{22CB5617-9290-470A-BC4B-C3E68878A512}"/>
               </a:ext>
             </a:extLst>
           </p:cNvPr>
@@ -6552,7 +10216,7 @@
           <p:cNvPr id="2" name="Title 1">
             <a:extLst>
               <a:ext uri="{FF2B5EF4-FFF2-40B4-BE49-F238E27FC236}">
-                <a16:creationId xmlns:a16="http://schemas.microsoft.com/office/drawing/2014/main" id="{5DF714A7-555A-4F38-A4E2-548F2F48EC56}"/>
+                <a16:creationId xmlns:a16="http://schemas.microsoft.com/office/drawing/2014/main" xmlns="" id="{5DF714A7-555A-4F38-A4E2-548F2F48EC56}"/>
               </a:ext>
             </a:extLst>
           </p:cNvPr>
@@ -6582,7 +10246,7 @@
           <p:cNvPr id="4" name="Picture 2" descr="http://phdcomics.com/comics/archive/phd031214s.gif">
             <a:extLst>
               <a:ext uri="{FF2B5EF4-FFF2-40B4-BE49-F238E27FC236}">
-                <a16:creationId xmlns:a16="http://schemas.microsoft.com/office/drawing/2014/main" id="{61341FF4-1213-4172-ABD2-1D4F97D5D3AA}"/>
+                <a16:creationId xmlns:a16="http://schemas.microsoft.com/office/drawing/2014/main" xmlns="" id="{61341FF4-1213-4172-ABD2-1D4F97D5D3AA}"/>
               </a:ext>
             </a:extLst>
           </p:cNvPr>
@@ -6629,7 +10293,7 @@
           <p:cNvPr id="5" name="TextBox 4">
             <a:extLst>
               <a:ext uri="{FF2B5EF4-FFF2-40B4-BE49-F238E27FC236}">
-                <a16:creationId xmlns:a16="http://schemas.microsoft.com/office/drawing/2014/main" id="{0B2EB249-E396-46F9-863D-FCB09AE6D143}"/>
+                <a16:creationId xmlns:a16="http://schemas.microsoft.com/office/drawing/2014/main" xmlns="" id="{0B2EB249-E396-46F9-863D-FCB09AE6D143}"/>
               </a:ext>
             </a:extLst>
           </p:cNvPr>
@@ -6700,7 +10364,7 @@
           <p:cNvPr id="2" name="Title 1">
             <a:extLst>
               <a:ext uri="{FF2B5EF4-FFF2-40B4-BE49-F238E27FC236}">
-                <a16:creationId xmlns:a16="http://schemas.microsoft.com/office/drawing/2014/main" id="{8FB7CE3D-FACE-4C28-AA7D-99F08FA9A55A}"/>
+                <a16:creationId xmlns:a16="http://schemas.microsoft.com/office/drawing/2014/main" xmlns="" id="{8FB7CE3D-FACE-4C28-AA7D-99F08FA9A55A}"/>
               </a:ext>
             </a:extLst>
           </p:cNvPr>
@@ -6730,7 +10394,7 @@
           <p:cNvPr id="4" name="Picture 2" descr="http://www.phdcomics.com/comics/archive/phd101212s.gif">
             <a:extLst>
               <a:ext uri="{FF2B5EF4-FFF2-40B4-BE49-F238E27FC236}">
-                <a16:creationId xmlns:a16="http://schemas.microsoft.com/office/drawing/2014/main" id="{226DEA4D-7787-4208-8E67-5D65846B4678}"/>
+                <a16:creationId xmlns:a16="http://schemas.microsoft.com/office/drawing/2014/main" xmlns="" id="{226DEA4D-7787-4208-8E67-5D65846B4678}"/>
               </a:ext>
             </a:extLst>
           </p:cNvPr>
@@ -6777,7 +10441,7 @@
           <p:cNvPr id="5" name="TextBox 4">
             <a:extLst>
               <a:ext uri="{FF2B5EF4-FFF2-40B4-BE49-F238E27FC236}">
-                <a16:creationId xmlns:a16="http://schemas.microsoft.com/office/drawing/2014/main" id="{CDEBD24E-7903-4E5F-BE6A-198716D43DD8}"/>
+                <a16:creationId xmlns:a16="http://schemas.microsoft.com/office/drawing/2014/main" xmlns="" id="{CDEBD24E-7903-4E5F-BE6A-198716D43DD8}"/>
               </a:ext>
             </a:extLst>
           </p:cNvPr>
@@ -6818,7 +10482,7 @@
           <p:cNvPr id="6" name="Picture 2" descr="http://www.phdcomics.com/comics/archive/phd052810s.gif">
             <a:extLst>
               <a:ext uri="{FF2B5EF4-FFF2-40B4-BE49-F238E27FC236}">
-                <a16:creationId xmlns:a16="http://schemas.microsoft.com/office/drawing/2014/main" id="{5CC91F2C-8320-47AE-9FC5-1326AA718B8E}"/>
+                <a16:creationId xmlns:a16="http://schemas.microsoft.com/office/drawing/2014/main" xmlns="" id="{5CC91F2C-8320-47AE-9FC5-1326AA718B8E}"/>
               </a:ext>
             </a:extLst>
           </p:cNvPr>
@@ -6865,7 +10529,7 @@
           <p:cNvPr id="7" name="TextBox 6">
             <a:extLst>
               <a:ext uri="{FF2B5EF4-FFF2-40B4-BE49-F238E27FC236}">
-                <a16:creationId xmlns:a16="http://schemas.microsoft.com/office/drawing/2014/main" id="{4589B974-EC77-4794-B079-B733C53C0D60}"/>
+                <a16:creationId xmlns:a16="http://schemas.microsoft.com/office/drawing/2014/main" xmlns="" id="{4589B974-EC77-4794-B079-B733C53C0D60}"/>
               </a:ext>
             </a:extLst>
           </p:cNvPr>
@@ -7222,7 +10886,7 @@
           <p:cNvPr id="15" name="Picture 14">
             <a:extLst>
               <a:ext uri="{FF2B5EF4-FFF2-40B4-BE49-F238E27FC236}">
-                <a16:creationId xmlns:a16="http://schemas.microsoft.com/office/drawing/2014/main" id="{08DC44CE-9C3E-4368-B2EA-BF9874218D4B}"/>
+                <a16:creationId xmlns:a16="http://schemas.microsoft.com/office/drawing/2014/main" xmlns="" id="{08DC44CE-9C3E-4368-B2EA-BF9874218D4B}"/>
               </a:ext>
             </a:extLst>
           </p:cNvPr>
@@ -7252,7 +10916,7 @@
           <p:cNvPr id="16" name="Picture 15">
             <a:extLst>
               <a:ext uri="{FF2B5EF4-FFF2-40B4-BE49-F238E27FC236}">
-                <a16:creationId xmlns:a16="http://schemas.microsoft.com/office/drawing/2014/main" id="{24C8BC12-2BBB-421D-8DA4-5E2EE055CBA6}"/>
+                <a16:creationId xmlns:a16="http://schemas.microsoft.com/office/drawing/2014/main" xmlns="" id="{24C8BC12-2BBB-421D-8DA4-5E2EE055CBA6}"/>
               </a:ext>
             </a:extLst>
           </p:cNvPr>
@@ -7282,7 +10946,7 @@
           <p:cNvPr id="17" name="Picture 16">
             <a:extLst>
               <a:ext uri="{FF2B5EF4-FFF2-40B4-BE49-F238E27FC236}">
-                <a16:creationId xmlns:a16="http://schemas.microsoft.com/office/drawing/2014/main" id="{A24DAEAC-4C99-4CE0-9DF9-5C36C43F5874}"/>
+                <a16:creationId xmlns:a16="http://schemas.microsoft.com/office/drawing/2014/main" xmlns="" id="{A24DAEAC-4C99-4CE0-9DF9-5C36C43F5874}"/>
               </a:ext>
             </a:extLst>
           </p:cNvPr>
@@ -7312,7 +10976,7 @@
           <p:cNvPr id="18" name="Picture 17">
             <a:extLst>
               <a:ext uri="{FF2B5EF4-FFF2-40B4-BE49-F238E27FC236}">
-                <a16:creationId xmlns:a16="http://schemas.microsoft.com/office/drawing/2014/main" id="{BC8E1782-2ABA-4F9C-99B8-4892A2A1E4EA}"/>
+                <a16:creationId xmlns:a16="http://schemas.microsoft.com/office/drawing/2014/main" xmlns="" id="{BC8E1782-2ABA-4F9C-99B8-4892A2A1E4EA}"/>
               </a:ext>
             </a:extLst>
           </p:cNvPr>
@@ -7444,7 +11108,7 @@
           <p:cNvPr id="4" name="TextBox 8">
             <a:extLst>
               <a:ext uri="{FF2B5EF4-FFF2-40B4-BE49-F238E27FC236}">
-                <a16:creationId xmlns:a16="http://schemas.microsoft.com/office/drawing/2014/main" id="{1CBD25CC-4B33-4BA6-A3AE-017971463AB2}"/>
+                <a16:creationId xmlns:a16="http://schemas.microsoft.com/office/drawing/2014/main" xmlns="" id="{1CBD25CC-4B33-4BA6-A3AE-017971463AB2}"/>
               </a:ext>
             </a:extLst>
           </p:cNvPr>
@@ -7717,7 +11381,7 @@
           <p:cNvPr id="5" name="Picture 4">
             <a:extLst>
               <a:ext uri="{FF2B5EF4-FFF2-40B4-BE49-F238E27FC236}">
-                <a16:creationId xmlns:a16="http://schemas.microsoft.com/office/drawing/2014/main" id="{66C832FE-248D-4046-B8A5-17E4D1A15FE8}"/>
+                <a16:creationId xmlns:a16="http://schemas.microsoft.com/office/drawing/2014/main" xmlns="" id="{66C832FE-248D-4046-B8A5-17E4D1A15FE8}"/>
               </a:ext>
             </a:extLst>
           </p:cNvPr>
@@ -8303,6 +11967,291 @@
         <a:font script="Mong" typeface="Mongolian Baiti"/>
         <a:font script="Viet" typeface="Times New Roman"/>
         <a:font script="Uigh" typeface="Microsoft Uighur"/>
+        <a:font script="Geor" typeface="Sylfaen"/>
+      </a:majorFont>
+      <a:minorFont>
+        <a:latin typeface="Calibri"/>
+        <a:ea typeface=""/>
+        <a:cs typeface=""/>
+        <a:font script="Jpan" typeface="ＭＳ Ｐゴシック"/>
+        <a:font script="Hang" typeface="맑은 고딕"/>
+        <a:font script="Hans" typeface="宋体"/>
+        <a:font script="Hant" typeface="新細明體"/>
+        <a:font script="Arab" typeface="Arial"/>
+        <a:font script="Hebr" typeface="Arial"/>
+        <a:font script="Thai" typeface="Cordia New"/>
+        <a:font script="Ethi" typeface="Nyala"/>
+        <a:font script="Beng" typeface="Vrinda"/>
+        <a:font script="Gujr" typeface="Shruti"/>
+        <a:font script="Khmr" typeface="DaunPenh"/>
+        <a:font script="Knda" typeface="Tunga"/>
+        <a:font script="Guru" typeface="Raavi"/>
+        <a:font script="Cans" typeface="Euphemia"/>
+        <a:font script="Cher" typeface="Plantagenet Cherokee"/>
+        <a:font script="Yiii" typeface="Microsoft Yi Baiti"/>
+        <a:font script="Tibt" typeface="Microsoft Himalaya"/>
+        <a:font script="Thaa" typeface="MV Boli"/>
+        <a:font script="Deva" typeface="Mangal"/>
+        <a:font script="Telu" typeface="Gautami"/>
+        <a:font script="Taml" typeface="Latha"/>
+        <a:font script="Syrc" typeface="Estrangelo Edessa"/>
+        <a:font script="Orya" typeface="Kalinga"/>
+        <a:font script="Mlym" typeface="Kartika"/>
+        <a:font script="Laoo" typeface="DokChampa"/>
+        <a:font script="Sinh" typeface="Iskoola Pota"/>
+        <a:font script="Mong" typeface="Mongolian Baiti"/>
+        <a:font script="Viet" typeface="Arial"/>
+        <a:font script="Uigh" typeface="Microsoft Uighur"/>
+        <a:font script="Geor" typeface="Sylfaen"/>
+      </a:minorFont>
+    </a:fontScheme>
+    <a:fmtScheme name="Office">
+      <a:fillStyleLst>
+        <a:solidFill>
+          <a:schemeClr val="phClr"/>
+        </a:solidFill>
+        <a:gradFill rotWithShape="1">
+          <a:gsLst>
+            <a:gs pos="0">
+              <a:schemeClr val="phClr">
+                <a:tint val="50000"/>
+                <a:satMod val="300000"/>
+              </a:schemeClr>
+            </a:gs>
+            <a:gs pos="35000">
+              <a:schemeClr val="phClr">
+                <a:tint val="37000"/>
+                <a:satMod val="300000"/>
+              </a:schemeClr>
+            </a:gs>
+            <a:gs pos="100000">
+              <a:schemeClr val="phClr">
+                <a:tint val="15000"/>
+                <a:satMod val="350000"/>
+              </a:schemeClr>
+            </a:gs>
+          </a:gsLst>
+          <a:lin ang="16200000" scaled="1"/>
+        </a:gradFill>
+        <a:gradFill rotWithShape="1">
+          <a:gsLst>
+            <a:gs pos="0">
+              <a:schemeClr val="phClr">
+                <a:shade val="51000"/>
+                <a:satMod val="130000"/>
+              </a:schemeClr>
+            </a:gs>
+            <a:gs pos="80000">
+              <a:schemeClr val="phClr">
+                <a:shade val="93000"/>
+                <a:satMod val="130000"/>
+              </a:schemeClr>
+            </a:gs>
+            <a:gs pos="100000">
+              <a:schemeClr val="phClr">
+                <a:shade val="94000"/>
+                <a:satMod val="135000"/>
+              </a:schemeClr>
+            </a:gs>
+          </a:gsLst>
+          <a:lin ang="16200000" scaled="0"/>
+        </a:gradFill>
+      </a:fillStyleLst>
+      <a:lnStyleLst>
+        <a:ln w="9525" cap="flat" cmpd="sng" algn="ctr">
+          <a:solidFill>
+            <a:schemeClr val="phClr">
+              <a:shade val="95000"/>
+              <a:satMod val="105000"/>
+            </a:schemeClr>
+          </a:solidFill>
+          <a:prstDash val="solid"/>
+        </a:ln>
+        <a:ln w="25400" cap="flat" cmpd="sng" algn="ctr">
+          <a:solidFill>
+            <a:schemeClr val="phClr"/>
+          </a:solidFill>
+          <a:prstDash val="solid"/>
+        </a:ln>
+        <a:ln w="38100" cap="flat" cmpd="sng" algn="ctr">
+          <a:solidFill>
+            <a:schemeClr val="phClr"/>
+          </a:solidFill>
+          <a:prstDash val="solid"/>
+        </a:ln>
+      </a:lnStyleLst>
+      <a:effectStyleLst>
+        <a:effectStyle>
+          <a:effectLst>
+            <a:outerShdw blurRad="40000" dist="20000" dir="5400000" rotWithShape="0">
+              <a:srgbClr val="000000">
+                <a:alpha val="38000"/>
+              </a:srgbClr>
+            </a:outerShdw>
+          </a:effectLst>
+        </a:effectStyle>
+        <a:effectStyle>
+          <a:effectLst>
+            <a:outerShdw blurRad="40000" dist="23000" dir="5400000" rotWithShape="0">
+              <a:srgbClr val="000000">
+                <a:alpha val="35000"/>
+              </a:srgbClr>
+            </a:outerShdw>
+          </a:effectLst>
+        </a:effectStyle>
+        <a:effectStyle>
+          <a:effectLst>
+            <a:outerShdw blurRad="40000" dist="23000" dir="5400000" rotWithShape="0">
+              <a:srgbClr val="000000">
+                <a:alpha val="35000"/>
+              </a:srgbClr>
+            </a:outerShdw>
+          </a:effectLst>
+          <a:scene3d>
+            <a:camera prst="orthographicFront">
+              <a:rot lat="0" lon="0" rev="0"/>
+            </a:camera>
+            <a:lightRig rig="threePt" dir="t">
+              <a:rot lat="0" lon="0" rev="1200000"/>
+            </a:lightRig>
+          </a:scene3d>
+          <a:sp3d>
+            <a:bevelT w="63500" h="25400"/>
+          </a:sp3d>
+        </a:effectStyle>
+      </a:effectStyleLst>
+      <a:bgFillStyleLst>
+        <a:solidFill>
+          <a:schemeClr val="phClr"/>
+        </a:solidFill>
+        <a:gradFill rotWithShape="1">
+          <a:gsLst>
+            <a:gs pos="0">
+              <a:schemeClr val="phClr">
+                <a:tint val="40000"/>
+                <a:satMod val="350000"/>
+              </a:schemeClr>
+            </a:gs>
+            <a:gs pos="40000">
+              <a:schemeClr val="phClr">
+                <a:tint val="45000"/>
+                <a:shade val="99000"/>
+                <a:satMod val="350000"/>
+              </a:schemeClr>
+            </a:gs>
+            <a:gs pos="100000">
+              <a:schemeClr val="phClr">
+                <a:shade val="20000"/>
+                <a:satMod val="255000"/>
+              </a:schemeClr>
+            </a:gs>
+          </a:gsLst>
+          <a:path path="circle">
+            <a:fillToRect l="50000" t="-80000" r="50000" b="180000"/>
+          </a:path>
+        </a:gradFill>
+        <a:gradFill rotWithShape="1">
+          <a:gsLst>
+            <a:gs pos="0">
+              <a:schemeClr val="phClr">
+                <a:tint val="80000"/>
+                <a:satMod val="300000"/>
+              </a:schemeClr>
+            </a:gs>
+            <a:gs pos="100000">
+              <a:schemeClr val="phClr">
+                <a:shade val="30000"/>
+                <a:satMod val="200000"/>
+              </a:schemeClr>
+            </a:gs>
+          </a:gsLst>
+          <a:path path="circle">
+            <a:fillToRect l="50000" t="50000" r="50000" b="50000"/>
+          </a:path>
+        </a:gradFill>
+      </a:bgFillStyleLst>
+    </a:fmtScheme>
+  </a:themeElements>
+  <a:objectDefaults/>
+  <a:extraClrSchemeLst/>
+</a:theme>
+</file>
+
+<file path=ppt/theme/theme3.xml><?xml version="1.0" encoding="utf-8"?>
+<a:theme xmlns:a="http://schemas.openxmlformats.org/drawingml/2006/main" name="Office Theme">
+  <a:themeElements>
+    <a:clrScheme name="Office">
+      <a:dk1>
+        <a:sysClr val="windowText" lastClr="000000"/>
+      </a:dk1>
+      <a:lt1>
+        <a:sysClr val="window" lastClr="FFFFFF"/>
+      </a:lt1>
+      <a:dk2>
+        <a:srgbClr val="1F497D"/>
+      </a:dk2>
+      <a:lt2>
+        <a:srgbClr val="EEECE1"/>
+      </a:lt2>
+      <a:accent1>
+        <a:srgbClr val="4F81BD"/>
+      </a:accent1>
+      <a:accent2>
+        <a:srgbClr val="C0504D"/>
+      </a:accent2>
+      <a:accent3>
+        <a:srgbClr val="9BBB59"/>
+      </a:accent3>
+      <a:accent4>
+        <a:srgbClr val="8064A2"/>
+      </a:accent4>
+      <a:accent5>
+        <a:srgbClr val="4BACC6"/>
+      </a:accent5>
+      <a:accent6>
+        <a:srgbClr val="F79646"/>
+      </a:accent6>
+      <a:hlink>
+        <a:srgbClr val="0000FF"/>
+      </a:hlink>
+      <a:folHlink>
+        <a:srgbClr val="800080"/>
+      </a:folHlink>
+    </a:clrScheme>
+    <a:fontScheme name="Office">
+      <a:majorFont>
+        <a:latin typeface="Calibri"/>
+        <a:ea typeface=""/>
+        <a:cs typeface=""/>
+        <a:font script="Jpan" typeface="ＭＳ Ｐゴシック"/>
+        <a:font script="Hang" typeface="맑은 고딕"/>
+        <a:font script="Hans" typeface="宋体"/>
+        <a:font script="Hant" typeface="新細明體"/>
+        <a:font script="Arab" typeface="Times New Roman"/>
+        <a:font script="Hebr" typeface="Times New Roman"/>
+        <a:font script="Thai" typeface="Angsana New"/>
+        <a:font script="Ethi" typeface="Nyala"/>
+        <a:font script="Beng" typeface="Vrinda"/>
+        <a:font script="Gujr" typeface="Shruti"/>
+        <a:font script="Khmr" typeface="MoolBoran"/>
+        <a:font script="Knda" typeface="Tunga"/>
+        <a:font script="Guru" typeface="Raavi"/>
+        <a:font script="Cans" typeface="Euphemia"/>
+        <a:font script="Cher" typeface="Plantagenet Cherokee"/>
+        <a:font script="Yiii" typeface="Microsoft Yi Baiti"/>
+        <a:font script="Tibt" typeface="Microsoft Himalaya"/>
+        <a:font script="Thaa" typeface="MV Boli"/>
+        <a:font script="Deva" typeface="Mangal"/>
+        <a:font script="Telu" typeface="Gautami"/>
+        <a:font script="Taml" typeface="Latha"/>
+        <a:font script="Syrc" typeface="Estrangelo Edessa"/>
+        <a:font script="Orya" typeface="Kalinga"/>
+        <a:font script="Mlym" typeface="Kartika"/>
+        <a:font script="Laoo" typeface="DokChampa"/>
+        <a:font script="Sinh" typeface="Iskoola Pota"/>
+        <a:font script="Mong" typeface="Mongolian Baiti"/>
+        <a:font script="Viet" typeface="Times New Roman"/>
+        <a:font script="Uigh" typeface="Microsoft Uighur"/>
       </a:majorFont>
       <a:minorFont>
         <a:latin typeface="Calibri"/>
@@ -8512,12 +12461,9 @@
 </file>
 
 <file path=customXml/item1.xml><?xml version="1.0" encoding="utf-8"?>
-<?mso-contentType ?>
-<FormTemplates xmlns="http://schemas.microsoft.com/sharepoint/v3/contenttype/forms">
-  <Display>DocumentLibraryForm</Display>
-  <Edit>DocumentLibraryForm</Edit>
-  <New>DocumentLibraryForm</New>
-</FormTemplates>
+<p:properties xmlns:p="http://schemas.microsoft.com/office/2006/metadata/properties" xmlns:xsi="http://www.w3.org/2001/XMLSchema-instance">
+  <documentManagement/>
+</p:properties>
 </file>
 
 <file path=customXml/item2.xml><?xml version="1.0" encoding="utf-8"?>
@@ -8570,15 +12516,24 @@
 </file>
 
 <file path=customXml/item3.xml><?xml version="1.0" encoding="utf-8"?>
-<p:properties xmlns:p="http://schemas.microsoft.com/office/2006/metadata/properties" xmlns:xsi="http://www.w3.org/2001/XMLSchema-instance">
-  <documentManagement/>
-</p:properties>
+<?mso-contentType ?>
+<FormTemplates xmlns="http://schemas.microsoft.com/sharepoint/v3/contenttype/forms">
+  <Display>DocumentLibraryForm</Display>
+  <Edit>DocumentLibraryForm</Edit>
+  <New>DocumentLibraryForm</New>
+</FormTemplates>
 </file>
 
 <file path=customXml/itemProps1.xml><?xml version="1.0" encoding="utf-8"?>
-<ds:datastoreItem xmlns:ds="http://schemas.openxmlformats.org/officeDocument/2006/customXml" ds:itemID="{49F67720-B1E7-4666-BB67-DC10D4B7611F}">
+<ds:datastoreItem xmlns:ds="http://schemas.openxmlformats.org/officeDocument/2006/customXml" ds:itemID="{4345AD3D-1F83-4DB7-B79D-F198C7164724}">
   <ds:schemaRefs>
-    <ds:schemaRef ds:uri="http://schemas.microsoft.com/sharepoint/v3/contenttype/forms"/>
+    <ds:schemaRef ds:uri="http://schemas.microsoft.com/office/2006/documentManagement/types"/>
+    <ds:schemaRef ds:uri="http://schemas.openxmlformats.org/package/2006/metadata/core-properties"/>
+    <ds:schemaRef ds:uri="http://purl.org/dc/dcmitype/"/>
+    <ds:schemaRef ds:uri="http://purl.org/dc/elements/1.1/"/>
+    <ds:schemaRef ds:uri="http://schemas.microsoft.com/office/2006/metadata/properties"/>
+    <ds:schemaRef ds:uri="http://www.w3.org/XML/1998/namespace"/>
+    <ds:schemaRef ds:uri="http://purl.org/dc/terms/"/>
   </ds:schemaRefs>
 </ds:datastoreItem>
 </file>
@@ -8599,15 +12554,9 @@
 </file>
 
 <file path=customXml/itemProps3.xml><?xml version="1.0" encoding="utf-8"?>
-<ds:datastoreItem xmlns:ds="http://schemas.openxmlformats.org/officeDocument/2006/customXml" ds:itemID="{4345AD3D-1F83-4DB7-B79D-F198C7164724}">
+<ds:datastoreItem xmlns:ds="http://schemas.openxmlformats.org/officeDocument/2006/customXml" ds:itemID="{49F67720-B1E7-4666-BB67-DC10D4B7611F}">
   <ds:schemaRefs>
-    <ds:schemaRef ds:uri="http://schemas.microsoft.com/office/2006/documentManagement/types"/>
-    <ds:schemaRef ds:uri="http://schemas.openxmlformats.org/package/2006/metadata/core-properties"/>
-    <ds:schemaRef ds:uri="http://purl.org/dc/dcmitype/"/>
-    <ds:schemaRef ds:uri="http://purl.org/dc/elements/1.1/"/>
-    <ds:schemaRef ds:uri="http://schemas.microsoft.com/office/2006/metadata/properties"/>
-    <ds:schemaRef ds:uri="http://www.w3.org/XML/1998/namespace"/>
-    <ds:schemaRef ds:uri="http://purl.org/dc/terms/"/>
+    <ds:schemaRef ds:uri="http://schemas.microsoft.com/sharepoint/v3/contenttype/forms"/>
   </ds:schemaRefs>
 </ds:datastoreItem>
 </file>
</xml_diff>

<commit_message>
Added certificate icon, denotes attendence letter
</commit_message>
<xml_diff>
--- a/IntroductionConclusion.pptx
+++ b/IntroductionConclusion.pptx
@@ -125,7 +125,7 @@
   </p:defaultTextStyle>
   <p:extLst>
     <p:ext uri="{EFAFB233-063F-42B5-8137-9DF3F51BA10A}">
-      <p15:sldGuideLst xmlns:p15="http://schemas.microsoft.com/office/powerpoint/2012/main" xmlns="">
+      <p15:sldGuideLst xmlns:p15="http://schemas.microsoft.com/office/powerpoint/2012/main">
         <p15:guide id="1" orient="horz" pos="2160">
           <p15:clr>
             <a:srgbClr val="A4A3A4"/>
@@ -229,7 +229,7 @@
             <a:fld id="{17BF77A4-95C4-49A7-B18D-D234C078783D}" type="datetimeFigureOut">
               <a:rPr lang="en-US" smtClean="0"/>
               <a:pPr/>
-              <a:t>1/31/2018</a:t>
+              <a:t>2/19/2018</a:t>
             </a:fld>
             <a:endParaRPr lang="en-US"/>
           </a:p>
@@ -1356,9 +1356,6 @@
           <a:p>
             <a:endParaRPr lang="en-GB" dirty="0"/>
           </a:p>
-          <a:p>
-            <a:endParaRPr lang="en-GB" dirty="0"/>
-          </a:p>
         </p:txBody>
       </p:sp>
       <p:sp>
@@ -1920,7 +1917,7 @@
                 </a:solidFill>
               </a:rPr>
               <a:pPr/>
-              <a:t>31/01/2018</a:t>
+              <a:t>19/02/2018</a:t>
             </a:fld>
             <a:endParaRPr lang="en-GB">
               <a:solidFill>
@@ -2048,7 +2045,7 @@
           </a:lstStyle>
           <a:p>
             <a:r>
-              <a:rPr lang="en-US" smtClean="0"/>
+              <a:rPr lang="en-US"/>
               <a:t>Click to edit Master title style</a:t>
             </a:r>
             <a:endParaRPr lang="en-GB"/>
@@ -2105,35 +2102,35 @@
           <a:p>
             <a:pPr lvl="0"/>
             <a:r>
-              <a:rPr lang="en-US" smtClean="0"/>
+              <a:rPr lang="en-US"/>
               <a:t>Click to edit Master text styles</a:t>
             </a:r>
           </a:p>
           <a:p>
             <a:pPr lvl="1"/>
             <a:r>
-              <a:rPr lang="en-US" smtClean="0"/>
+              <a:rPr lang="en-US"/>
               <a:t>Second level</a:t>
             </a:r>
           </a:p>
           <a:p>
             <a:pPr lvl="2"/>
             <a:r>
-              <a:rPr lang="en-US" smtClean="0"/>
+              <a:rPr lang="en-US"/>
               <a:t>Third level</a:t>
             </a:r>
           </a:p>
           <a:p>
             <a:pPr lvl="3"/>
             <a:r>
-              <a:rPr lang="en-US" smtClean="0"/>
+              <a:rPr lang="en-US"/>
               <a:t>Fourth level</a:t>
             </a:r>
           </a:p>
           <a:p>
             <a:pPr lvl="4"/>
             <a:r>
-              <a:rPr lang="en-US" smtClean="0"/>
+              <a:rPr lang="en-US"/>
               <a:t>Fifth level</a:t>
             </a:r>
             <a:endParaRPr lang="en-GB"/>
@@ -2199,7 +2196,7 @@
           <a:p>
             <a:pPr lvl="0"/>
             <a:r>
-              <a:rPr lang="en-US" smtClean="0"/>
+              <a:rPr lang="en-US"/>
               <a:t>Click to edit Master text styles</a:t>
             </a:r>
           </a:p>
@@ -2229,7 +2226,7 @@
                 </a:solidFill>
               </a:rPr>
               <a:pPr/>
-              <a:t>31/01/2018</a:t>
+              <a:t>19/02/2018</a:t>
             </a:fld>
             <a:endParaRPr lang="en-GB">
               <a:solidFill>
@@ -2357,7 +2354,7 @@
           </a:lstStyle>
           <a:p>
             <a:r>
-              <a:rPr lang="en-US" smtClean="0"/>
+              <a:rPr lang="en-US"/>
               <a:t>Click to edit Master title style</a:t>
             </a:r>
             <a:endParaRPr lang="en-GB"/>
@@ -2484,7 +2481,7 @@
           <a:p>
             <a:pPr lvl="0"/>
             <a:r>
-              <a:rPr lang="en-US" smtClean="0"/>
+              <a:rPr lang="en-US"/>
               <a:t>Click to edit Master text styles</a:t>
             </a:r>
           </a:p>
@@ -2514,7 +2511,7 @@
                 </a:solidFill>
               </a:rPr>
               <a:pPr/>
-              <a:t>31/01/2018</a:t>
+              <a:t>19/02/2018</a:t>
             </a:fld>
             <a:endParaRPr lang="en-GB">
               <a:solidFill>
@@ -2633,7 +2630,7 @@
           <a:lstStyle/>
           <a:p>
             <a:r>
-              <a:rPr lang="en-US" smtClean="0"/>
+              <a:rPr lang="en-US"/>
               <a:t>Click to edit Master title style</a:t>
             </a:r>
             <a:endParaRPr lang="en-GB"/>
@@ -2657,35 +2654,35 @@
           <a:p>
             <a:pPr lvl="0"/>
             <a:r>
-              <a:rPr lang="en-US" smtClean="0"/>
+              <a:rPr lang="en-US"/>
               <a:t>Click to edit Master text styles</a:t>
             </a:r>
           </a:p>
           <a:p>
             <a:pPr lvl="1"/>
             <a:r>
-              <a:rPr lang="en-US" smtClean="0"/>
+              <a:rPr lang="en-US"/>
               <a:t>Second level</a:t>
             </a:r>
           </a:p>
           <a:p>
             <a:pPr lvl="2"/>
             <a:r>
-              <a:rPr lang="en-US" smtClean="0"/>
+              <a:rPr lang="en-US"/>
               <a:t>Third level</a:t>
             </a:r>
           </a:p>
           <a:p>
             <a:pPr lvl="3"/>
             <a:r>
-              <a:rPr lang="en-US" smtClean="0"/>
+              <a:rPr lang="en-US"/>
               <a:t>Fourth level</a:t>
             </a:r>
           </a:p>
           <a:p>
             <a:pPr lvl="4"/>
             <a:r>
-              <a:rPr lang="en-US" smtClean="0"/>
+              <a:rPr lang="en-US"/>
               <a:t>Fifth level</a:t>
             </a:r>
             <a:endParaRPr lang="en-GB"/>
@@ -2716,7 +2713,7 @@
                 </a:solidFill>
               </a:rPr>
               <a:pPr/>
-              <a:t>31/01/2018</a:t>
+              <a:t>19/02/2018</a:t>
             </a:fld>
             <a:endParaRPr lang="en-GB">
               <a:solidFill>
@@ -2840,7 +2837,7 @@
           <a:lstStyle/>
           <a:p>
             <a:r>
-              <a:rPr lang="en-US" smtClean="0"/>
+              <a:rPr lang="en-US"/>
               <a:t>Click to edit Master title style</a:t>
             </a:r>
             <a:endParaRPr lang="en-GB"/>
@@ -2869,35 +2866,35 @@
           <a:p>
             <a:pPr lvl="0"/>
             <a:r>
-              <a:rPr lang="en-US" smtClean="0"/>
+              <a:rPr lang="en-US"/>
               <a:t>Click to edit Master text styles</a:t>
             </a:r>
           </a:p>
           <a:p>
             <a:pPr lvl="1"/>
             <a:r>
-              <a:rPr lang="en-US" smtClean="0"/>
+              <a:rPr lang="en-US"/>
               <a:t>Second level</a:t>
             </a:r>
           </a:p>
           <a:p>
             <a:pPr lvl="2"/>
             <a:r>
-              <a:rPr lang="en-US" smtClean="0"/>
+              <a:rPr lang="en-US"/>
               <a:t>Third level</a:t>
             </a:r>
           </a:p>
           <a:p>
             <a:pPr lvl="3"/>
             <a:r>
-              <a:rPr lang="en-US" smtClean="0"/>
+              <a:rPr lang="en-US"/>
               <a:t>Fourth level</a:t>
             </a:r>
           </a:p>
           <a:p>
             <a:pPr lvl="4"/>
             <a:r>
-              <a:rPr lang="en-US" smtClean="0"/>
+              <a:rPr lang="en-US"/>
               <a:t>Fifth level</a:t>
             </a:r>
             <a:endParaRPr lang="en-GB"/>
@@ -2928,7 +2925,7 @@
                 </a:solidFill>
               </a:rPr>
               <a:pPr/>
-              <a:t>31/01/2018</a:t>
+              <a:t>19/02/2018</a:t>
             </a:fld>
             <a:endParaRPr lang="en-GB">
               <a:solidFill>
@@ -3249,7 +3246,7 @@
           <a:p>
             <a:fld id="{90372C55-F32C-714E-85D4-4C85D67E2D89}" type="datetimeFigureOut">
               <a:rPr lang="en-US" smtClean="0"/>
-              <a:t>1/31/2018</a:t>
+              <a:t>2/19/2018</a:t>
             </a:fld>
             <a:endParaRPr lang="en-US"/>
           </a:p>
@@ -3364,7 +3361,7 @@
           <a:lstStyle/>
           <a:p>
             <a:r>
-              <a:rPr lang="en-US" smtClean="0"/>
+              <a:rPr lang="en-US"/>
               <a:t>Click to edit Master title style</a:t>
             </a:r>
             <a:endParaRPr lang="en-GB"/>
@@ -3483,7 +3480,7 @@
           </a:lstStyle>
           <a:p>
             <a:r>
-              <a:rPr lang="en-US" smtClean="0"/>
+              <a:rPr lang="en-US"/>
               <a:t>Click to edit Master subtitle style</a:t>
             </a:r>
             <a:endParaRPr lang="en-GB"/>
@@ -3514,7 +3511,7 @@
                 </a:solidFill>
               </a:rPr>
               <a:pPr/>
-              <a:t>31/01/2018</a:t>
+              <a:t>19/02/2018</a:t>
             </a:fld>
             <a:endParaRPr lang="en-GB">
               <a:solidFill>
@@ -3633,7 +3630,7 @@
           <a:lstStyle/>
           <a:p>
             <a:r>
-              <a:rPr lang="en-US" smtClean="0"/>
+              <a:rPr lang="en-US"/>
               <a:t>Click to edit Master title style</a:t>
             </a:r>
             <a:endParaRPr lang="en-GB"/>
@@ -3657,35 +3654,35 @@
           <a:p>
             <a:pPr lvl="0"/>
             <a:r>
-              <a:rPr lang="en-US" smtClean="0"/>
+              <a:rPr lang="en-US"/>
               <a:t>Click to edit Master text styles</a:t>
             </a:r>
           </a:p>
           <a:p>
             <a:pPr lvl="1"/>
             <a:r>
-              <a:rPr lang="en-US" smtClean="0"/>
+              <a:rPr lang="en-US"/>
               <a:t>Second level</a:t>
             </a:r>
           </a:p>
           <a:p>
             <a:pPr lvl="2"/>
             <a:r>
-              <a:rPr lang="en-US" smtClean="0"/>
+              <a:rPr lang="en-US"/>
               <a:t>Third level</a:t>
             </a:r>
           </a:p>
           <a:p>
             <a:pPr lvl="3"/>
             <a:r>
-              <a:rPr lang="en-US" smtClean="0"/>
+              <a:rPr lang="en-US"/>
               <a:t>Fourth level</a:t>
             </a:r>
           </a:p>
           <a:p>
             <a:pPr lvl="4"/>
             <a:r>
-              <a:rPr lang="en-US" smtClean="0"/>
+              <a:rPr lang="en-US"/>
               <a:t>Fifth level</a:t>
             </a:r>
             <a:endParaRPr lang="en-GB"/>
@@ -3716,7 +3713,7 @@
                 </a:solidFill>
               </a:rPr>
               <a:pPr/>
-              <a:t>31/01/2018</a:t>
+              <a:t>19/02/2018</a:t>
             </a:fld>
             <a:endParaRPr lang="en-GB">
               <a:solidFill>
@@ -3844,7 +3841,7 @@
           </a:lstStyle>
           <a:p>
             <a:r>
-              <a:rPr lang="en-US" smtClean="0"/>
+              <a:rPr lang="en-US"/>
               <a:t>Click to edit Master title style</a:t>
             </a:r>
             <a:endParaRPr lang="en-GB"/>
@@ -3964,7 +3961,7 @@
           <a:p>
             <a:pPr lvl="0"/>
             <a:r>
-              <a:rPr lang="en-US" smtClean="0"/>
+              <a:rPr lang="en-US"/>
               <a:t>Click to edit Master text styles</a:t>
             </a:r>
           </a:p>
@@ -3994,7 +3991,7 @@
                 </a:solidFill>
               </a:rPr>
               <a:pPr/>
-              <a:t>31/01/2018</a:t>
+              <a:t>19/02/2018</a:t>
             </a:fld>
             <a:endParaRPr lang="en-GB">
               <a:solidFill>
@@ -4113,7 +4110,7 @@
           <a:lstStyle/>
           <a:p>
             <a:r>
-              <a:rPr lang="en-US" smtClean="0"/>
+              <a:rPr lang="en-US"/>
               <a:t>Click to edit Master title style</a:t>
             </a:r>
             <a:endParaRPr lang="en-GB"/>
@@ -4170,35 +4167,35 @@
           <a:p>
             <a:pPr lvl="0"/>
             <a:r>
-              <a:rPr lang="en-US" smtClean="0"/>
+              <a:rPr lang="en-US"/>
               <a:t>Click to edit Master text styles</a:t>
             </a:r>
           </a:p>
           <a:p>
             <a:pPr lvl="1"/>
             <a:r>
-              <a:rPr lang="en-US" smtClean="0"/>
+              <a:rPr lang="en-US"/>
               <a:t>Second level</a:t>
             </a:r>
           </a:p>
           <a:p>
             <a:pPr lvl="2"/>
             <a:r>
-              <a:rPr lang="en-US" smtClean="0"/>
+              <a:rPr lang="en-US"/>
               <a:t>Third level</a:t>
             </a:r>
           </a:p>
           <a:p>
             <a:pPr lvl="3"/>
             <a:r>
-              <a:rPr lang="en-US" smtClean="0"/>
+              <a:rPr lang="en-US"/>
               <a:t>Fourth level</a:t>
             </a:r>
           </a:p>
           <a:p>
             <a:pPr lvl="4"/>
             <a:r>
-              <a:rPr lang="en-US" smtClean="0"/>
+              <a:rPr lang="en-US"/>
               <a:t>Fifth level</a:t>
             </a:r>
             <a:endParaRPr lang="en-GB"/>
@@ -4255,35 +4252,35 @@
           <a:p>
             <a:pPr lvl="0"/>
             <a:r>
-              <a:rPr lang="en-US" smtClean="0"/>
+              <a:rPr lang="en-US"/>
               <a:t>Click to edit Master text styles</a:t>
             </a:r>
           </a:p>
           <a:p>
             <a:pPr lvl="1"/>
             <a:r>
-              <a:rPr lang="en-US" smtClean="0"/>
+              <a:rPr lang="en-US"/>
               <a:t>Second level</a:t>
             </a:r>
           </a:p>
           <a:p>
             <a:pPr lvl="2"/>
             <a:r>
-              <a:rPr lang="en-US" smtClean="0"/>
+              <a:rPr lang="en-US"/>
               <a:t>Third level</a:t>
             </a:r>
           </a:p>
           <a:p>
             <a:pPr lvl="3"/>
             <a:r>
-              <a:rPr lang="en-US" smtClean="0"/>
+              <a:rPr lang="en-US"/>
               <a:t>Fourth level</a:t>
             </a:r>
           </a:p>
           <a:p>
             <a:pPr lvl="4"/>
             <a:r>
-              <a:rPr lang="en-US" smtClean="0"/>
+              <a:rPr lang="en-US"/>
               <a:t>Fifth level</a:t>
             </a:r>
             <a:endParaRPr lang="en-GB"/>
@@ -4314,7 +4311,7 @@
                 </a:solidFill>
               </a:rPr>
               <a:pPr/>
-              <a:t>31/01/2018</a:t>
+              <a:t>19/02/2018</a:t>
             </a:fld>
             <a:endParaRPr lang="en-GB">
               <a:solidFill>
@@ -4437,7 +4434,7 @@
           </a:lstStyle>
           <a:p>
             <a:r>
-              <a:rPr lang="en-US" smtClean="0"/>
+              <a:rPr lang="en-US"/>
               <a:t>Click to edit Master title style</a:t>
             </a:r>
             <a:endParaRPr lang="en-GB"/>
@@ -4503,7 +4500,7 @@
           <a:p>
             <a:pPr lvl="0"/>
             <a:r>
-              <a:rPr lang="en-US" smtClean="0"/>
+              <a:rPr lang="en-US"/>
               <a:t>Click to edit Master text styles</a:t>
             </a:r>
           </a:p>
@@ -4559,35 +4556,35 @@
           <a:p>
             <a:pPr lvl="0"/>
             <a:r>
-              <a:rPr lang="en-US" smtClean="0"/>
+              <a:rPr lang="en-US"/>
               <a:t>Click to edit Master text styles</a:t>
             </a:r>
           </a:p>
           <a:p>
             <a:pPr lvl="1"/>
             <a:r>
-              <a:rPr lang="en-US" smtClean="0"/>
+              <a:rPr lang="en-US"/>
               <a:t>Second level</a:t>
             </a:r>
           </a:p>
           <a:p>
             <a:pPr lvl="2"/>
             <a:r>
-              <a:rPr lang="en-US" smtClean="0"/>
+              <a:rPr lang="en-US"/>
               <a:t>Third level</a:t>
             </a:r>
           </a:p>
           <a:p>
             <a:pPr lvl="3"/>
             <a:r>
-              <a:rPr lang="en-US" smtClean="0"/>
+              <a:rPr lang="en-US"/>
               <a:t>Fourth level</a:t>
             </a:r>
           </a:p>
           <a:p>
             <a:pPr lvl="4"/>
             <a:r>
-              <a:rPr lang="en-US" smtClean="0"/>
+              <a:rPr lang="en-US"/>
               <a:t>Fifth level</a:t>
             </a:r>
             <a:endParaRPr lang="en-GB"/>
@@ -4653,7 +4650,7 @@
           <a:p>
             <a:pPr lvl="0"/>
             <a:r>
-              <a:rPr lang="en-US" smtClean="0"/>
+              <a:rPr lang="en-US"/>
               <a:t>Click to edit Master text styles</a:t>
             </a:r>
           </a:p>
@@ -4709,35 +4706,35 @@
           <a:p>
             <a:pPr lvl="0"/>
             <a:r>
-              <a:rPr lang="en-US" smtClean="0"/>
+              <a:rPr lang="en-US"/>
               <a:t>Click to edit Master text styles</a:t>
             </a:r>
           </a:p>
           <a:p>
             <a:pPr lvl="1"/>
             <a:r>
-              <a:rPr lang="en-US" smtClean="0"/>
+              <a:rPr lang="en-US"/>
               <a:t>Second level</a:t>
             </a:r>
           </a:p>
           <a:p>
             <a:pPr lvl="2"/>
             <a:r>
-              <a:rPr lang="en-US" smtClean="0"/>
+              <a:rPr lang="en-US"/>
               <a:t>Third level</a:t>
             </a:r>
           </a:p>
           <a:p>
             <a:pPr lvl="3"/>
             <a:r>
-              <a:rPr lang="en-US" smtClean="0"/>
+              <a:rPr lang="en-US"/>
               <a:t>Fourth level</a:t>
             </a:r>
           </a:p>
           <a:p>
             <a:pPr lvl="4"/>
             <a:r>
-              <a:rPr lang="en-US" smtClean="0"/>
+              <a:rPr lang="en-US"/>
               <a:t>Fifth level</a:t>
             </a:r>
             <a:endParaRPr lang="en-GB"/>
@@ -4768,7 +4765,7 @@
                 </a:solidFill>
               </a:rPr>
               <a:pPr/>
-              <a:t>31/01/2018</a:t>
+              <a:t>19/02/2018</a:t>
             </a:fld>
             <a:endParaRPr lang="en-GB">
               <a:solidFill>
@@ -4887,7 +4884,7 @@
           <a:lstStyle/>
           <a:p>
             <a:r>
-              <a:rPr lang="en-US" smtClean="0"/>
+              <a:rPr lang="en-US"/>
               <a:t>Click to edit Master title style</a:t>
             </a:r>
             <a:endParaRPr lang="en-GB"/>
@@ -4918,7 +4915,7 @@
                 </a:solidFill>
               </a:rPr>
               <a:pPr/>
-              <a:t>31/01/2018</a:t>
+              <a:t>19/02/2018</a:t>
             </a:fld>
             <a:endParaRPr lang="en-GB">
               <a:solidFill>
@@ -5593,7 +5590,7 @@
           <a:lstStyle/>
           <a:p>
             <a:r>
-              <a:rPr lang="en-US" smtClean="0"/>
+              <a:rPr lang="en-US"/>
               <a:t>Click to edit Master title style</a:t>
             </a:r>
             <a:endParaRPr lang="en-GB"/>
@@ -5627,35 +5624,35 @@
           <a:p>
             <a:pPr lvl="0"/>
             <a:r>
-              <a:rPr lang="en-US" smtClean="0"/>
+              <a:rPr lang="en-US"/>
               <a:t>Click to edit Master text styles</a:t>
             </a:r>
           </a:p>
           <a:p>
             <a:pPr lvl="1"/>
             <a:r>
-              <a:rPr lang="en-US" smtClean="0"/>
+              <a:rPr lang="en-US"/>
               <a:t>Second level</a:t>
             </a:r>
           </a:p>
           <a:p>
             <a:pPr lvl="2"/>
             <a:r>
-              <a:rPr lang="en-US" smtClean="0"/>
+              <a:rPr lang="en-US"/>
               <a:t>Third level</a:t>
             </a:r>
           </a:p>
           <a:p>
             <a:pPr lvl="3"/>
             <a:r>
-              <a:rPr lang="en-US" smtClean="0"/>
+              <a:rPr lang="en-US"/>
               <a:t>Fourth level</a:t>
             </a:r>
           </a:p>
           <a:p>
             <a:pPr lvl="4"/>
             <a:r>
-              <a:rPr lang="en-US" smtClean="0"/>
+              <a:rPr lang="en-US"/>
               <a:t>Fifth level</a:t>
             </a:r>
             <a:endParaRPr lang="en-GB"/>
@@ -5704,7 +5701,7 @@
                 </a:solidFill>
               </a:rPr>
               <a:pPr/>
-              <a:t>31/01/2018</a:t>
+              <a:t>19/02/2018</a:t>
             </a:fld>
             <a:endParaRPr lang="en-GB">
               <a:solidFill>
@@ -6124,13 +6121,6 @@
           <a:bodyPr anchor="t" anchorCtr="0"/>
           <a:lstStyle/>
           <a:p>
-            <a:r>
-              <a:rPr lang="en-US" sz="6000" dirty="0">
-                <a:latin typeface="Helvetica"/>
-                <a:cs typeface="Helvetica"/>
-              </a:rPr>
-              <a:t/>
-            </a:r>
             <a:br>
               <a:rPr lang="en-US" sz="6000" dirty="0">
                 <a:latin typeface="Helvetica"/>
@@ -6144,31 +6134,15 @@
               </a:rPr>
               <a:t>Software Carpentry</a:t>
             </a:r>
-            <a:r>
-              <a:rPr lang="en-US" sz="1800" dirty="0"/>
-              <a:t/>
-            </a:r>
             <a:br>
               <a:rPr lang="en-US" sz="1800" dirty="0"/>
             </a:br>
-            <a:r>
-              <a:rPr lang="en-US" sz="1800" dirty="0"/>
-              <a:t/>
-            </a:r>
             <a:br>
               <a:rPr lang="en-US" sz="1800" dirty="0"/>
             </a:br>
-            <a:r>
-              <a:rPr lang="en-US" sz="1800" dirty="0"/>
-              <a:t/>
-            </a:r>
             <a:br>
               <a:rPr lang="en-US" sz="1800" dirty="0"/>
             </a:br>
-            <a:r>
-              <a:rPr lang="en-US" sz="1800" dirty="0"/>
-              <a:t/>
-            </a:r>
             <a:br>
               <a:rPr lang="en-US" sz="1800" dirty="0"/>
             </a:br>
@@ -6189,10 +6163,6 @@
             <a:r>
               <a:rPr lang="en-GB" sz="3200" dirty="0"/>
               <a:t>8-9 March 2018</a:t>
-            </a:r>
-            <a:r>
-              <a:rPr lang="en-GB" sz="2400" dirty="0"/>
-              <a:t/>
             </a:r>
             <a:br>
               <a:rPr lang="en-GB" sz="2400" dirty="0"/>
@@ -6206,7 +6176,7 @@
           <p:cNvPr id="2056" name="Picture 8" descr="https://hpcarcher.github.io/2017-12-11-Imperial/img/software-carpentry-large.png">
             <a:extLst>
               <a:ext uri="{FF2B5EF4-FFF2-40B4-BE49-F238E27FC236}">
-                <a16:creationId xmlns:a16="http://schemas.microsoft.com/office/drawing/2014/main" xmlns="" id="{BC901FCD-191D-4E48-9224-7B99E983908A}"/>
+                <a16:creationId xmlns:a16="http://schemas.microsoft.com/office/drawing/2014/main" id="{BC901FCD-191D-4E48-9224-7B99E983908A}"/>
               </a:ext>
             </a:extLst>
           </p:cNvPr>
@@ -6246,7 +6216,7 @@
           <p:cNvPr id="8" name="Picture 7" descr="BetterSoftwareStickerImage.jpg">
             <a:extLst>
               <a:ext uri="{FF2B5EF4-FFF2-40B4-BE49-F238E27FC236}">
-                <a16:creationId xmlns:a16="http://schemas.microsoft.com/office/drawing/2014/main" xmlns="" id="{538D1416-BCEC-4E45-A727-C22B9F0924F0}"/>
+                <a16:creationId xmlns:a16="http://schemas.microsoft.com/office/drawing/2014/main" id="{538D1416-BCEC-4E45-A727-C22B9F0924F0}"/>
               </a:ext>
             </a:extLst>
           </p:cNvPr>
@@ -6387,7 +6357,7 @@
           <p:cNvPr id="2" name="Title 1">
             <a:extLst>
               <a:ext uri="{FF2B5EF4-FFF2-40B4-BE49-F238E27FC236}">
-                <a16:creationId xmlns:a16="http://schemas.microsoft.com/office/drawing/2014/main" xmlns="" id="{35C1724E-F97B-40BE-82E4-B29342DF35D7}"/>
+                <a16:creationId xmlns:a16="http://schemas.microsoft.com/office/drawing/2014/main" id="{35C1724E-F97B-40BE-82E4-B29342DF35D7}"/>
               </a:ext>
             </a:extLst>
           </p:cNvPr>
@@ -6412,7 +6382,7 @@
           <p:cNvPr id="3" name="Content Placeholder 2">
             <a:extLst>
               <a:ext uri="{FF2B5EF4-FFF2-40B4-BE49-F238E27FC236}">
-                <a16:creationId xmlns:a16="http://schemas.microsoft.com/office/drawing/2014/main" xmlns="" id="{A660F5C2-8A54-4B60-98B0-5AADAAE94534}"/>
+                <a16:creationId xmlns:a16="http://schemas.microsoft.com/office/drawing/2014/main" id="{A660F5C2-8A54-4B60-98B0-5AADAAE94534}"/>
               </a:ext>
             </a:extLst>
           </p:cNvPr>
@@ -6467,7 +6437,7 @@
           <p:cNvPr id="2" name="Title 1">
             <a:extLst>
               <a:ext uri="{FF2B5EF4-FFF2-40B4-BE49-F238E27FC236}">
-                <a16:creationId xmlns:a16="http://schemas.microsoft.com/office/drawing/2014/main" xmlns="" id="{A54344FB-A27D-4B84-A6C7-D361547140C6}"/>
+                <a16:creationId xmlns:a16="http://schemas.microsoft.com/office/drawing/2014/main" id="{A54344FB-A27D-4B84-A6C7-D361547140C6}"/>
               </a:ext>
             </a:extLst>
           </p:cNvPr>
@@ -6492,7 +6462,7 @@
           <p:cNvPr id="7" name="TextBox 8">
             <a:extLst>
               <a:ext uri="{FF2B5EF4-FFF2-40B4-BE49-F238E27FC236}">
-                <a16:creationId xmlns:a16="http://schemas.microsoft.com/office/drawing/2014/main" xmlns="" id="{D815040F-54E3-4DC1-AEA7-6A960A1118F1}"/>
+                <a16:creationId xmlns:a16="http://schemas.microsoft.com/office/drawing/2014/main" id="{D815040F-54E3-4DC1-AEA7-6A960A1118F1}"/>
               </a:ext>
             </a:extLst>
           </p:cNvPr>
@@ -6714,7 +6684,7 @@
           <p:cNvPr id="6" name="Picture 5">
             <a:extLst>
               <a:ext uri="{FF2B5EF4-FFF2-40B4-BE49-F238E27FC236}">
-                <a16:creationId xmlns:a16="http://schemas.microsoft.com/office/drawing/2014/main" xmlns="" id="{48BB4C2B-97C1-49F6-8018-F858C3F26A42}"/>
+                <a16:creationId xmlns:a16="http://schemas.microsoft.com/office/drawing/2014/main" id="{48BB4C2B-97C1-49F6-8018-F858C3F26A42}"/>
               </a:ext>
             </a:extLst>
           </p:cNvPr>
@@ -7771,7 +7741,7 @@
           <p:cNvPr id="2" name="Title 1">
             <a:extLst>
               <a:ext uri="{FF2B5EF4-FFF2-40B4-BE49-F238E27FC236}">
-                <a16:creationId xmlns:a16="http://schemas.microsoft.com/office/drawing/2014/main" xmlns="" id="{0A3A8724-7894-4017-9060-DCB06C0A44DB}"/>
+                <a16:creationId xmlns:a16="http://schemas.microsoft.com/office/drawing/2014/main" id="{0A3A8724-7894-4017-9060-DCB06C0A44DB}"/>
               </a:ext>
             </a:extLst>
           </p:cNvPr>
@@ -7799,7 +7769,7 @@
           <p:cNvPr id="3" name="Content Placeholder 2">
             <a:extLst>
               <a:ext uri="{FF2B5EF4-FFF2-40B4-BE49-F238E27FC236}">
-                <a16:creationId xmlns:a16="http://schemas.microsoft.com/office/drawing/2014/main" xmlns="" id="{E7D15EFD-F7F1-4563-B5D9-AA50D655CFFE}"/>
+                <a16:creationId xmlns:a16="http://schemas.microsoft.com/office/drawing/2014/main" id="{E7D15EFD-F7F1-4563-B5D9-AA50D655CFFE}"/>
               </a:ext>
             </a:extLst>
           </p:cNvPr>
@@ -7847,7 +7817,7 @@
           <p:cNvPr id="4" name="Content Placeholder 2">
             <a:extLst>
               <a:ext uri="{FF2B5EF4-FFF2-40B4-BE49-F238E27FC236}">
-                <a16:creationId xmlns:a16="http://schemas.microsoft.com/office/drawing/2014/main" xmlns="" id="{7D5814C1-A55A-4CC5-B9BC-B84132CCF29C}"/>
+                <a16:creationId xmlns:a16="http://schemas.microsoft.com/office/drawing/2014/main" id="{7D5814C1-A55A-4CC5-B9BC-B84132CCF29C}"/>
               </a:ext>
             </a:extLst>
           </p:cNvPr>
@@ -8031,7 +8001,7 @@
           <p:cNvPr id="5" name="Shape 155">
             <a:extLst>
               <a:ext uri="{FF2B5EF4-FFF2-40B4-BE49-F238E27FC236}">
-                <a16:creationId xmlns:a16="http://schemas.microsoft.com/office/drawing/2014/main" xmlns="" id="{9F39AAA1-1EF2-4A20-AC0F-1E05CFC014C5}"/>
+                <a16:creationId xmlns:a16="http://schemas.microsoft.com/office/drawing/2014/main" id="{9F39AAA1-1EF2-4A20-AC0F-1E05CFC014C5}"/>
               </a:ext>
             </a:extLst>
           </p:cNvPr>
@@ -8068,7 +8038,7 @@
           <p:cNvPr id="6" name="Shape 156" descr="DC1_logo.png">
             <a:extLst>
               <a:ext uri="{FF2B5EF4-FFF2-40B4-BE49-F238E27FC236}">
-                <a16:creationId xmlns:a16="http://schemas.microsoft.com/office/drawing/2014/main" xmlns="" id="{6E5C0632-EE86-457B-A304-5969C85E86A6}"/>
+                <a16:creationId xmlns:a16="http://schemas.microsoft.com/office/drawing/2014/main" id="{6E5C0632-EE86-457B-A304-5969C85E86A6}"/>
               </a:ext>
             </a:extLst>
           </p:cNvPr>
@@ -8556,7 +8526,7 @@
           <p:cNvPr id="3" name="Picture 2">
             <a:extLst>
               <a:ext uri="{FF2B5EF4-FFF2-40B4-BE49-F238E27FC236}">
-                <a16:creationId xmlns:a16="http://schemas.microsoft.com/office/drawing/2014/main" xmlns="" id="{06C8179E-DD15-4B52-B2AB-781D3FD1E7C7}"/>
+                <a16:creationId xmlns:a16="http://schemas.microsoft.com/office/drawing/2014/main" id="{06C8179E-DD15-4B52-B2AB-781D3FD1E7C7}"/>
               </a:ext>
             </a:extLst>
           </p:cNvPr>
@@ -8591,7 +8561,7 @@
           <p:cNvPr id="9" name="Picture 8">
             <a:extLst>
               <a:ext uri="{FF2B5EF4-FFF2-40B4-BE49-F238E27FC236}">
-                <a16:creationId xmlns:a16="http://schemas.microsoft.com/office/drawing/2014/main" xmlns="" id="{CD78DA23-B88C-4F81-8104-4B51CC58B810}"/>
+                <a16:creationId xmlns:a16="http://schemas.microsoft.com/office/drawing/2014/main" id="{CD78DA23-B88C-4F81-8104-4B51CC58B810}"/>
               </a:ext>
             </a:extLst>
           </p:cNvPr>
@@ -8813,14 +8783,11 @@
           <a:p>
             <a:pPr algn="l"/>
             <a:r>
-              <a:rPr lang="en-GB" sz="4000" b="1" dirty="0" smtClean="0">
+              <a:rPr lang="en-GB" sz="4000" b="1" dirty="0">
                 <a:cs typeface="Arial" panose="020B0604020202020204" pitchFamily="34" charset="0"/>
               </a:rPr>
               <a:t>Research IT at Manchester</a:t>
             </a:r>
-            <a:endParaRPr lang="en-GB" sz="4000" b="1" dirty="0">
-              <a:cs typeface="Arial" panose="020B0604020202020204" pitchFamily="34" charset="0"/>
-            </a:endParaRPr>
           </a:p>
         </p:txBody>
       </p:sp>
@@ -8847,68 +8814,58 @@
           <a:lstStyle/>
           <a:p>
             <a:r>
-              <a:rPr lang="en-GB" dirty="0" smtClean="0"/>
+              <a:rPr lang="en-GB" dirty="0"/>
               <a:t>Training courses </a:t>
             </a:r>
-            <a:endParaRPr lang="en-GB" dirty="0"/>
-          </a:p>
-          <a:p>
-            <a:r>
-              <a:rPr lang="en-GB" dirty="0" smtClean="0"/>
-              <a:t>Advice </a:t>
-            </a:r>
-            <a:r>
-              <a:rPr lang="en-GB" dirty="0" smtClean="0"/>
-              <a:t>and guidance on research software</a:t>
-            </a:r>
-            <a:endParaRPr lang="en-GB" dirty="0"/>
           </a:p>
           <a:p>
             <a:r>
               <a:rPr lang="en-GB" dirty="0"/>
-              <a:t>Access to specialist support and consultancy e.g. code </a:t>
-            </a:r>
-            <a:r>
-              <a:rPr lang="en-GB" dirty="0" smtClean="0"/>
-              <a:t>reviews, embedded RSEs</a:t>
-            </a:r>
-          </a:p>
-          <a:p>
-            <a:r>
-              <a:rPr lang="en-GB" dirty="0" smtClean="0"/>
+              <a:t>Advice and guidance on research software</a:t>
+            </a:r>
+          </a:p>
+          <a:p>
+            <a:r>
+              <a:rPr lang="en-GB" dirty="0"/>
+              <a:t>Access to specialist support and consultancy e.g. code reviews, embedded RSEs</a:t>
+            </a:r>
+          </a:p>
+          <a:p>
+            <a:r>
+              <a:rPr lang="en-GB" dirty="0"/>
               <a:t>Access to HPC systems</a:t>
             </a:r>
           </a:p>
           <a:p>
             <a:r>
-              <a:rPr lang="en-GB" dirty="0" smtClean="0"/>
+              <a:rPr lang="en-GB" dirty="0"/>
               <a:t>Visualization and data analytics support</a:t>
             </a:r>
           </a:p>
           <a:p>
             <a:r>
-              <a:rPr lang="en-GB" dirty="0" smtClean="0"/>
+              <a:rPr lang="en-GB" dirty="0"/>
               <a:t>Get in touch via </a:t>
             </a:r>
             <a:r>
-              <a:rPr lang="en-GB" dirty="0" smtClean="0">
+              <a:rPr lang="en-GB" dirty="0">
                 <a:hlinkClick r:id="rId2"/>
               </a:rPr>
               <a:t>https://supportcentre.manchester.ac.uk</a:t>
             </a:r>
-            <a:endParaRPr lang="en-GB" dirty="0" smtClean="0"/>
-          </a:p>
-          <a:p>
             <a:endParaRPr lang="en-GB" dirty="0"/>
           </a:p>
           <a:p>
-            <a:endParaRPr lang="en-GB" dirty="0" smtClean="0"/>
-          </a:p>
-          <a:p>
-            <a:endParaRPr lang="en-GB" dirty="0" smtClean="0"/>
-          </a:p>
-          <a:p>
-            <a:endParaRPr lang="en-GB" dirty="0" smtClean="0"/>
+            <a:endParaRPr lang="en-GB" dirty="0"/>
+          </a:p>
+          <a:p>
+            <a:endParaRPr lang="en-GB" dirty="0"/>
+          </a:p>
+          <a:p>
+            <a:endParaRPr lang="en-GB" dirty="0"/>
+          </a:p>
+          <a:p>
+            <a:endParaRPr lang="en-GB" dirty="0"/>
           </a:p>
           <a:p>
             <a:endParaRPr lang="en-GB" dirty="0"/>
@@ -9042,13 +8999,6 @@
   <p:clrMapOvr>
     <a:masterClrMapping/>
   </p:clrMapOvr>
-  <p:timing>
-    <p:tnLst>
-      <p:par>
-        <p:cTn id="1" dur="indefinite" restart="never" nodeType="tmRoot"/>
-      </p:par>
-    </p:tnLst>
-  </p:timing>
 </p:sld>
 </file>
 
@@ -9579,7 +9529,7 @@
           <p:cNvPr id="2" name="Title 1">
             <a:extLst>
               <a:ext uri="{FF2B5EF4-FFF2-40B4-BE49-F238E27FC236}">
-                <a16:creationId xmlns:a16="http://schemas.microsoft.com/office/drawing/2014/main" xmlns="" id="{0A3A8724-7894-4017-9060-DCB06C0A44DB}"/>
+                <a16:creationId xmlns:a16="http://schemas.microsoft.com/office/drawing/2014/main" id="{0A3A8724-7894-4017-9060-DCB06C0A44DB}"/>
               </a:ext>
             </a:extLst>
           </p:cNvPr>
@@ -9607,7 +9557,7 @@
           <p:cNvPr id="3" name="Content Placeholder 2">
             <a:extLst>
               <a:ext uri="{FF2B5EF4-FFF2-40B4-BE49-F238E27FC236}">
-                <a16:creationId xmlns:a16="http://schemas.microsoft.com/office/drawing/2014/main" xmlns="" id="{E7D15EFD-F7F1-4563-B5D9-AA50D655CFFE}"/>
+                <a16:creationId xmlns:a16="http://schemas.microsoft.com/office/drawing/2014/main" id="{E7D15EFD-F7F1-4563-B5D9-AA50D655CFFE}"/>
               </a:ext>
             </a:extLst>
           </p:cNvPr>
@@ -9673,7 +9623,7 @@
           <p:cNvPr id="4" name="Content Placeholder 2">
             <a:extLst>
               <a:ext uri="{FF2B5EF4-FFF2-40B4-BE49-F238E27FC236}">
-                <a16:creationId xmlns:a16="http://schemas.microsoft.com/office/drawing/2014/main" xmlns="" id="{7D5814C1-A55A-4CC5-B9BC-B84132CCF29C}"/>
+                <a16:creationId xmlns:a16="http://schemas.microsoft.com/office/drawing/2014/main" id="{7D5814C1-A55A-4CC5-B9BC-B84132CCF29C}"/>
               </a:ext>
             </a:extLst>
           </p:cNvPr>
@@ -9905,7 +9855,7 @@
           <p:cNvPr id="2" name="Title 1">
             <a:extLst>
               <a:ext uri="{FF2B5EF4-FFF2-40B4-BE49-F238E27FC236}">
-                <a16:creationId xmlns:a16="http://schemas.microsoft.com/office/drawing/2014/main" xmlns="" id="{7D25C9B4-E028-41B5-94BB-79B216304A17}"/>
+                <a16:creationId xmlns:a16="http://schemas.microsoft.com/office/drawing/2014/main" id="{7D25C9B4-E028-41B5-94BB-79B216304A17}"/>
               </a:ext>
             </a:extLst>
           </p:cNvPr>
@@ -9935,7 +9885,7 @@
           <p:cNvPr id="3" name="Content Placeholder 2">
             <a:extLst>
               <a:ext uri="{FF2B5EF4-FFF2-40B4-BE49-F238E27FC236}">
-                <a16:creationId xmlns:a16="http://schemas.microsoft.com/office/drawing/2014/main" xmlns="" id="{E0ECBFBA-3CD3-4A65-AFC6-38F0C4B3D9D5}"/>
+                <a16:creationId xmlns:a16="http://schemas.microsoft.com/office/drawing/2014/main" id="{E0ECBFBA-3CD3-4A65-AFC6-38F0C4B3D9D5}"/>
               </a:ext>
             </a:extLst>
           </p:cNvPr>
@@ -10068,7 +10018,7 @@
           <p:cNvPr id="2" name="Title 1">
             <a:extLst>
               <a:ext uri="{FF2B5EF4-FFF2-40B4-BE49-F238E27FC236}">
-                <a16:creationId xmlns:a16="http://schemas.microsoft.com/office/drawing/2014/main" xmlns="" id="{0D902B0C-009A-4ABF-80F7-E531D3320577}"/>
+                <a16:creationId xmlns:a16="http://schemas.microsoft.com/office/drawing/2014/main" id="{0D902B0C-009A-4ABF-80F7-E531D3320577}"/>
               </a:ext>
             </a:extLst>
           </p:cNvPr>
@@ -10098,7 +10048,7 @@
           <p:cNvPr id="2050" name="Picture 2" descr="http://jonudell.net/images/alternate-view-of-automation.png">
             <a:extLst>
               <a:ext uri="{FF2B5EF4-FFF2-40B4-BE49-F238E27FC236}">
-                <a16:creationId xmlns:a16="http://schemas.microsoft.com/office/drawing/2014/main" xmlns="" id="{BDDC17F6-4561-40A1-A801-B2D36CA6A3AD}"/>
+                <a16:creationId xmlns:a16="http://schemas.microsoft.com/office/drawing/2014/main" id="{BDDC17F6-4561-40A1-A801-B2D36CA6A3AD}"/>
               </a:ext>
             </a:extLst>
           </p:cNvPr>
@@ -10145,7 +10095,7 @@
           <p:cNvPr id="5" name="TextBox 4">
             <a:extLst>
               <a:ext uri="{FF2B5EF4-FFF2-40B4-BE49-F238E27FC236}">
-                <a16:creationId xmlns:a16="http://schemas.microsoft.com/office/drawing/2014/main" xmlns="" id="{22CB5617-9290-470A-BC4B-C3E68878A512}"/>
+                <a16:creationId xmlns:a16="http://schemas.microsoft.com/office/drawing/2014/main" id="{22CB5617-9290-470A-BC4B-C3E68878A512}"/>
               </a:ext>
             </a:extLst>
           </p:cNvPr>
@@ -10216,7 +10166,7 @@
           <p:cNvPr id="2" name="Title 1">
             <a:extLst>
               <a:ext uri="{FF2B5EF4-FFF2-40B4-BE49-F238E27FC236}">
-                <a16:creationId xmlns:a16="http://schemas.microsoft.com/office/drawing/2014/main" xmlns="" id="{5DF714A7-555A-4F38-A4E2-548F2F48EC56}"/>
+                <a16:creationId xmlns:a16="http://schemas.microsoft.com/office/drawing/2014/main" id="{5DF714A7-555A-4F38-A4E2-548F2F48EC56}"/>
               </a:ext>
             </a:extLst>
           </p:cNvPr>
@@ -10246,7 +10196,7 @@
           <p:cNvPr id="4" name="Picture 2" descr="http://phdcomics.com/comics/archive/phd031214s.gif">
             <a:extLst>
               <a:ext uri="{FF2B5EF4-FFF2-40B4-BE49-F238E27FC236}">
-                <a16:creationId xmlns:a16="http://schemas.microsoft.com/office/drawing/2014/main" xmlns="" id="{61341FF4-1213-4172-ABD2-1D4F97D5D3AA}"/>
+                <a16:creationId xmlns:a16="http://schemas.microsoft.com/office/drawing/2014/main" id="{61341FF4-1213-4172-ABD2-1D4F97D5D3AA}"/>
               </a:ext>
             </a:extLst>
           </p:cNvPr>
@@ -10293,7 +10243,7 @@
           <p:cNvPr id="5" name="TextBox 4">
             <a:extLst>
               <a:ext uri="{FF2B5EF4-FFF2-40B4-BE49-F238E27FC236}">
-                <a16:creationId xmlns:a16="http://schemas.microsoft.com/office/drawing/2014/main" xmlns="" id="{0B2EB249-E396-46F9-863D-FCB09AE6D143}"/>
+                <a16:creationId xmlns:a16="http://schemas.microsoft.com/office/drawing/2014/main" id="{0B2EB249-E396-46F9-863D-FCB09AE6D143}"/>
               </a:ext>
             </a:extLst>
           </p:cNvPr>
@@ -10364,7 +10314,7 @@
           <p:cNvPr id="2" name="Title 1">
             <a:extLst>
               <a:ext uri="{FF2B5EF4-FFF2-40B4-BE49-F238E27FC236}">
-                <a16:creationId xmlns:a16="http://schemas.microsoft.com/office/drawing/2014/main" xmlns="" id="{8FB7CE3D-FACE-4C28-AA7D-99F08FA9A55A}"/>
+                <a16:creationId xmlns:a16="http://schemas.microsoft.com/office/drawing/2014/main" id="{8FB7CE3D-FACE-4C28-AA7D-99F08FA9A55A}"/>
               </a:ext>
             </a:extLst>
           </p:cNvPr>
@@ -10394,7 +10344,7 @@
           <p:cNvPr id="4" name="Picture 2" descr="http://www.phdcomics.com/comics/archive/phd101212s.gif">
             <a:extLst>
               <a:ext uri="{FF2B5EF4-FFF2-40B4-BE49-F238E27FC236}">
-                <a16:creationId xmlns:a16="http://schemas.microsoft.com/office/drawing/2014/main" xmlns="" id="{226DEA4D-7787-4208-8E67-5D65846B4678}"/>
+                <a16:creationId xmlns:a16="http://schemas.microsoft.com/office/drawing/2014/main" id="{226DEA4D-7787-4208-8E67-5D65846B4678}"/>
               </a:ext>
             </a:extLst>
           </p:cNvPr>
@@ -10441,7 +10391,7 @@
           <p:cNvPr id="5" name="TextBox 4">
             <a:extLst>
               <a:ext uri="{FF2B5EF4-FFF2-40B4-BE49-F238E27FC236}">
-                <a16:creationId xmlns:a16="http://schemas.microsoft.com/office/drawing/2014/main" xmlns="" id="{CDEBD24E-7903-4E5F-BE6A-198716D43DD8}"/>
+                <a16:creationId xmlns:a16="http://schemas.microsoft.com/office/drawing/2014/main" id="{CDEBD24E-7903-4E5F-BE6A-198716D43DD8}"/>
               </a:ext>
             </a:extLst>
           </p:cNvPr>
@@ -10482,7 +10432,7 @@
           <p:cNvPr id="6" name="Picture 2" descr="http://www.phdcomics.com/comics/archive/phd052810s.gif">
             <a:extLst>
               <a:ext uri="{FF2B5EF4-FFF2-40B4-BE49-F238E27FC236}">
-                <a16:creationId xmlns:a16="http://schemas.microsoft.com/office/drawing/2014/main" xmlns="" id="{5CC91F2C-8320-47AE-9FC5-1326AA718B8E}"/>
+                <a16:creationId xmlns:a16="http://schemas.microsoft.com/office/drawing/2014/main" id="{5CC91F2C-8320-47AE-9FC5-1326AA718B8E}"/>
               </a:ext>
             </a:extLst>
           </p:cNvPr>
@@ -10529,7 +10479,7 @@
           <p:cNvPr id="7" name="TextBox 6">
             <a:extLst>
               <a:ext uri="{FF2B5EF4-FFF2-40B4-BE49-F238E27FC236}">
-                <a16:creationId xmlns:a16="http://schemas.microsoft.com/office/drawing/2014/main" xmlns="" id="{4589B974-EC77-4794-B079-B733C53C0D60}"/>
+                <a16:creationId xmlns:a16="http://schemas.microsoft.com/office/drawing/2014/main" id="{4589B974-EC77-4794-B079-B733C53C0D60}"/>
               </a:ext>
             </a:extLst>
           </p:cNvPr>
@@ -10886,7 +10836,7 @@
           <p:cNvPr id="15" name="Picture 14">
             <a:extLst>
               <a:ext uri="{FF2B5EF4-FFF2-40B4-BE49-F238E27FC236}">
-                <a16:creationId xmlns:a16="http://schemas.microsoft.com/office/drawing/2014/main" xmlns="" id="{08DC44CE-9C3E-4368-B2EA-BF9874218D4B}"/>
+                <a16:creationId xmlns:a16="http://schemas.microsoft.com/office/drawing/2014/main" id="{08DC44CE-9C3E-4368-B2EA-BF9874218D4B}"/>
               </a:ext>
             </a:extLst>
           </p:cNvPr>
@@ -10903,7 +10853,7 @@
         </p:blipFill>
         <p:spPr>
           <a:xfrm>
-            <a:off x="5436296" y="1631898"/>
+            <a:off x="6857026" y="1817276"/>
             <a:ext cx="1800000" cy="1800000"/>
           </a:xfrm>
           <a:prstGeom prst="rect">
@@ -10916,7 +10866,7 @@
           <p:cNvPr id="16" name="Picture 15">
             <a:extLst>
               <a:ext uri="{FF2B5EF4-FFF2-40B4-BE49-F238E27FC236}">
-                <a16:creationId xmlns:a16="http://schemas.microsoft.com/office/drawing/2014/main" xmlns="" id="{24C8BC12-2BBB-421D-8DA4-5E2EE055CBA6}"/>
+                <a16:creationId xmlns:a16="http://schemas.microsoft.com/office/drawing/2014/main" id="{24C8BC12-2BBB-421D-8DA4-5E2EE055CBA6}"/>
               </a:ext>
             </a:extLst>
           </p:cNvPr>
@@ -10933,7 +10883,7 @@
         </p:blipFill>
         <p:spPr>
           <a:xfrm>
-            <a:off x="1619872" y="1631898"/>
+            <a:off x="539552" y="1917032"/>
             <a:ext cx="1800000" cy="1800000"/>
           </a:xfrm>
           <a:prstGeom prst="rect">
@@ -10946,7 +10896,7 @@
           <p:cNvPr id="17" name="Picture 16">
             <a:extLst>
               <a:ext uri="{FF2B5EF4-FFF2-40B4-BE49-F238E27FC236}">
-                <a16:creationId xmlns:a16="http://schemas.microsoft.com/office/drawing/2014/main" xmlns="" id="{A24DAEAC-4C99-4CE0-9DF9-5C36C43F5874}"/>
+                <a16:creationId xmlns:a16="http://schemas.microsoft.com/office/drawing/2014/main" id="{A24DAEAC-4C99-4CE0-9DF9-5C36C43F5874}"/>
               </a:ext>
             </a:extLst>
           </p:cNvPr>
@@ -10963,7 +10913,7 @@
         </p:blipFill>
         <p:spPr>
           <a:xfrm>
-            <a:off x="5580312" y="3754087"/>
+            <a:off x="6876456" y="4104635"/>
             <a:ext cx="1800000" cy="1800000"/>
           </a:xfrm>
           <a:prstGeom prst="rect">
@@ -10976,7 +10926,7 @@
           <p:cNvPr id="18" name="Picture 17">
             <a:extLst>
               <a:ext uri="{FF2B5EF4-FFF2-40B4-BE49-F238E27FC236}">
-                <a16:creationId xmlns:a16="http://schemas.microsoft.com/office/drawing/2014/main" xmlns="" id="{BC8E1782-2ABA-4F9C-99B8-4892A2A1E4EA}"/>
+                <a16:creationId xmlns:a16="http://schemas.microsoft.com/office/drawing/2014/main" id="{BC8E1782-2ABA-4F9C-99B8-4892A2A1E4EA}"/>
               </a:ext>
             </a:extLst>
           </p:cNvPr>
@@ -10993,8 +10943,120 @@
         </p:blipFill>
         <p:spPr>
           <a:xfrm>
-            <a:off x="1619872" y="3754087"/>
+            <a:off x="539552" y="4104635"/>
             <a:ext cx="1800000" cy="1800000"/>
+          </a:xfrm>
+          <a:prstGeom prst="rect">
+            <a:avLst/>
+          </a:prstGeom>
+        </p:spPr>
+      </p:pic>
+      <p:pic>
+        <p:nvPicPr>
+          <p:cNvPr id="4" name="Picture 3">
+            <a:extLst>
+              <a:ext uri="{FF2B5EF4-FFF2-40B4-BE49-F238E27FC236}">
+                <a16:creationId xmlns:a16="http://schemas.microsoft.com/office/drawing/2014/main" id="{2411A8AB-C05A-4BA6-B363-369DD051BA50}"/>
+              </a:ext>
+            </a:extLst>
+          </p:cNvPr>
+          <p:cNvPicPr>
+            <a:picLocks noChangeAspect="1"/>
+          </p:cNvPicPr>
+          <p:nvPr/>
+        </p:nvPicPr>
+        <p:blipFill>
+          <a:blip r:embed="rId9">
+            <a:extLst>
+              <a:ext uri="{28A0092B-C50C-407E-A947-70E740481C1C}">
+                <a14:useLocalDpi xmlns:a14="http://schemas.microsoft.com/office/drawing/2010/main" val="0"/>
+              </a:ext>
+            </a:extLst>
+          </a:blip>
+          <a:stretch>
+            <a:fillRect/>
+          </a:stretch>
+        </p:blipFill>
+        <p:spPr>
+          <a:xfrm>
+            <a:off x="3563888" y="1338330"/>
+            <a:ext cx="1890951" cy="1890951"/>
+          </a:xfrm>
+          <a:prstGeom prst="rect">
+            <a:avLst/>
+          </a:prstGeom>
+        </p:spPr>
+      </p:pic>
+      <p:sp>
+        <p:nvSpPr>
+          <p:cNvPr id="5" name="Rectangle 4">
+            <a:extLst>
+              <a:ext uri="{FF2B5EF4-FFF2-40B4-BE49-F238E27FC236}">
+                <a16:creationId xmlns:a16="http://schemas.microsoft.com/office/drawing/2014/main" id="{73C7030B-A5AA-4576-82F8-666EC9AF4B50}"/>
+              </a:ext>
+            </a:extLst>
+          </p:cNvPr>
+          <p:cNvSpPr/>
+          <p:nvPr/>
+        </p:nvSpPr>
+        <p:spPr>
+          <a:xfrm>
+            <a:off x="2699792" y="3131676"/>
+            <a:ext cx="4479496" cy="400110"/>
+          </a:xfrm>
+          <a:prstGeom prst="rect">
+            <a:avLst/>
+          </a:prstGeom>
+        </p:spPr>
+        <p:txBody>
+          <a:bodyPr wrap="none">
+            <a:spAutoFit/>
+          </a:bodyPr>
+          <a:lstStyle/>
+          <a:p>
+            <a:r>
+              <a:rPr lang="en-GB" sz="2000" dirty="0">
+                <a:hlinkClick r:id="rId10"/>
+              </a:rPr>
+              <a:t>https://software-carpentry.org/conduct/</a:t>
+            </a:r>
+            <a:r>
+              <a:rPr lang="en-GB" sz="2000" dirty="0"/>
+              <a:t> </a:t>
+            </a:r>
+          </a:p>
+        </p:txBody>
+      </p:sp>
+      <p:pic>
+        <p:nvPicPr>
+          <p:cNvPr id="7" name="Picture 6">
+            <a:extLst>
+              <a:ext uri="{FF2B5EF4-FFF2-40B4-BE49-F238E27FC236}">
+                <a16:creationId xmlns:a16="http://schemas.microsoft.com/office/drawing/2014/main" id="{0B9482EA-AA9B-4076-BA2F-ADA89FECF040}"/>
+              </a:ext>
+            </a:extLst>
+          </p:cNvPr>
+          <p:cNvPicPr>
+            <a:picLocks noChangeAspect="1"/>
+          </p:cNvPicPr>
+          <p:nvPr/>
+        </p:nvPicPr>
+        <p:blipFill>
+          <a:blip r:embed="rId11">
+            <a:extLst>
+              <a:ext uri="{28A0092B-C50C-407E-A947-70E740481C1C}">
+                <a14:useLocalDpi xmlns:a14="http://schemas.microsoft.com/office/drawing/2010/main" val="0"/>
+              </a:ext>
+            </a:extLst>
+          </a:blip>
+          <a:stretch>
+            <a:fillRect/>
+          </a:stretch>
+        </p:blipFill>
+        <p:spPr>
+          <a:xfrm>
+            <a:off x="3491880" y="4023256"/>
+            <a:ext cx="1962759" cy="1962759"/>
           </a:xfrm>
           <a:prstGeom prst="rect">
             <a:avLst/>
@@ -11108,7 +11170,7 @@
           <p:cNvPr id="4" name="TextBox 8">
             <a:extLst>
               <a:ext uri="{FF2B5EF4-FFF2-40B4-BE49-F238E27FC236}">
-                <a16:creationId xmlns:a16="http://schemas.microsoft.com/office/drawing/2014/main" xmlns="" id="{1CBD25CC-4B33-4BA6-A3AE-017971463AB2}"/>
+                <a16:creationId xmlns:a16="http://schemas.microsoft.com/office/drawing/2014/main" id="{1CBD25CC-4B33-4BA6-A3AE-017971463AB2}"/>
               </a:ext>
             </a:extLst>
           </p:cNvPr>
@@ -11381,7 +11443,7 @@
           <p:cNvPr id="5" name="Picture 4">
             <a:extLst>
               <a:ext uri="{FF2B5EF4-FFF2-40B4-BE49-F238E27FC236}">
-                <a16:creationId xmlns:a16="http://schemas.microsoft.com/office/drawing/2014/main" xmlns="" id="{66C832FE-248D-4046-B8A5-17E4D1A15FE8}"/>
+                <a16:creationId xmlns:a16="http://schemas.microsoft.com/office/drawing/2014/main" id="{66C832FE-248D-4046-B8A5-17E4D1A15FE8}"/>
               </a:ext>
             </a:extLst>
           </p:cNvPr>
@@ -12461,12 +12523,6 @@
 </file>
 
 <file path=customXml/item1.xml><?xml version="1.0" encoding="utf-8"?>
-<p:properties xmlns:p="http://schemas.microsoft.com/office/2006/metadata/properties" xmlns:xsi="http://www.w3.org/2001/XMLSchema-instance">
-  <documentManagement/>
-</p:properties>
-</file>
-
-<file path=customXml/item2.xml><?xml version="1.0" encoding="utf-8"?>
 <ct:contentTypeSchema xmlns:ct="http://schemas.microsoft.com/office/2006/metadata/contentType" xmlns:ma="http://schemas.microsoft.com/office/2006/metadata/properties/metaAttributes" ct:_="" ma:_="" ma:contentTypeName="Document" ma:contentTypeID="0x0101004F7856CD46387443811428F16B5378D3" ma:contentTypeVersion="0" ma:contentTypeDescription="Create a new document." ma:contentTypeScope="" ma:versionID="17a1fa9394e9df3ffe0f82bd7dbd4843">
   <xsd:schema xmlns:xsd="http://www.w3.org/2001/XMLSchema" xmlns:p="http://schemas.microsoft.com/office/2006/metadata/properties" targetNamespace="http://schemas.microsoft.com/office/2006/metadata/properties" ma:root="true" ma:fieldsID="4aeb20c0e3442673af7ee10786458764">
     <xsd:element name="properties">
@@ -12515,6 +12571,12 @@
 </ct:contentTypeSchema>
 </file>
 
+<file path=customXml/item2.xml><?xml version="1.0" encoding="utf-8"?>
+<p:properties xmlns:p="http://schemas.microsoft.com/office/2006/metadata/properties" xmlns:xsi="http://www.w3.org/2001/XMLSchema-instance">
+  <documentManagement/>
+</p:properties>
+</file>
+
 <file path=customXml/item3.xml><?xml version="1.0" encoding="utf-8"?>
 <?mso-contentType ?>
 <FormTemplates xmlns="http://schemas.microsoft.com/sharepoint/v3/contenttype/forms">
@@ -12525,20 +12587,6 @@
 </file>
 
 <file path=customXml/itemProps1.xml><?xml version="1.0" encoding="utf-8"?>
-<ds:datastoreItem xmlns:ds="http://schemas.openxmlformats.org/officeDocument/2006/customXml" ds:itemID="{4345AD3D-1F83-4DB7-B79D-F198C7164724}">
-  <ds:schemaRefs>
-    <ds:schemaRef ds:uri="http://schemas.microsoft.com/office/2006/documentManagement/types"/>
-    <ds:schemaRef ds:uri="http://schemas.openxmlformats.org/package/2006/metadata/core-properties"/>
-    <ds:schemaRef ds:uri="http://purl.org/dc/dcmitype/"/>
-    <ds:schemaRef ds:uri="http://purl.org/dc/elements/1.1/"/>
-    <ds:schemaRef ds:uri="http://schemas.microsoft.com/office/2006/metadata/properties"/>
-    <ds:schemaRef ds:uri="http://www.w3.org/XML/1998/namespace"/>
-    <ds:schemaRef ds:uri="http://purl.org/dc/terms/"/>
-  </ds:schemaRefs>
-</ds:datastoreItem>
-</file>
-
-<file path=customXml/itemProps2.xml><?xml version="1.0" encoding="utf-8"?>
 <ds:datastoreItem xmlns:ds="http://schemas.openxmlformats.org/officeDocument/2006/customXml" ds:itemID="{75C2EB04-ED8C-41B0-8704-971823A5A314}">
   <ds:schemaRefs>
     <ds:schemaRef ds:uri="http://schemas.microsoft.com/office/2006/metadata/contentType"/>
@@ -12553,6 +12601,20 @@
 </ds:datastoreItem>
 </file>
 
+<file path=customXml/itemProps2.xml><?xml version="1.0" encoding="utf-8"?>
+<ds:datastoreItem xmlns:ds="http://schemas.openxmlformats.org/officeDocument/2006/customXml" ds:itemID="{4345AD3D-1F83-4DB7-B79D-F198C7164724}">
+  <ds:schemaRefs>
+    <ds:schemaRef ds:uri="http://schemas.microsoft.com/office/2006/documentManagement/types"/>
+    <ds:schemaRef ds:uri="http://schemas.openxmlformats.org/package/2006/metadata/core-properties"/>
+    <ds:schemaRef ds:uri="http://purl.org/dc/dcmitype/"/>
+    <ds:schemaRef ds:uri="http://purl.org/dc/elements/1.1/"/>
+    <ds:schemaRef ds:uri="http://schemas.microsoft.com/office/2006/metadata/properties"/>
+    <ds:schemaRef ds:uri="http://www.w3.org/XML/1998/namespace"/>
+    <ds:schemaRef ds:uri="http://purl.org/dc/terms/"/>
+  </ds:schemaRefs>
+</ds:datastoreItem>
+</file>
+
 <file path=customXml/itemProps3.xml><?xml version="1.0" encoding="utf-8"?>
 <ds:datastoreItem xmlns:ds="http://schemas.openxmlformats.org/officeDocument/2006/customXml" ds:itemID="{49F67720-B1E7-4666-BB67-DC10D4B7611F}">
   <ds:schemaRefs>

</xml_diff>